<commit_message>
Started working on Padding Oracle slides
</commit_message>
<xml_diff>
--- a/Shmoocon.pptx
+++ b/Shmoocon.pptx
@@ -5,7 +5,7 @@
     <p:sldMasterId id="2147483708" r:id="rId1"/>
   </p:sldMasterIdLst>
   <p:notesMasterIdLst>
-    <p:notesMasterId r:id="rId74"/>
+    <p:notesMasterId r:id="rId80"/>
   </p:notesMasterIdLst>
   <p:sldIdLst>
     <p:sldId id="256" r:id="rId2"/>
@@ -76,10 +76,16 @@
     <p:sldId id="334" r:id="rId67"/>
     <p:sldId id="335" r:id="rId68"/>
     <p:sldId id="310" r:id="rId69"/>
-    <p:sldId id="312" r:id="rId70"/>
-    <p:sldId id="313" r:id="rId71"/>
-    <p:sldId id="315" r:id="rId72"/>
-    <p:sldId id="316" r:id="rId73"/>
+    <p:sldId id="336" r:id="rId70"/>
+    <p:sldId id="337" r:id="rId71"/>
+    <p:sldId id="341" r:id="rId72"/>
+    <p:sldId id="338" r:id="rId73"/>
+    <p:sldId id="339" r:id="rId74"/>
+    <p:sldId id="340" r:id="rId75"/>
+    <p:sldId id="312" r:id="rId76"/>
+    <p:sldId id="313" r:id="rId77"/>
+    <p:sldId id="315" r:id="rId78"/>
+    <p:sldId id="316" r:id="rId79"/>
   </p:sldIdLst>
   <p:sldSz cx="9144000" cy="6858000" type="screen4x3"/>
   <p:notesSz cx="6858000" cy="9144000"/>
@@ -6304,11 +6310,7 @@
           <a:p>
             <a:r>
               <a:rPr lang="en-US" dirty="0" smtClean="0"/>
-              <a:t>Encryption: Stream </a:t>
-            </a:r>
-            <a:r>
-              <a:rPr lang="en-US" dirty="0" smtClean="0"/>
-              <a:t>cipher</a:t>
+              <a:t>Encryption: Stream cipher</a:t>
             </a:r>
             <a:endParaRPr lang="en-US" dirty="0"/>
           </a:p>
@@ -7843,11 +7845,7 @@
           <a:p>
             <a:r>
               <a:rPr lang="en-US" dirty="0" smtClean="0"/>
-              <a:t>Encryption: Block </a:t>
-            </a:r>
-            <a:r>
-              <a:rPr lang="en-US" dirty="0" smtClean="0"/>
-              <a:t>cipher</a:t>
+              <a:t>Encryption: Block cipher</a:t>
             </a:r>
             <a:endParaRPr lang="en-US" dirty="0"/>
           </a:p>
@@ -8006,11 +8004,7 @@
           <a:p>
             <a:r>
               <a:rPr lang="en-US" dirty="0" smtClean="0"/>
-              <a:t>Encryption: Block </a:t>
-            </a:r>
-            <a:r>
-              <a:rPr lang="en-US" dirty="0" smtClean="0"/>
-              <a:t>cipher modes of operation – ECB</a:t>
+              <a:t>Encryption: Block cipher modes of operation – ECB</a:t>
             </a:r>
             <a:endParaRPr lang="en-US" dirty="0"/>
           </a:p>
@@ -8161,11 +8155,7 @@
           <a:p>
             <a:r>
               <a:rPr lang="en-US" dirty="0" smtClean="0"/>
-              <a:t>Encryption: Block </a:t>
-            </a:r>
-            <a:r>
-              <a:rPr lang="en-US" dirty="0" smtClean="0"/>
-              <a:t>cipher modes of operation – CBC</a:t>
+              <a:t>Encryption: Block cipher modes of operation – CBC</a:t>
             </a:r>
             <a:endParaRPr lang="en-US" dirty="0"/>
           </a:p>
@@ -32654,15 +32644,7 @@
           <a:p>
             <a:r>
               <a:rPr lang="en-US" dirty="0" smtClean="0"/>
-              <a:t>Hash length extension: </a:t>
-            </a:r>
-            <a:r>
-              <a:rPr lang="en-US" dirty="0" smtClean="0"/>
-              <a:t>the </a:t>
-            </a:r>
-            <a:r>
-              <a:rPr lang="en-US" dirty="0" smtClean="0"/>
-              <a:t>setup</a:t>
+              <a:t>Hash length extension: the setup</a:t>
             </a:r>
             <a:endParaRPr lang="en-US" dirty="0"/>
           </a:p>
@@ -32903,17 +32885,7 @@
                 <a:latin typeface="Courier New" pitchFamily="49" charset="0"/>
                 <a:cs typeface="Courier New" pitchFamily="49" charset="0"/>
               </a:rPr>
-              <a:t>H(secret </a:t>
-            </a:r>
-            <a:r>
-              <a:rPr lang="en-US" sz="2000" b="1" dirty="0" smtClean="0">
-                <a:solidFill>
-                  <a:srgbClr val="C00000"/>
-                </a:solidFill>
-                <a:latin typeface="Courier New" pitchFamily="49" charset="0"/>
-                <a:cs typeface="Courier New" pitchFamily="49" charset="0"/>
-              </a:rPr>
-              <a:t>+ </a:t>
+              <a:t>H(secret + </a:t>
             </a:r>
             <a:r>
               <a:rPr lang="en-US" sz="2000" b="1" dirty="0" err="1">
@@ -35242,10 +35214,6 @@
               </a:rPr>
               <a:t>ed8873c107d882b7b6fcbbc19a272d614cf9e7ee</a:t>
             </a:r>
-            <a:endParaRPr lang="en-US" sz="1600" dirty="0">
-              <a:latin typeface="Courier New" pitchFamily="49" charset="0"/>
-              <a:cs typeface="Courier New" pitchFamily="49" charset="0"/>
-            </a:endParaRPr>
           </a:p>
         </p:txBody>
       </p:sp>
@@ -38845,11 +38813,7 @@
           <a:p>
             <a:r>
               <a:rPr lang="en-US" dirty="0" smtClean="0"/>
-              <a:t>“</a:t>
-            </a:r>
-            <a:r>
-              <a:rPr lang="en-US" dirty="0" smtClean="0"/>
-              <a:t>Eve”</a:t>
+              <a:t>“Eve”</a:t>
             </a:r>
             <a:endParaRPr lang="en-US" dirty="0"/>
           </a:p>
@@ -41981,7 +41945,7 @@
           <a:p>
             <a:r>
               <a:rPr lang="en-US" dirty="0" smtClean="0"/>
-              <a:t>Poor random numbers</a:t>
+              <a:t>Padding oracles</a:t>
             </a:r>
             <a:endParaRPr lang="en-US" dirty="0"/>
           </a:p>
@@ -42004,7 +41968,19 @@
           <a:p>
             <a:r>
               <a:rPr lang="en-US" dirty="0" smtClean="0"/>
-              <a:t>TODO, if needed</a:t>
+              <a:t>Hash extension attacks are fairly simple to understand – you just have to realize that hashes can “pick up where they left off”</a:t>
+            </a:r>
+          </a:p>
+          <a:p>
+            <a:r>
+              <a:rPr lang="en-US" dirty="0" smtClean="0"/>
+              <a:t>Padding oracles, on the other hand, require a bit more of a leap</a:t>
+            </a:r>
+          </a:p>
+          <a:p>
+            <a:r>
+              <a:rPr lang="en-US" dirty="0" smtClean="0"/>
+              <a:t>That being said, let’s do it!</a:t>
             </a:r>
             <a:endParaRPr lang="en-US" dirty="0"/>
           </a:p>
@@ -42013,7 +41989,7 @@
     </p:spTree>
     <p:extLst>
       <p:ext uri="{BB962C8B-B14F-4D97-AF65-F5344CB8AC3E}">
-        <p14:creationId xmlns:p14="http://schemas.microsoft.com/office/powerpoint/2010/main" val="662950098"/>
+        <p14:creationId xmlns:p14="http://schemas.microsoft.com/office/powerpoint/2010/main" val="3783387933"/>
       </p:ext>
     </p:extLst>
   </p:cSld>
@@ -42154,6 +42130,1376 @@
 </file>
 
 <file path=ppt/slides/slide70.xml><?xml version="1.0" encoding="utf-8"?>
+<p:sld xmlns:a="http://schemas.openxmlformats.org/drawingml/2006/main" xmlns:r="http://schemas.openxmlformats.org/officeDocument/2006/relationships" xmlns:p="http://schemas.openxmlformats.org/presentationml/2006/main">
+  <p:cSld>
+    <p:spTree>
+      <p:nvGrpSpPr>
+        <p:cNvPr id="1" name=""/>
+        <p:cNvGrpSpPr/>
+        <p:nvPr/>
+      </p:nvGrpSpPr>
+      <p:grpSpPr>
+        <a:xfrm>
+          <a:off x="0" y="0"/>
+          <a:ext cx="0" cy="0"/>
+          <a:chOff x="0" y="0"/>
+          <a:chExt cx="0" cy="0"/>
+        </a:xfrm>
+      </p:grpSpPr>
+      <p:sp>
+        <p:nvSpPr>
+          <p:cNvPr id="2" name="Title 1"/>
+          <p:cNvSpPr>
+            <a:spLocks noGrp="1"/>
+          </p:cNvSpPr>
+          <p:nvPr>
+            <p:ph type="title"/>
+          </p:nvPr>
+        </p:nvSpPr>
+        <p:spPr/>
+        <p:txBody>
+          <a:bodyPr/>
+          <a:lstStyle/>
+          <a:p>
+            <a:r>
+              <a:rPr lang="en-US" dirty="0" smtClean="0"/>
+              <a:t>Padding oracles: Overview</a:t>
+            </a:r>
+            <a:endParaRPr lang="en-US" dirty="0"/>
+          </a:p>
+        </p:txBody>
+      </p:sp>
+      <p:sp>
+        <p:nvSpPr>
+          <p:cNvPr id="3" name="Content Placeholder 2"/>
+          <p:cNvSpPr>
+            <a:spLocks noGrp="1"/>
+          </p:cNvSpPr>
+          <p:nvPr>
+            <p:ph idx="1"/>
+          </p:nvPr>
+        </p:nvSpPr>
+        <p:spPr/>
+        <p:txBody>
+          <a:bodyPr>
+            <a:normAutofit fontScale="85000" lnSpcReduction="20000"/>
+          </a:bodyPr>
+          <a:lstStyle/>
+          <a:p>
+            <a:r>
+              <a:rPr lang="en-US" dirty="0" smtClean="0"/>
+              <a:t>Not to be confused with the Oracle database…</a:t>
+            </a:r>
+          </a:p>
+          <a:p>
+            <a:r>
+              <a:rPr lang="en-US" dirty="0" smtClean="0"/>
+              <a:t>This isn’t an attack against any particular algorithm, but against cipher-block chaining (CBC)</a:t>
+            </a:r>
+          </a:p>
+          <a:p>
+            <a:r>
+              <a:rPr lang="en-US" dirty="0" smtClean="0"/>
+              <a:t>A padding oracle attack occurs when an attacker has encrypted and unknown data that he can ask a server to secretly decrypt</a:t>
+            </a:r>
+          </a:p>
+          <a:p>
+            <a:pPr lvl="1"/>
+            <a:r>
+              <a:rPr lang="en-US" dirty="0" smtClean="0"/>
+              <a:t>The data is a block cipher (DES, AES, </a:t>
+            </a:r>
+            <a:r>
+              <a:rPr lang="en-US" dirty="0" err="1" smtClean="0"/>
+              <a:t>etc</a:t>
+            </a:r>
+            <a:r>
+              <a:rPr lang="en-US" dirty="0" smtClean="0"/>
+              <a:t>) in CBC mode</a:t>
+            </a:r>
+            <a:endParaRPr lang="en-US" dirty="0"/>
+          </a:p>
+          <a:p>
+            <a:pPr lvl="1"/>
+            <a:r>
+              <a:rPr lang="en-US" dirty="0" smtClean="0"/>
+              <a:t>The server doesn’t give indication as to what the plaintext data is</a:t>
+            </a:r>
+          </a:p>
+          <a:p>
+            <a:pPr lvl="1"/>
+            <a:r>
+              <a:rPr lang="en-US" dirty="0" smtClean="0"/>
+              <a:t>The returns a </a:t>
+            </a:r>
+            <a:r>
+              <a:rPr lang="en-US" dirty="0" err="1" smtClean="0"/>
+              <a:t>boolean</a:t>
+            </a:r>
+            <a:r>
+              <a:rPr lang="en-US" dirty="0" smtClean="0"/>
+              <a:t> value indicating whether the decryption succeeded (which is based on the padding)</a:t>
+            </a:r>
+          </a:p>
+          <a:p>
+            <a:pPr lvl="1"/>
+            <a:r>
+              <a:rPr lang="en-US" dirty="0" smtClean="0"/>
+              <a:t>And that’s all you need to decrypt the data!</a:t>
+            </a:r>
+            <a:endParaRPr lang="en-US" dirty="0"/>
+          </a:p>
+        </p:txBody>
+      </p:sp>
+    </p:spTree>
+    <p:extLst>
+      <p:ext uri="{BB962C8B-B14F-4D97-AF65-F5344CB8AC3E}">
+        <p14:creationId xmlns:p14="http://schemas.microsoft.com/office/powerpoint/2010/main" val="3663286300"/>
+      </p:ext>
+    </p:extLst>
+  </p:cSld>
+  <p:clrMapOvr>
+    <a:masterClrMapping/>
+  </p:clrMapOvr>
+  <p:timing>
+    <p:tnLst>
+      <p:par>
+        <p:cTn id="1" dur="indefinite" restart="never" nodeType="tmRoot"/>
+      </p:par>
+    </p:tnLst>
+  </p:timing>
+</p:sld>
+</file>
+
+<file path=ppt/slides/slide71.xml><?xml version="1.0" encoding="utf-8"?>
+<p:sld xmlns:a="http://schemas.openxmlformats.org/drawingml/2006/main" xmlns:r="http://schemas.openxmlformats.org/officeDocument/2006/relationships" xmlns:p="http://schemas.openxmlformats.org/presentationml/2006/main">
+  <p:cSld>
+    <p:spTree>
+      <p:nvGrpSpPr>
+        <p:cNvPr id="1" name=""/>
+        <p:cNvGrpSpPr/>
+        <p:nvPr/>
+      </p:nvGrpSpPr>
+      <p:grpSpPr>
+        <a:xfrm>
+          <a:off x="0" y="0"/>
+          <a:ext cx="0" cy="0"/>
+          <a:chOff x="0" y="0"/>
+          <a:chExt cx="0" cy="0"/>
+        </a:xfrm>
+      </p:grpSpPr>
+      <p:sp>
+        <p:nvSpPr>
+          <p:cNvPr id="2" name="Title 1"/>
+          <p:cNvSpPr>
+            <a:spLocks noGrp="1"/>
+          </p:cNvSpPr>
+          <p:nvPr>
+            <p:ph type="title"/>
+          </p:nvPr>
+        </p:nvSpPr>
+        <p:spPr/>
+        <p:txBody>
+          <a:bodyPr/>
+          <a:lstStyle/>
+          <a:p>
+            <a:r>
+              <a:rPr lang="en-US" dirty="0" smtClean="0"/>
+              <a:t>Padding oracles: Padding</a:t>
+            </a:r>
+            <a:endParaRPr lang="en-US" dirty="0"/>
+          </a:p>
+        </p:txBody>
+      </p:sp>
+      <p:sp>
+        <p:nvSpPr>
+          <p:cNvPr id="3" name="Content Placeholder 2"/>
+          <p:cNvSpPr>
+            <a:spLocks noGrp="1"/>
+          </p:cNvSpPr>
+          <p:nvPr>
+            <p:ph idx="1"/>
+          </p:nvPr>
+        </p:nvSpPr>
+        <p:spPr/>
+        <p:txBody>
+          <a:bodyPr/>
+          <a:lstStyle/>
+          <a:p>
+            <a:r>
+              <a:rPr lang="en-US" smtClean="0"/>
+              <a:t>TODO</a:t>
+            </a:r>
+            <a:endParaRPr lang="en-US"/>
+          </a:p>
+        </p:txBody>
+      </p:sp>
+    </p:spTree>
+    <p:extLst>
+      <p:ext uri="{BB962C8B-B14F-4D97-AF65-F5344CB8AC3E}">
+        <p14:creationId xmlns:p14="http://schemas.microsoft.com/office/powerpoint/2010/main" val="2238917610"/>
+      </p:ext>
+    </p:extLst>
+  </p:cSld>
+  <p:clrMapOvr>
+    <a:masterClrMapping/>
+  </p:clrMapOvr>
+  <p:timing>
+    <p:tnLst>
+      <p:par>
+        <p:cTn id="1" dur="indefinite" restart="never" nodeType="tmRoot"/>
+      </p:par>
+    </p:tnLst>
+  </p:timing>
+</p:sld>
+</file>
+
+<file path=ppt/slides/slide72.xml><?xml version="1.0" encoding="utf-8"?>
+<p:sld xmlns:a="http://schemas.openxmlformats.org/drawingml/2006/main" xmlns:r="http://schemas.openxmlformats.org/officeDocument/2006/relationships" xmlns:p="http://schemas.openxmlformats.org/presentationml/2006/main">
+  <p:cSld>
+    <p:spTree>
+      <p:nvGrpSpPr>
+        <p:cNvPr id="1" name=""/>
+        <p:cNvGrpSpPr/>
+        <p:nvPr/>
+      </p:nvGrpSpPr>
+      <p:grpSpPr>
+        <a:xfrm>
+          <a:off x="0" y="0"/>
+          <a:ext cx="0" cy="0"/>
+          <a:chOff x="0" y="0"/>
+          <a:chExt cx="0" cy="0"/>
+        </a:xfrm>
+      </p:grpSpPr>
+      <p:pic>
+        <p:nvPicPr>
+          <p:cNvPr id="4" name="Picture 3"/>
+          <p:cNvPicPr>
+            <a:picLocks noChangeAspect="1"/>
+          </p:cNvPicPr>
+          <p:nvPr/>
+        </p:nvPicPr>
+        <p:blipFill>
+          <a:blip r:embed="rId2">
+            <a:extLst>
+              <a:ext uri="{28A0092B-C50C-407E-A947-70E740481C1C}">
+                <a14:useLocalDpi xmlns:a14="http://schemas.microsoft.com/office/drawing/2010/main" val="0"/>
+              </a:ext>
+            </a:extLst>
+          </a:blip>
+          <a:stretch>
+            <a:fillRect/>
+          </a:stretch>
+        </p:blipFill>
+        <p:spPr>
+          <a:xfrm>
+            <a:off x="1085385" y="2057400"/>
+            <a:ext cx="7527836" cy="3048000"/>
+          </a:xfrm>
+          <a:prstGeom prst="rect">
+            <a:avLst/>
+          </a:prstGeom>
+        </p:spPr>
+      </p:pic>
+      <p:sp>
+        <p:nvSpPr>
+          <p:cNvPr id="2" name="Title 1"/>
+          <p:cNvSpPr>
+            <a:spLocks noGrp="1"/>
+          </p:cNvSpPr>
+          <p:nvPr>
+            <p:ph type="title"/>
+          </p:nvPr>
+        </p:nvSpPr>
+        <p:spPr/>
+        <p:txBody>
+          <a:bodyPr>
+            <a:normAutofit fontScale="90000"/>
+          </a:bodyPr>
+          <a:lstStyle/>
+          <a:p>
+            <a:r>
+              <a:rPr lang="en-US" dirty="0" smtClean="0"/>
+              <a:t>Padding oracles: CBC mode encryption</a:t>
+            </a:r>
+            <a:endParaRPr lang="en-US" dirty="0"/>
+          </a:p>
+        </p:txBody>
+      </p:sp>
+      <p:sp>
+        <p:nvSpPr>
+          <p:cNvPr id="3" name="Content Placeholder 2"/>
+          <p:cNvSpPr>
+            <a:spLocks noGrp="1"/>
+          </p:cNvSpPr>
+          <p:nvPr>
+            <p:ph idx="1"/>
+          </p:nvPr>
+        </p:nvSpPr>
+        <p:spPr>
+          <a:xfrm>
+            <a:off x="457199" y="1600200"/>
+            <a:ext cx="7772401" cy="5029200"/>
+          </a:xfrm>
+        </p:spPr>
+        <p:txBody>
+          <a:bodyPr>
+            <a:normAutofit/>
+          </a:bodyPr>
+          <a:lstStyle/>
+          <a:p>
+            <a:r>
+              <a:rPr lang="en-US" sz="2400" dirty="0" smtClean="0"/>
+              <a:t>Let’s take a minute to review cipher-block chaining encryption</a:t>
+            </a:r>
+            <a:endParaRPr lang="en-US" sz="2400" dirty="0"/>
+          </a:p>
+          <a:p>
+            <a:endParaRPr lang="en-US" sz="2400" dirty="0" smtClean="0"/>
+          </a:p>
+          <a:p>
+            <a:endParaRPr lang="en-US" sz="2400" dirty="0"/>
+          </a:p>
+          <a:p>
+            <a:endParaRPr lang="en-US" sz="2400" dirty="0" smtClean="0"/>
+          </a:p>
+          <a:p>
+            <a:endParaRPr lang="en-US" sz="2400" dirty="0"/>
+          </a:p>
+          <a:p>
+            <a:endParaRPr lang="en-US" sz="2400" dirty="0" smtClean="0"/>
+          </a:p>
+          <a:p>
+            <a:endParaRPr lang="en-US" sz="2400" dirty="0"/>
+          </a:p>
+          <a:p>
+            <a:r>
+              <a:rPr lang="en-US" sz="2400" dirty="0" smtClean="0"/>
+              <a:t>For any given block of plaintext, </a:t>
+            </a:r>
+            <a:r>
+              <a:rPr lang="en-US" sz="2400" dirty="0" err="1" smtClean="0"/>
+              <a:t>P</a:t>
+            </a:r>
+            <a:r>
+              <a:rPr lang="en-US" sz="2400" baseline="-25000" dirty="0" err="1"/>
+              <a:t>n</a:t>
+            </a:r>
+            <a:r>
+              <a:rPr lang="en-US" sz="2400" dirty="0" smtClean="0"/>
+              <a:t>, the corresponding </a:t>
+            </a:r>
+            <a:r>
+              <a:rPr lang="en-US" sz="2400" dirty="0" err="1" smtClean="0"/>
+              <a:t>ciphertext</a:t>
+            </a:r>
+            <a:r>
+              <a:rPr lang="en-US" sz="2400" dirty="0" smtClean="0"/>
+              <a:t>, </a:t>
+            </a:r>
+            <a:r>
+              <a:rPr lang="en-US" sz="2400" dirty="0" err="1" smtClean="0"/>
+              <a:t>C</a:t>
+            </a:r>
+            <a:r>
+              <a:rPr lang="en-US" sz="2400" baseline="-25000" dirty="0" err="1"/>
+              <a:t>n</a:t>
+            </a:r>
+            <a:r>
+              <a:rPr lang="en-US" sz="2400" dirty="0" smtClean="0"/>
+              <a:t>, can be calculated as:</a:t>
+            </a:r>
+          </a:p>
+          <a:p>
+            <a:pPr lvl="1"/>
+            <a:r>
+              <a:rPr lang="en-US" sz="2000" dirty="0" err="1" smtClean="0"/>
+              <a:t>C</a:t>
+            </a:r>
+            <a:r>
+              <a:rPr lang="en-US" sz="2000" baseline="-25000" dirty="0" err="1"/>
+              <a:t>n</a:t>
+            </a:r>
+            <a:r>
+              <a:rPr lang="en-US" sz="2000" dirty="0" smtClean="0"/>
+              <a:t> = E(</a:t>
+            </a:r>
+            <a:r>
+              <a:rPr lang="en-US" sz="2000" dirty="0" err="1" smtClean="0"/>
+              <a:t>P</a:t>
+            </a:r>
+            <a:r>
+              <a:rPr lang="en-US" sz="2000" baseline="-25000" dirty="0" err="1"/>
+              <a:t>n</a:t>
+            </a:r>
+            <a:r>
+              <a:rPr lang="en-US" sz="2000" dirty="0" smtClean="0"/>
+              <a:t> XOR C</a:t>
+            </a:r>
+            <a:r>
+              <a:rPr lang="en-US" sz="2000" baseline="-25000" dirty="0" smtClean="0"/>
+              <a:t>n-1</a:t>
+            </a:r>
+            <a:r>
+              <a:rPr lang="en-US" sz="2000" dirty="0" smtClean="0"/>
+              <a:t>)</a:t>
+            </a:r>
+          </a:p>
+          <a:p>
+            <a:endParaRPr lang="en-US" sz="2400" dirty="0"/>
+          </a:p>
+        </p:txBody>
+      </p:sp>
+    </p:spTree>
+    <p:extLst>
+      <p:ext uri="{BB962C8B-B14F-4D97-AF65-F5344CB8AC3E}">
+        <p14:creationId xmlns:p14="http://schemas.microsoft.com/office/powerpoint/2010/main" val="3733747955"/>
+      </p:ext>
+    </p:extLst>
+  </p:cSld>
+  <p:clrMapOvr>
+    <a:masterClrMapping/>
+  </p:clrMapOvr>
+  <p:timing>
+    <p:tnLst>
+      <p:par>
+        <p:cTn id="1" dur="indefinite" restart="never" nodeType="tmRoot"/>
+      </p:par>
+    </p:tnLst>
+  </p:timing>
+</p:sld>
+</file>
+
+<file path=ppt/slides/slide73.xml><?xml version="1.0" encoding="utf-8"?>
+<p:sld xmlns:a="http://schemas.openxmlformats.org/drawingml/2006/main" xmlns:r="http://schemas.openxmlformats.org/officeDocument/2006/relationships" xmlns:p="http://schemas.openxmlformats.org/presentationml/2006/main">
+  <p:cSld>
+    <p:spTree>
+      <p:nvGrpSpPr>
+        <p:cNvPr id="1" name=""/>
+        <p:cNvGrpSpPr/>
+        <p:nvPr/>
+      </p:nvGrpSpPr>
+      <p:grpSpPr>
+        <a:xfrm>
+          <a:off x="0" y="0"/>
+          <a:ext cx="0" cy="0"/>
+          <a:chOff x="0" y="0"/>
+          <a:chExt cx="0" cy="0"/>
+        </a:xfrm>
+      </p:grpSpPr>
+      <p:sp>
+        <p:nvSpPr>
+          <p:cNvPr id="2" name="Title 1"/>
+          <p:cNvSpPr>
+            <a:spLocks noGrp="1"/>
+          </p:cNvSpPr>
+          <p:nvPr>
+            <p:ph type="title"/>
+          </p:nvPr>
+        </p:nvSpPr>
+        <p:spPr/>
+        <p:txBody>
+          <a:bodyPr>
+            <a:normAutofit fontScale="90000"/>
+          </a:bodyPr>
+          <a:lstStyle/>
+          <a:p>
+            <a:r>
+              <a:rPr lang="en-US" dirty="0" smtClean="0"/>
+              <a:t>Padding oracles: CBC mode decryption</a:t>
+            </a:r>
+            <a:endParaRPr lang="en-US" dirty="0"/>
+          </a:p>
+        </p:txBody>
+      </p:sp>
+      <p:sp>
+        <p:nvSpPr>
+          <p:cNvPr id="5" name="Content Placeholder 4"/>
+          <p:cNvSpPr>
+            <a:spLocks noGrp="1"/>
+          </p:cNvSpPr>
+          <p:nvPr>
+            <p:ph idx="1"/>
+          </p:nvPr>
+        </p:nvSpPr>
+        <p:spPr/>
+        <p:txBody>
+          <a:bodyPr>
+            <a:normAutofit fontScale="92500" lnSpcReduction="20000"/>
+          </a:bodyPr>
+          <a:lstStyle/>
+          <a:p>
+            <a:r>
+              <a:rPr lang="en-US" dirty="0" smtClean="0"/>
+              <a:t>Now let’s look at decryption:</a:t>
+            </a:r>
+          </a:p>
+          <a:p>
+            <a:endParaRPr lang="en-US" dirty="0"/>
+          </a:p>
+          <a:p>
+            <a:endParaRPr lang="en-US" dirty="0" smtClean="0"/>
+          </a:p>
+          <a:p>
+            <a:endParaRPr lang="en-US" dirty="0"/>
+          </a:p>
+          <a:p>
+            <a:endParaRPr lang="en-US" dirty="0" smtClean="0"/>
+          </a:p>
+          <a:p>
+            <a:endParaRPr lang="en-US" dirty="0"/>
+          </a:p>
+          <a:p>
+            <a:endParaRPr lang="en-US" dirty="0" smtClean="0"/>
+          </a:p>
+          <a:p>
+            <a:r>
+              <a:rPr lang="en-US" dirty="0" smtClean="0"/>
+              <a:t>For any given block of </a:t>
+            </a:r>
+            <a:r>
+              <a:rPr lang="en-US" dirty="0" err="1" smtClean="0"/>
+              <a:t>ciphertext</a:t>
+            </a:r>
+            <a:r>
+              <a:rPr lang="en-US" dirty="0" smtClean="0"/>
+              <a:t>, </a:t>
+            </a:r>
+            <a:r>
+              <a:rPr lang="en-US" dirty="0" err="1" smtClean="0"/>
+              <a:t>C</a:t>
+            </a:r>
+            <a:r>
+              <a:rPr lang="en-US" baseline="-25000" dirty="0" err="1"/>
+              <a:t>n</a:t>
+            </a:r>
+            <a:r>
+              <a:rPr lang="en-US" dirty="0" smtClean="0"/>
+              <a:t>, we can calculate the corresponding plaintext, </a:t>
+            </a:r>
+            <a:r>
+              <a:rPr lang="en-US" dirty="0" err="1" smtClean="0"/>
+              <a:t>P</a:t>
+            </a:r>
+            <a:r>
+              <a:rPr lang="en-US" baseline="-25000" dirty="0" err="1"/>
+              <a:t>n</a:t>
+            </a:r>
+            <a:r>
+              <a:rPr lang="en-US" dirty="0" smtClean="0"/>
+              <a:t>, as:</a:t>
+            </a:r>
+          </a:p>
+          <a:p>
+            <a:pPr lvl="1"/>
+            <a:r>
+              <a:rPr lang="en-US" dirty="0" err="1" smtClean="0"/>
+              <a:t>P</a:t>
+            </a:r>
+            <a:r>
+              <a:rPr lang="en-US" baseline="-25000" dirty="0" err="1"/>
+              <a:t>n</a:t>
+            </a:r>
+            <a:r>
+              <a:rPr lang="en-US" dirty="0" smtClean="0"/>
+              <a:t> = D(</a:t>
+            </a:r>
+            <a:r>
+              <a:rPr lang="en-US" dirty="0" err="1" smtClean="0"/>
+              <a:t>C</a:t>
+            </a:r>
+            <a:r>
+              <a:rPr lang="en-US" baseline="-25000" dirty="0" err="1"/>
+              <a:t>n</a:t>
+            </a:r>
+            <a:r>
+              <a:rPr lang="en-US" dirty="0" smtClean="0"/>
+              <a:t>) XOR C</a:t>
+            </a:r>
+            <a:r>
+              <a:rPr lang="en-US" baseline="-25000" dirty="0" smtClean="0"/>
+              <a:t>n-1</a:t>
+            </a:r>
+            <a:endParaRPr lang="en-US" dirty="0"/>
+          </a:p>
+        </p:txBody>
+      </p:sp>
+      <p:pic>
+        <p:nvPicPr>
+          <p:cNvPr id="6" name="Content Placeholder 3"/>
+          <p:cNvPicPr>
+            <a:picLocks noChangeAspect="1"/>
+          </p:cNvPicPr>
+          <p:nvPr/>
+        </p:nvPicPr>
+        <p:blipFill>
+          <a:blip r:embed="rId2">
+            <a:extLst>
+              <a:ext uri="{28A0092B-C50C-407E-A947-70E740481C1C}">
+                <a14:useLocalDpi xmlns:a14="http://schemas.microsoft.com/office/drawing/2010/main" val="0"/>
+              </a:ext>
+            </a:extLst>
+          </a:blip>
+          <a:stretch>
+            <a:fillRect/>
+          </a:stretch>
+        </p:blipFill>
+        <p:spPr>
+          <a:xfrm>
+            <a:off x="1143000" y="2133600"/>
+            <a:ext cx="7003942" cy="2590800"/>
+          </a:xfrm>
+          <a:prstGeom prst="rect">
+            <a:avLst/>
+          </a:prstGeom>
+        </p:spPr>
+      </p:pic>
+    </p:spTree>
+    <p:extLst>
+      <p:ext uri="{BB962C8B-B14F-4D97-AF65-F5344CB8AC3E}">
+        <p14:creationId xmlns:p14="http://schemas.microsoft.com/office/powerpoint/2010/main" val="3496864112"/>
+      </p:ext>
+    </p:extLst>
+  </p:cSld>
+  <p:clrMapOvr>
+    <a:masterClrMapping/>
+  </p:clrMapOvr>
+  <p:timing>
+    <p:tnLst>
+      <p:par>
+        <p:cTn id="1" dur="indefinite" restart="never" nodeType="tmRoot"/>
+      </p:par>
+    </p:tnLst>
+  </p:timing>
+</p:sld>
+</file>
+
+<file path=ppt/slides/slide74.xml><?xml version="1.0" encoding="utf-8"?>
+<p:sld xmlns:a="http://schemas.openxmlformats.org/drawingml/2006/main" xmlns:r="http://schemas.openxmlformats.org/officeDocument/2006/relationships" xmlns:p="http://schemas.openxmlformats.org/presentationml/2006/main">
+  <p:cSld>
+    <p:spTree>
+      <p:nvGrpSpPr>
+        <p:cNvPr id="1" name=""/>
+        <p:cNvGrpSpPr/>
+        <p:nvPr/>
+      </p:nvGrpSpPr>
+      <p:grpSpPr>
+        <a:xfrm>
+          <a:off x="0" y="0"/>
+          <a:ext cx="0" cy="0"/>
+          <a:chOff x="0" y="0"/>
+          <a:chExt cx="0" cy="0"/>
+        </a:xfrm>
+      </p:grpSpPr>
+      <p:sp>
+        <p:nvSpPr>
+          <p:cNvPr id="2" name="Title 1"/>
+          <p:cNvSpPr>
+            <a:spLocks noGrp="1"/>
+          </p:cNvSpPr>
+          <p:nvPr>
+            <p:ph type="title"/>
+          </p:nvPr>
+        </p:nvSpPr>
+        <p:spPr/>
+        <p:txBody>
+          <a:bodyPr/>
+          <a:lstStyle/>
+          <a:p>
+            <a:r>
+              <a:rPr lang="en-US" dirty="0" smtClean="0"/>
+              <a:t>Padding oracles</a:t>
+            </a:r>
+            <a:endParaRPr lang="en-US" dirty="0"/>
+          </a:p>
+        </p:txBody>
+      </p:sp>
+      <p:sp>
+        <p:nvSpPr>
+          <p:cNvPr id="3" name="Content Placeholder 2"/>
+          <p:cNvSpPr>
+            <a:spLocks noGrp="1"/>
+          </p:cNvSpPr>
+          <p:nvPr>
+            <p:ph idx="1"/>
+          </p:nvPr>
+        </p:nvSpPr>
+        <p:spPr/>
+        <p:txBody>
+          <a:bodyPr/>
+          <a:lstStyle/>
+          <a:p>
+            <a:r>
+              <a:rPr lang="en-US" dirty="0" smtClean="0"/>
+              <a:t>So, we have two formulas:</a:t>
+            </a:r>
+          </a:p>
+          <a:p>
+            <a:pPr lvl="1"/>
+            <a:r>
+              <a:rPr lang="en-US" dirty="0" err="1"/>
+              <a:t>C</a:t>
+            </a:r>
+            <a:r>
+              <a:rPr lang="en-US" baseline="-25000" dirty="0" err="1"/>
+              <a:t>n</a:t>
+            </a:r>
+            <a:r>
+              <a:rPr lang="en-US" dirty="0"/>
+              <a:t> = </a:t>
+            </a:r>
+            <a:r>
+              <a:rPr lang="en-US" dirty="0" smtClean="0">
+                <a:solidFill>
+                  <a:schemeClr val="accent3">
+                    <a:lumMod val="75000"/>
+                  </a:schemeClr>
+                </a:solidFill>
+              </a:rPr>
+              <a:t>E(</a:t>
+            </a:r>
+            <a:r>
+              <a:rPr lang="en-US" dirty="0" err="1" smtClean="0">
+                <a:solidFill>
+                  <a:schemeClr val="accent3">
+                    <a:lumMod val="75000"/>
+                  </a:schemeClr>
+                </a:solidFill>
+              </a:rPr>
+              <a:t>P</a:t>
+            </a:r>
+            <a:r>
+              <a:rPr lang="en-US" baseline="-25000" dirty="0" err="1">
+                <a:solidFill>
+                  <a:schemeClr val="accent3">
+                    <a:lumMod val="75000"/>
+                  </a:schemeClr>
+                </a:solidFill>
+              </a:rPr>
+              <a:t>n</a:t>
+            </a:r>
+            <a:r>
+              <a:rPr lang="en-US" dirty="0" smtClean="0">
+                <a:solidFill>
+                  <a:schemeClr val="accent3">
+                    <a:lumMod val="75000"/>
+                  </a:schemeClr>
+                </a:solidFill>
+              </a:rPr>
+              <a:t> </a:t>
+            </a:r>
+            <a:r>
+              <a:rPr lang="en-US" dirty="0">
+                <a:solidFill>
+                  <a:schemeClr val="accent3">
+                    <a:lumMod val="75000"/>
+                  </a:schemeClr>
+                </a:solidFill>
+              </a:rPr>
+              <a:t>XOR C</a:t>
+            </a:r>
+            <a:r>
+              <a:rPr lang="en-US" baseline="-25000" dirty="0">
+                <a:solidFill>
+                  <a:schemeClr val="accent3">
+                    <a:lumMod val="75000"/>
+                  </a:schemeClr>
+                </a:solidFill>
+              </a:rPr>
+              <a:t>n-1</a:t>
+            </a:r>
+            <a:r>
+              <a:rPr lang="en-US" dirty="0" smtClean="0">
+                <a:solidFill>
+                  <a:schemeClr val="accent3">
+                    <a:lumMod val="75000"/>
+                  </a:schemeClr>
+                </a:solidFill>
+              </a:rPr>
+              <a:t>)</a:t>
+            </a:r>
+          </a:p>
+          <a:p>
+            <a:pPr lvl="1"/>
+            <a:r>
+              <a:rPr lang="en-US" dirty="0" err="1"/>
+              <a:t>P</a:t>
+            </a:r>
+            <a:r>
+              <a:rPr lang="en-US" baseline="-25000" dirty="0" err="1"/>
+              <a:t>n</a:t>
+            </a:r>
+            <a:r>
+              <a:rPr lang="en-US" dirty="0"/>
+              <a:t> = </a:t>
+            </a:r>
+            <a:r>
+              <a:rPr lang="en-US" dirty="0">
+                <a:solidFill>
+                  <a:schemeClr val="accent2">
+                    <a:lumMod val="75000"/>
+                  </a:schemeClr>
+                </a:solidFill>
+              </a:rPr>
+              <a:t>D(</a:t>
+            </a:r>
+            <a:r>
+              <a:rPr lang="en-US" dirty="0" err="1">
+                <a:solidFill>
+                  <a:schemeClr val="accent2">
+                    <a:lumMod val="75000"/>
+                  </a:schemeClr>
+                </a:solidFill>
+              </a:rPr>
+              <a:t>C</a:t>
+            </a:r>
+            <a:r>
+              <a:rPr lang="en-US" baseline="-25000" dirty="0" err="1">
+                <a:solidFill>
+                  <a:schemeClr val="accent2">
+                    <a:lumMod val="75000"/>
+                  </a:schemeClr>
+                </a:solidFill>
+              </a:rPr>
+              <a:t>n</a:t>
+            </a:r>
+            <a:r>
+              <a:rPr lang="en-US" dirty="0">
+                <a:solidFill>
+                  <a:schemeClr val="accent2">
+                    <a:lumMod val="75000"/>
+                  </a:schemeClr>
+                </a:solidFill>
+              </a:rPr>
+              <a:t>) XOR C</a:t>
+            </a:r>
+            <a:r>
+              <a:rPr lang="en-US" baseline="-25000" dirty="0">
+                <a:solidFill>
+                  <a:schemeClr val="accent2">
+                    <a:lumMod val="75000"/>
+                  </a:schemeClr>
+                </a:solidFill>
+              </a:rPr>
+              <a:t>n-1</a:t>
+            </a:r>
+            <a:endParaRPr lang="en-US" dirty="0">
+              <a:solidFill>
+                <a:schemeClr val="accent2">
+                  <a:lumMod val="75000"/>
+                </a:schemeClr>
+              </a:solidFill>
+            </a:endParaRPr>
+          </a:p>
+          <a:p>
+            <a:r>
+              <a:rPr lang="en-US" dirty="0" smtClean="0"/>
+              <a:t>We can verify these make sense by encrypting and decrypting a block:</a:t>
+            </a:r>
+          </a:p>
+          <a:p>
+            <a:pPr lvl="1"/>
+            <a:r>
+              <a:rPr lang="en-US" dirty="0" err="1"/>
+              <a:t>P</a:t>
+            </a:r>
+            <a:r>
+              <a:rPr lang="en-US" baseline="-25000" dirty="0" err="1"/>
+              <a:t>n</a:t>
+            </a:r>
+            <a:r>
+              <a:rPr lang="en-US" dirty="0"/>
+              <a:t> = </a:t>
+            </a:r>
+            <a:r>
+              <a:rPr lang="en-US" dirty="0" smtClean="0">
+                <a:solidFill>
+                  <a:schemeClr val="accent2">
+                    <a:lumMod val="75000"/>
+                  </a:schemeClr>
+                </a:solidFill>
+              </a:rPr>
+              <a:t>D(</a:t>
+            </a:r>
+            <a:r>
+              <a:rPr lang="en-US" dirty="0" smtClean="0">
+                <a:solidFill>
+                  <a:schemeClr val="accent3">
+                    <a:lumMod val="75000"/>
+                  </a:schemeClr>
+                </a:solidFill>
+              </a:rPr>
+              <a:t>E(</a:t>
+            </a:r>
+            <a:r>
+              <a:rPr lang="en-US" dirty="0" err="1" smtClean="0">
+                <a:solidFill>
+                  <a:schemeClr val="accent3">
+                    <a:lumMod val="75000"/>
+                  </a:schemeClr>
+                </a:solidFill>
+              </a:rPr>
+              <a:t>P</a:t>
+            </a:r>
+            <a:r>
+              <a:rPr lang="en-US" baseline="-25000" dirty="0" err="1">
+                <a:solidFill>
+                  <a:schemeClr val="accent3">
+                    <a:lumMod val="75000"/>
+                  </a:schemeClr>
+                </a:solidFill>
+              </a:rPr>
+              <a:t>n</a:t>
+            </a:r>
+            <a:r>
+              <a:rPr lang="en-US" dirty="0" smtClean="0">
+                <a:solidFill>
+                  <a:schemeClr val="accent3">
+                    <a:lumMod val="75000"/>
+                  </a:schemeClr>
+                </a:solidFill>
+              </a:rPr>
+              <a:t> XOR C</a:t>
+            </a:r>
+            <a:r>
+              <a:rPr lang="en-US" baseline="-25000" dirty="0" smtClean="0">
+                <a:solidFill>
+                  <a:schemeClr val="accent3">
+                    <a:lumMod val="75000"/>
+                  </a:schemeClr>
+                </a:solidFill>
+              </a:rPr>
+              <a:t>n-1</a:t>
+            </a:r>
+            <a:r>
+              <a:rPr lang="en-US" dirty="0" smtClean="0">
+                <a:solidFill>
+                  <a:schemeClr val="accent3">
+                    <a:lumMod val="75000"/>
+                  </a:schemeClr>
+                </a:solidFill>
+              </a:rPr>
+              <a:t>)</a:t>
+            </a:r>
+            <a:r>
+              <a:rPr lang="en-US" dirty="0" smtClean="0">
+                <a:solidFill>
+                  <a:schemeClr val="accent2">
+                    <a:lumMod val="75000"/>
+                  </a:schemeClr>
+                </a:solidFill>
+              </a:rPr>
+              <a:t>) XOR C</a:t>
+            </a:r>
+            <a:r>
+              <a:rPr lang="en-US" baseline="-25000" dirty="0" smtClean="0">
+                <a:solidFill>
+                  <a:schemeClr val="accent2">
+                    <a:lumMod val="75000"/>
+                  </a:schemeClr>
+                </a:solidFill>
+              </a:rPr>
+              <a:t>n-1</a:t>
+            </a:r>
+            <a:endParaRPr lang="en-US" dirty="0">
+              <a:solidFill>
+                <a:schemeClr val="accent2">
+                  <a:lumMod val="75000"/>
+                </a:schemeClr>
+              </a:solidFill>
+            </a:endParaRPr>
+          </a:p>
+          <a:p>
+            <a:pPr lvl="1"/>
+            <a:r>
+              <a:rPr lang="en-US" dirty="0" err="1"/>
+              <a:t>P</a:t>
+            </a:r>
+            <a:r>
+              <a:rPr lang="en-US" baseline="-25000" dirty="0" err="1"/>
+              <a:t>n</a:t>
+            </a:r>
+            <a:r>
+              <a:rPr lang="en-US" dirty="0"/>
+              <a:t> </a:t>
+            </a:r>
+            <a:r>
+              <a:rPr lang="en-US" dirty="0" smtClean="0"/>
+              <a:t>= </a:t>
+            </a:r>
+            <a:r>
+              <a:rPr lang="en-US" dirty="0" err="1" smtClean="0">
+                <a:solidFill>
+                  <a:schemeClr val="accent3">
+                    <a:lumMod val="75000"/>
+                  </a:schemeClr>
+                </a:solidFill>
+              </a:rPr>
+              <a:t>P</a:t>
+            </a:r>
+            <a:r>
+              <a:rPr lang="en-US" baseline="-25000" dirty="0" err="1">
+                <a:solidFill>
+                  <a:schemeClr val="accent3">
+                    <a:lumMod val="75000"/>
+                  </a:schemeClr>
+                </a:solidFill>
+              </a:rPr>
+              <a:t>n</a:t>
+            </a:r>
+            <a:r>
+              <a:rPr lang="en-US" dirty="0" smtClean="0">
+                <a:solidFill>
+                  <a:schemeClr val="accent3">
+                    <a:lumMod val="75000"/>
+                  </a:schemeClr>
+                </a:solidFill>
+              </a:rPr>
+              <a:t> </a:t>
+            </a:r>
+            <a:r>
+              <a:rPr lang="en-US" dirty="0">
+                <a:solidFill>
+                  <a:schemeClr val="accent3">
+                    <a:lumMod val="75000"/>
+                  </a:schemeClr>
+                </a:solidFill>
+              </a:rPr>
+              <a:t>XOR </a:t>
+            </a:r>
+            <a:r>
+              <a:rPr lang="en-US" dirty="0" smtClean="0">
+                <a:solidFill>
+                  <a:schemeClr val="accent3">
+                    <a:lumMod val="75000"/>
+                  </a:schemeClr>
+                </a:solidFill>
+              </a:rPr>
+              <a:t>C</a:t>
+            </a:r>
+            <a:r>
+              <a:rPr lang="en-US" baseline="-25000" dirty="0" smtClean="0">
+                <a:solidFill>
+                  <a:schemeClr val="accent3">
+                    <a:lumMod val="75000"/>
+                  </a:schemeClr>
+                </a:solidFill>
+              </a:rPr>
+              <a:t>n-1 </a:t>
+            </a:r>
+            <a:r>
+              <a:rPr lang="en-US" dirty="0">
+                <a:solidFill>
+                  <a:schemeClr val="accent2">
+                    <a:lumMod val="75000"/>
+                  </a:schemeClr>
+                </a:solidFill>
+              </a:rPr>
+              <a:t>XOR </a:t>
+            </a:r>
+            <a:r>
+              <a:rPr lang="en-US" dirty="0" smtClean="0">
+                <a:solidFill>
+                  <a:schemeClr val="accent2">
+                    <a:lumMod val="75000"/>
+                  </a:schemeClr>
+                </a:solidFill>
+              </a:rPr>
+              <a:t>C</a:t>
+            </a:r>
+            <a:r>
+              <a:rPr lang="en-US" baseline="-25000" dirty="0" smtClean="0">
+                <a:solidFill>
+                  <a:schemeClr val="accent2">
+                    <a:lumMod val="75000"/>
+                  </a:schemeClr>
+                </a:solidFill>
+              </a:rPr>
+              <a:t>n-1</a:t>
+            </a:r>
+          </a:p>
+          <a:p>
+            <a:pPr lvl="1"/>
+            <a:r>
+              <a:rPr lang="en-US" dirty="0" err="1"/>
+              <a:t>P</a:t>
+            </a:r>
+            <a:r>
+              <a:rPr lang="en-US" baseline="-25000" dirty="0" err="1"/>
+              <a:t>n</a:t>
+            </a:r>
+            <a:r>
+              <a:rPr lang="en-US" dirty="0"/>
+              <a:t> </a:t>
+            </a:r>
+            <a:r>
+              <a:rPr lang="en-US" dirty="0" smtClean="0"/>
+              <a:t>= </a:t>
+            </a:r>
+            <a:r>
+              <a:rPr lang="en-US" dirty="0" err="1">
+                <a:solidFill>
+                  <a:schemeClr val="accent3">
+                    <a:lumMod val="75000"/>
+                  </a:schemeClr>
+                </a:solidFill>
+              </a:rPr>
+              <a:t>P</a:t>
+            </a:r>
+            <a:r>
+              <a:rPr lang="en-US" baseline="-25000" dirty="0" err="1">
+                <a:solidFill>
+                  <a:schemeClr val="accent3">
+                    <a:lumMod val="75000"/>
+                  </a:schemeClr>
+                </a:solidFill>
+              </a:rPr>
+              <a:t>n</a:t>
+            </a:r>
+            <a:endParaRPr lang="en-US" dirty="0"/>
+          </a:p>
+          <a:p>
+            <a:pPr lvl="1"/>
+            <a:endParaRPr lang="en-US" dirty="0" smtClean="0"/>
+          </a:p>
+          <a:p>
+            <a:endParaRPr lang="en-US" dirty="0"/>
+          </a:p>
+        </p:txBody>
+      </p:sp>
+      <p:sp>
+        <p:nvSpPr>
+          <p:cNvPr id="4" name="TextBox 3"/>
+          <p:cNvSpPr txBox="1"/>
+          <p:nvPr/>
+        </p:nvSpPr>
+        <p:spPr>
+          <a:xfrm>
+            <a:off x="5715000" y="4343400"/>
+            <a:ext cx="2743200" cy="369332"/>
+          </a:xfrm>
+          <a:prstGeom prst="rect">
+            <a:avLst/>
+          </a:prstGeom>
+        </p:spPr>
+        <p:style>
+          <a:lnRef idx="2">
+            <a:schemeClr val="dk1"/>
+          </a:lnRef>
+          <a:fillRef idx="1">
+            <a:schemeClr val="lt1"/>
+          </a:fillRef>
+          <a:effectRef idx="0">
+            <a:schemeClr val="dk1"/>
+          </a:effectRef>
+          <a:fontRef idx="minor">
+            <a:schemeClr val="dk1"/>
+          </a:fontRef>
+        </p:style>
+        <p:txBody>
+          <a:bodyPr wrap="square" rtlCol="0">
+            <a:spAutoFit/>
+          </a:bodyPr>
+          <a:lstStyle/>
+          <a:p>
+            <a:r>
+              <a:rPr lang="en-US" dirty="0" smtClean="0"/>
+              <a:t>Decrypt the encrypted data</a:t>
+            </a:r>
+            <a:endParaRPr lang="en-US" dirty="0"/>
+          </a:p>
+        </p:txBody>
+      </p:sp>
+      <p:sp>
+        <p:nvSpPr>
+          <p:cNvPr id="5" name="TextBox 4"/>
+          <p:cNvSpPr txBox="1"/>
+          <p:nvPr/>
+        </p:nvSpPr>
+        <p:spPr>
+          <a:xfrm>
+            <a:off x="4800600" y="4953000"/>
+            <a:ext cx="2209800" cy="369332"/>
+          </a:xfrm>
+          <a:prstGeom prst="rect">
+            <a:avLst/>
+          </a:prstGeom>
+        </p:spPr>
+        <p:style>
+          <a:lnRef idx="2">
+            <a:schemeClr val="dk1"/>
+          </a:lnRef>
+          <a:fillRef idx="1">
+            <a:schemeClr val="lt1"/>
+          </a:fillRef>
+          <a:effectRef idx="0">
+            <a:schemeClr val="dk1"/>
+          </a:effectRef>
+          <a:fontRef idx="minor">
+            <a:schemeClr val="dk1"/>
+          </a:fontRef>
+        </p:style>
+        <p:txBody>
+          <a:bodyPr wrap="square" rtlCol="0">
+            <a:spAutoFit/>
+          </a:bodyPr>
+          <a:lstStyle/>
+          <a:p>
+            <a:r>
+              <a:rPr lang="en-US" dirty="0" smtClean="0"/>
+              <a:t>Two XORs cancel out</a:t>
+            </a:r>
+            <a:endParaRPr lang="en-US" dirty="0"/>
+          </a:p>
+        </p:txBody>
+      </p:sp>
+      <p:sp>
+        <p:nvSpPr>
+          <p:cNvPr id="6" name="TextBox 5"/>
+          <p:cNvSpPr txBox="1"/>
+          <p:nvPr/>
+        </p:nvSpPr>
+        <p:spPr>
+          <a:xfrm>
+            <a:off x="2362200" y="5474732"/>
+            <a:ext cx="990600" cy="369332"/>
+          </a:xfrm>
+          <a:prstGeom prst="rect">
+            <a:avLst/>
+          </a:prstGeom>
+        </p:spPr>
+        <p:style>
+          <a:lnRef idx="2">
+            <a:schemeClr val="dk1"/>
+          </a:lnRef>
+          <a:fillRef idx="1">
+            <a:schemeClr val="lt1"/>
+          </a:fillRef>
+          <a:effectRef idx="0">
+            <a:schemeClr val="dk1"/>
+          </a:effectRef>
+          <a:fontRef idx="minor">
+            <a:schemeClr val="dk1"/>
+          </a:fontRef>
+        </p:style>
+        <p:txBody>
+          <a:bodyPr wrap="square" rtlCol="0">
+            <a:spAutoFit/>
+          </a:bodyPr>
+          <a:lstStyle/>
+          <a:p>
+            <a:r>
+              <a:rPr lang="en-US" dirty="0" smtClean="0"/>
+              <a:t>Success!</a:t>
+            </a:r>
+            <a:endParaRPr lang="en-US" dirty="0"/>
+          </a:p>
+        </p:txBody>
+      </p:sp>
+    </p:spTree>
+    <p:extLst>
+      <p:ext uri="{BB962C8B-B14F-4D97-AF65-F5344CB8AC3E}">
+        <p14:creationId xmlns:p14="http://schemas.microsoft.com/office/powerpoint/2010/main" val="3054862275"/>
+      </p:ext>
+    </p:extLst>
+  </p:cSld>
+  <p:clrMapOvr>
+    <a:masterClrMapping/>
+  </p:clrMapOvr>
+  <p:timing>
+    <p:tnLst>
+      <p:par>
+        <p:cTn id="1" dur="indefinite" restart="never" nodeType="tmRoot"/>
+      </p:par>
+    </p:tnLst>
+  </p:timing>
+</p:sld>
+</file>
+
+<file path=ppt/slides/slide75.xml><?xml version="1.0" encoding="utf-8"?>
+<p:sld xmlns:a="http://schemas.openxmlformats.org/drawingml/2006/main" xmlns:r="http://schemas.openxmlformats.org/officeDocument/2006/relationships" xmlns:p="http://schemas.openxmlformats.org/presentationml/2006/main">
+  <p:cSld>
+    <p:spTree>
+      <p:nvGrpSpPr>
+        <p:cNvPr id="1" name=""/>
+        <p:cNvGrpSpPr/>
+        <p:nvPr/>
+      </p:nvGrpSpPr>
+      <p:grpSpPr>
+        <a:xfrm>
+          <a:off x="0" y="0"/>
+          <a:ext cx="0" cy="0"/>
+          <a:chOff x="0" y="0"/>
+          <a:chExt cx="0" cy="0"/>
+        </a:xfrm>
+      </p:grpSpPr>
+      <p:sp>
+        <p:nvSpPr>
+          <p:cNvPr id="2" name="Title 1"/>
+          <p:cNvSpPr>
+            <a:spLocks noGrp="1"/>
+          </p:cNvSpPr>
+          <p:nvPr>
+            <p:ph type="title"/>
+          </p:nvPr>
+        </p:nvSpPr>
+        <p:spPr/>
+        <p:txBody>
+          <a:bodyPr/>
+          <a:lstStyle/>
+          <a:p>
+            <a:r>
+              <a:rPr lang="en-US" dirty="0" smtClean="0"/>
+              <a:t>Poor random numbers</a:t>
+            </a:r>
+            <a:endParaRPr lang="en-US" dirty="0"/>
+          </a:p>
+        </p:txBody>
+      </p:sp>
+      <p:sp>
+        <p:nvSpPr>
+          <p:cNvPr id="3" name="Content Placeholder 2"/>
+          <p:cNvSpPr>
+            <a:spLocks noGrp="1"/>
+          </p:cNvSpPr>
+          <p:nvPr>
+            <p:ph idx="1"/>
+          </p:nvPr>
+        </p:nvSpPr>
+        <p:spPr/>
+        <p:txBody>
+          <a:bodyPr/>
+          <a:lstStyle/>
+          <a:p>
+            <a:r>
+              <a:rPr lang="en-US" dirty="0" smtClean="0"/>
+              <a:t>TODO, if needed</a:t>
+            </a:r>
+            <a:endParaRPr lang="en-US" dirty="0"/>
+          </a:p>
+        </p:txBody>
+      </p:sp>
+    </p:spTree>
+    <p:extLst>
+      <p:ext uri="{BB962C8B-B14F-4D97-AF65-F5344CB8AC3E}">
+        <p14:creationId xmlns:p14="http://schemas.microsoft.com/office/powerpoint/2010/main" val="662950098"/>
+      </p:ext>
+    </p:extLst>
+  </p:cSld>
+  <p:clrMapOvr>
+    <a:masterClrMapping/>
+  </p:clrMapOvr>
+  <p:timing>
+    <p:tnLst>
+      <p:par>
+        <p:cTn id="1" dur="indefinite" restart="never" nodeType="tmRoot"/>
+      </p:par>
+    </p:tnLst>
+  </p:timing>
+</p:sld>
+</file>
+
+<file path=ppt/slides/slide76.xml><?xml version="1.0" encoding="utf-8"?>
 <p:sld xmlns:a="http://schemas.openxmlformats.org/drawingml/2006/main" xmlns:r="http://schemas.openxmlformats.org/officeDocument/2006/relationships" xmlns:p="http://schemas.openxmlformats.org/presentationml/2006/main">
   <p:cSld>
     <p:spTree>
@@ -42334,7 +43680,7 @@
 </p:sld>
 </file>
 
-<file path=ppt/slides/slide71.xml><?xml version="1.0" encoding="utf-8"?>
+<file path=ppt/slides/slide77.xml><?xml version="1.0" encoding="utf-8"?>
 <p:sld xmlns:a="http://schemas.openxmlformats.org/drawingml/2006/main" xmlns:r="http://schemas.openxmlformats.org/officeDocument/2006/relationships" xmlns:p="http://schemas.openxmlformats.org/presentationml/2006/main">
   <p:cSld>
     <p:spTree>
@@ -42413,7 +43759,7 @@
 </p:sld>
 </file>
 
-<file path=ppt/slides/slide72.xml><?xml version="1.0" encoding="utf-8"?>
+<file path=ppt/slides/slide78.xml><?xml version="1.0" encoding="utf-8"?>
 <p:sld xmlns:a="http://schemas.openxmlformats.org/drawingml/2006/main" xmlns:r="http://schemas.openxmlformats.org/officeDocument/2006/relationships" xmlns:p="http://schemas.openxmlformats.org/presentationml/2006/main">
   <p:cSld>
     <p:spTree>

</xml_diff>

<commit_message>
Finished the first draft of my talk
</commit_message>
<xml_diff>
--- a/Shmoocon.pptx
+++ b/Shmoocon.pptx
@@ -5,7 +5,7 @@
     <p:sldMasterId id="2147483708" r:id="rId1"/>
   </p:sldMasterIdLst>
   <p:notesMasterIdLst>
-    <p:notesMasterId r:id="rId94"/>
+    <p:notesMasterId r:id="rId103"/>
   </p:notesMasterIdLst>
   <p:sldIdLst>
     <p:sldId id="256" r:id="rId2"/>
@@ -32,9 +32,9 @@
     <p:sldId id="307" r:id="rId23"/>
     <p:sldId id="308" r:id="rId24"/>
     <p:sldId id="275" r:id="rId25"/>
-    <p:sldId id="276" r:id="rId26"/>
-    <p:sldId id="277" r:id="rId27"/>
-    <p:sldId id="287" r:id="rId28"/>
+    <p:sldId id="277" r:id="rId26"/>
+    <p:sldId id="287" r:id="rId27"/>
+    <p:sldId id="357" r:id="rId28"/>
     <p:sldId id="288" r:id="rId29"/>
     <p:sldId id="289" r:id="rId30"/>
     <p:sldId id="290" r:id="rId31"/>
@@ -53,8 +53,8 @@
     <p:sldId id="303" r:id="rId44"/>
     <p:sldId id="304" r:id="rId45"/>
     <p:sldId id="314" r:id="rId46"/>
-    <p:sldId id="305" r:id="rId47"/>
-    <p:sldId id="309" r:id="rId48"/>
+    <p:sldId id="358" r:id="rId47"/>
+    <p:sldId id="305" r:id="rId48"/>
     <p:sldId id="311" r:id="rId49"/>
     <p:sldId id="317" r:id="rId50"/>
     <p:sldId id="318" r:id="rId51"/>
@@ -96,10 +96,19 @@
     <p:sldId id="354" r:id="rId87"/>
     <p:sldId id="355" r:id="rId88"/>
     <p:sldId id="351" r:id="rId89"/>
-    <p:sldId id="356" r:id="rId90"/>
-    <p:sldId id="313" r:id="rId91"/>
-    <p:sldId id="315" r:id="rId92"/>
-    <p:sldId id="316" r:id="rId93"/>
+    <p:sldId id="359" r:id="rId90"/>
+    <p:sldId id="360" r:id="rId91"/>
+    <p:sldId id="356" r:id="rId92"/>
+    <p:sldId id="367" r:id="rId93"/>
+    <p:sldId id="313" r:id="rId94"/>
+    <p:sldId id="361" r:id="rId95"/>
+    <p:sldId id="365" r:id="rId96"/>
+    <p:sldId id="362" r:id="rId97"/>
+    <p:sldId id="364" r:id="rId98"/>
+    <p:sldId id="363" r:id="rId99"/>
+    <p:sldId id="366" r:id="rId100"/>
+    <p:sldId id="315" r:id="rId101"/>
+    <p:sldId id="316" r:id="rId102"/>
   </p:sldIdLst>
   <p:sldSz cx="9144000" cy="6858000" type="screen4x3"/>
   <p:notesSz cx="6858000" cy="9144000"/>
@@ -283,7 +292,7 @@
           <a:p>
             <a:fld id="{B518C13D-2B3F-42C3-B83D-5B01E1232990}" type="datetimeFigureOut">
               <a:rPr lang="en-US" smtClean="0"/>
-              <a:t>2/6/2013</a:t>
+              <a:t>2/9/2013</a:t>
             </a:fld>
             <a:endParaRPr lang="en-US"/>
           </a:p>
@@ -968,7 +977,7 @@
           <a:p>
             <a:fld id="{C7363F1F-ADBF-4FAE-A422-131859708330}" type="datetimeFigureOut">
               <a:rPr lang="en-US" smtClean="0"/>
-              <a:t>2/6/2013</a:t>
+              <a:t>2/9/2013</a:t>
             </a:fld>
             <a:endParaRPr lang="en-US"/>
           </a:p>
@@ -1138,7 +1147,7 @@
           <a:p>
             <a:fld id="{C7363F1F-ADBF-4FAE-A422-131859708330}" type="datetimeFigureOut">
               <a:rPr lang="en-US" smtClean="0"/>
-              <a:t>2/6/2013</a:t>
+              <a:t>2/9/2013</a:t>
             </a:fld>
             <a:endParaRPr lang="en-US"/>
           </a:p>
@@ -1318,7 +1327,7 @@
           <a:p>
             <a:fld id="{C7363F1F-ADBF-4FAE-A422-131859708330}" type="datetimeFigureOut">
               <a:rPr lang="en-US" smtClean="0"/>
-              <a:t>2/6/2013</a:t>
+              <a:t>2/9/2013</a:t>
             </a:fld>
             <a:endParaRPr lang="en-US"/>
           </a:p>
@@ -1488,7 +1497,7 @@
           <a:p>
             <a:fld id="{C7363F1F-ADBF-4FAE-A422-131859708330}" type="datetimeFigureOut">
               <a:rPr lang="en-US" smtClean="0"/>
-              <a:t>2/6/2013</a:t>
+              <a:t>2/9/2013</a:t>
             </a:fld>
             <a:endParaRPr lang="en-US"/>
           </a:p>
@@ -1734,7 +1743,7 @@
           <a:p>
             <a:fld id="{C7363F1F-ADBF-4FAE-A422-131859708330}" type="datetimeFigureOut">
               <a:rPr lang="en-US" smtClean="0"/>
-              <a:t>2/6/2013</a:t>
+              <a:t>2/9/2013</a:t>
             </a:fld>
             <a:endParaRPr lang="en-US"/>
           </a:p>
@@ -2022,7 +2031,7 @@
           <a:p>
             <a:fld id="{C7363F1F-ADBF-4FAE-A422-131859708330}" type="datetimeFigureOut">
               <a:rPr lang="en-US" smtClean="0"/>
-              <a:t>2/6/2013</a:t>
+              <a:t>2/9/2013</a:t>
             </a:fld>
             <a:endParaRPr lang="en-US"/>
           </a:p>
@@ -2444,7 +2453,7 @@
           <a:p>
             <a:fld id="{C7363F1F-ADBF-4FAE-A422-131859708330}" type="datetimeFigureOut">
               <a:rPr lang="en-US" smtClean="0"/>
-              <a:t>2/6/2013</a:t>
+              <a:t>2/9/2013</a:t>
             </a:fld>
             <a:endParaRPr lang="en-US"/>
           </a:p>
@@ -2562,7 +2571,7 @@
           <a:p>
             <a:fld id="{C7363F1F-ADBF-4FAE-A422-131859708330}" type="datetimeFigureOut">
               <a:rPr lang="en-US" smtClean="0"/>
-              <a:t>2/6/2013</a:t>
+              <a:t>2/9/2013</a:t>
             </a:fld>
             <a:endParaRPr lang="en-US"/>
           </a:p>
@@ -2657,7 +2666,7 @@
           <a:p>
             <a:fld id="{C7363F1F-ADBF-4FAE-A422-131859708330}" type="datetimeFigureOut">
               <a:rPr lang="en-US" smtClean="0"/>
-              <a:t>2/6/2013</a:t>
+              <a:t>2/9/2013</a:t>
             </a:fld>
             <a:endParaRPr lang="en-US"/>
           </a:p>
@@ -2934,7 +2943,7 @@
           <a:p>
             <a:fld id="{C7363F1F-ADBF-4FAE-A422-131859708330}" type="datetimeFigureOut">
               <a:rPr lang="en-US" smtClean="0"/>
-              <a:t>2/6/2013</a:t>
+              <a:t>2/9/2013</a:t>
             </a:fld>
             <a:endParaRPr lang="en-US"/>
           </a:p>
@@ -3187,7 +3196,7 @@
           <a:p>
             <a:fld id="{C7363F1F-ADBF-4FAE-A422-131859708330}" type="datetimeFigureOut">
               <a:rPr lang="en-US" smtClean="0"/>
-              <a:t>2/6/2013</a:t>
+              <a:t>2/9/2013</a:t>
             </a:fld>
             <a:endParaRPr lang="en-US"/>
           </a:p>
@@ -3400,7 +3409,7 @@
           <a:p>
             <a:fld id="{C7363F1F-ADBF-4FAE-A422-131859708330}" type="datetimeFigureOut">
               <a:rPr lang="en-US" smtClean="0"/>
-              <a:t>2/6/2013</a:t>
+              <a:t>2/9/2013</a:t>
             </a:fld>
             <a:endParaRPr lang="en-US"/>
           </a:p>
@@ -4042,6 +4051,588 @@
 </p:sld>
 </file>
 
+<file path=ppt/slides/slide100.xml><?xml version="1.0" encoding="utf-8"?>
+<p:sld xmlns:a="http://schemas.openxmlformats.org/drawingml/2006/main" xmlns:r="http://schemas.openxmlformats.org/officeDocument/2006/relationships" xmlns:p="http://schemas.openxmlformats.org/presentationml/2006/main">
+  <p:cSld>
+    <p:spTree>
+      <p:nvGrpSpPr>
+        <p:cNvPr id="1" name=""/>
+        <p:cNvGrpSpPr/>
+        <p:nvPr/>
+      </p:nvGrpSpPr>
+      <p:grpSpPr>
+        <a:xfrm>
+          <a:off x="0" y="0"/>
+          <a:ext cx="0" cy="0"/>
+          <a:chOff x="0" y="0"/>
+          <a:chExt cx="0" cy="0"/>
+        </a:xfrm>
+      </p:grpSpPr>
+      <p:sp>
+        <p:nvSpPr>
+          <p:cNvPr id="2" name="Title 1"/>
+          <p:cNvSpPr>
+            <a:spLocks noGrp="1"/>
+          </p:cNvSpPr>
+          <p:nvPr>
+            <p:ph type="title"/>
+          </p:nvPr>
+        </p:nvSpPr>
+        <p:spPr/>
+        <p:txBody>
+          <a:bodyPr/>
+          <a:lstStyle/>
+          <a:p>
+            <a:r>
+              <a:rPr lang="en-US" dirty="0" smtClean="0"/>
+              <a:t>That’s all!</a:t>
+            </a:r>
+            <a:endParaRPr lang="en-US" dirty="0"/>
+          </a:p>
+        </p:txBody>
+      </p:sp>
+      <p:pic>
+        <p:nvPicPr>
+          <p:cNvPr id="9218" name="Picture 2" descr="http://fun-gallery.com/wp-content/uploads/2011/09/Fast-And-Funny-640x469.jpg"/>
+          <p:cNvPicPr>
+            <a:picLocks noChangeAspect="1" noChangeArrowheads="1"/>
+          </p:cNvPicPr>
+          <p:nvPr/>
+        </p:nvPicPr>
+        <p:blipFill>
+          <a:blip r:embed="rId2">
+            <a:extLst>
+              <a:ext uri="{28A0092B-C50C-407E-A947-70E740481C1C}">
+                <a14:useLocalDpi xmlns:a14="http://schemas.microsoft.com/office/drawing/2010/main" val="0"/>
+              </a:ext>
+            </a:extLst>
+          </a:blip>
+          <a:srcRect/>
+          <a:stretch>
+            <a:fillRect/>
+          </a:stretch>
+        </p:blipFill>
+        <p:spPr bwMode="auto">
+          <a:xfrm>
+            <a:off x="1912434" y="152400"/>
+            <a:ext cx="5631366" cy="4126736"/>
+          </a:xfrm>
+          <a:prstGeom prst="rect">
+            <a:avLst/>
+          </a:prstGeom>
+          <a:noFill/>
+          <a:extLst>
+            <a:ext uri="{909E8E84-426E-40DD-AFC4-6F175D3DCCD1}">
+              <a14:hiddenFill xmlns:a14="http://schemas.microsoft.com/office/drawing/2010/main">
+                <a:solidFill>
+                  <a:srgbClr val="FFFFFF"/>
+                </a:solidFill>
+              </a14:hiddenFill>
+            </a:ext>
+          </a:extLst>
+        </p:spPr>
+      </p:pic>
+      <p:sp>
+        <p:nvSpPr>
+          <p:cNvPr id="4" name="Rectangle 3"/>
+          <p:cNvSpPr/>
+          <p:nvPr/>
+        </p:nvSpPr>
+        <p:spPr>
+          <a:xfrm>
+            <a:off x="3124200" y="152400"/>
+            <a:ext cx="1752600" cy="1219200"/>
+          </a:xfrm>
+          <a:prstGeom prst="rect">
+            <a:avLst/>
+          </a:prstGeom>
+          <a:noFill/>
+          <a:ln>
+            <a:solidFill>
+              <a:srgbClr val="FF0000"/>
+            </a:solidFill>
+          </a:ln>
+        </p:spPr>
+        <p:style>
+          <a:lnRef idx="2">
+            <a:schemeClr val="accent1">
+              <a:shade val="50000"/>
+            </a:schemeClr>
+          </a:lnRef>
+          <a:fillRef idx="1">
+            <a:schemeClr val="accent1"/>
+          </a:fillRef>
+          <a:effectRef idx="0">
+            <a:schemeClr val="accent1"/>
+          </a:effectRef>
+          <a:fontRef idx="minor">
+            <a:schemeClr val="lt1"/>
+          </a:fontRef>
+        </p:style>
+        <p:txBody>
+          <a:bodyPr rtlCol="0" anchor="ctr"/>
+          <a:lstStyle/>
+          <a:p>
+            <a:pPr algn="ctr"/>
+            <a:endParaRPr lang="en-US"/>
+          </a:p>
+        </p:txBody>
+      </p:sp>
+      <p:cxnSp>
+        <p:nvCxnSpPr>
+          <p:cNvPr id="6" name="Straight Connector 5"/>
+          <p:cNvCxnSpPr/>
+          <p:nvPr/>
+        </p:nvCxnSpPr>
+        <p:spPr>
+          <a:xfrm>
+            <a:off x="4876800" y="152400"/>
+            <a:ext cx="4285785" cy="2895600"/>
+          </a:xfrm>
+          <a:prstGeom prst="line">
+            <a:avLst/>
+          </a:prstGeom>
+          <a:ln w="28575">
+            <a:solidFill>
+              <a:srgbClr val="FF0000"/>
+            </a:solidFill>
+          </a:ln>
+        </p:spPr>
+        <p:style>
+          <a:lnRef idx="1">
+            <a:schemeClr val="accent1"/>
+          </a:lnRef>
+          <a:fillRef idx="0">
+            <a:schemeClr val="accent1"/>
+          </a:fillRef>
+          <a:effectRef idx="0">
+            <a:schemeClr val="accent1"/>
+          </a:effectRef>
+          <a:fontRef idx="minor">
+            <a:schemeClr val="tx1"/>
+          </a:fontRef>
+        </p:style>
+      </p:cxnSp>
+      <p:cxnSp>
+        <p:nvCxnSpPr>
+          <p:cNvPr id="10" name="Straight Connector 9"/>
+          <p:cNvCxnSpPr/>
+          <p:nvPr/>
+        </p:nvCxnSpPr>
+        <p:spPr>
+          <a:xfrm>
+            <a:off x="3124200" y="1371600"/>
+            <a:ext cx="1466385" cy="4724400"/>
+          </a:xfrm>
+          <a:prstGeom prst="line">
+            <a:avLst/>
+          </a:prstGeom>
+          <a:ln w="28575">
+            <a:solidFill>
+              <a:srgbClr val="FF0000"/>
+            </a:solidFill>
+          </a:ln>
+        </p:spPr>
+        <p:style>
+          <a:lnRef idx="1">
+            <a:schemeClr val="accent1"/>
+          </a:lnRef>
+          <a:fillRef idx="0">
+            <a:schemeClr val="accent1"/>
+          </a:fillRef>
+          <a:effectRef idx="0">
+            <a:schemeClr val="accent1"/>
+          </a:effectRef>
+          <a:fontRef idx="minor">
+            <a:schemeClr val="tx1"/>
+          </a:fontRef>
+        </p:style>
+      </p:cxnSp>
+      <p:cxnSp>
+        <p:nvCxnSpPr>
+          <p:cNvPr id="15" name="Straight Connector 14"/>
+          <p:cNvCxnSpPr/>
+          <p:nvPr/>
+        </p:nvCxnSpPr>
+        <p:spPr>
+          <a:xfrm>
+            <a:off x="3124200" y="152400"/>
+            <a:ext cx="1466385" cy="2895600"/>
+          </a:xfrm>
+          <a:prstGeom prst="line">
+            <a:avLst/>
+          </a:prstGeom>
+          <a:ln w="28575">
+            <a:solidFill>
+              <a:srgbClr val="FF0000"/>
+            </a:solidFill>
+          </a:ln>
+        </p:spPr>
+        <p:style>
+          <a:lnRef idx="1">
+            <a:schemeClr val="accent1"/>
+          </a:lnRef>
+          <a:fillRef idx="0">
+            <a:schemeClr val="accent1"/>
+          </a:fillRef>
+          <a:effectRef idx="0">
+            <a:schemeClr val="accent1"/>
+          </a:effectRef>
+          <a:fontRef idx="minor">
+            <a:schemeClr val="tx1"/>
+          </a:fontRef>
+        </p:style>
+      </p:cxnSp>
+      <p:cxnSp>
+        <p:nvCxnSpPr>
+          <p:cNvPr id="18" name="Straight Connector 17"/>
+          <p:cNvCxnSpPr/>
+          <p:nvPr/>
+        </p:nvCxnSpPr>
+        <p:spPr>
+          <a:xfrm>
+            <a:off x="4876801" y="1371600"/>
+            <a:ext cx="4285784" cy="4724400"/>
+          </a:xfrm>
+          <a:prstGeom prst="line">
+            <a:avLst/>
+          </a:prstGeom>
+          <a:ln w="28575">
+            <a:solidFill>
+              <a:srgbClr val="FF0000"/>
+            </a:solidFill>
+          </a:ln>
+        </p:spPr>
+        <p:style>
+          <a:lnRef idx="1">
+            <a:schemeClr val="accent1"/>
+          </a:lnRef>
+          <a:fillRef idx="0">
+            <a:schemeClr val="accent1"/>
+          </a:fillRef>
+          <a:effectRef idx="0">
+            <a:schemeClr val="accent1"/>
+          </a:effectRef>
+          <a:fontRef idx="minor">
+            <a:schemeClr val="tx1"/>
+          </a:fontRef>
+        </p:style>
+      </p:cxnSp>
+      <p:pic>
+        <p:nvPicPr>
+          <p:cNvPr id="9220" name="Picture 4" descr="http://fun-gallery.com/wp-content/uploads/2011/09/Running-Race-Finish-Line-Funny-Picture.jpg"/>
+          <p:cNvPicPr>
+            <a:picLocks noChangeAspect="1" noChangeArrowheads="1"/>
+          </p:cNvPicPr>
+          <p:nvPr/>
+        </p:nvPicPr>
+        <p:blipFill>
+          <a:blip r:embed="rId3">
+            <a:extLst>
+              <a:ext uri="{28A0092B-C50C-407E-A947-70E740481C1C}">
+                <a14:useLocalDpi xmlns:a14="http://schemas.microsoft.com/office/drawing/2010/main" val="0"/>
+              </a:ext>
+            </a:extLst>
+          </a:blip>
+          <a:srcRect/>
+          <a:stretch>
+            <a:fillRect/>
+          </a:stretch>
+        </p:blipFill>
+        <p:spPr bwMode="auto">
+          <a:xfrm>
+            <a:off x="4590585" y="3048000"/>
+            <a:ext cx="4572000" cy="3048000"/>
+          </a:xfrm>
+          <a:prstGeom prst="rect">
+            <a:avLst/>
+          </a:prstGeom>
+          <a:solidFill>
+            <a:srgbClr val="FFFFFF">
+              <a:shade val="85000"/>
+            </a:srgbClr>
+          </a:solidFill>
+          <a:ln w="19050" cap="sq">
+            <a:solidFill>
+              <a:srgbClr val="FF0000"/>
+            </a:solidFill>
+            <a:miter lim="800000"/>
+          </a:ln>
+          <a:effectLst>
+            <a:outerShdw blurRad="55000" dist="18000" dir="5400000" algn="tl" rotWithShape="0">
+              <a:srgbClr val="000000">
+                <a:alpha val="40000"/>
+              </a:srgbClr>
+            </a:outerShdw>
+          </a:effectLst>
+          <a:scene3d>
+            <a:camera prst="orthographicFront"/>
+            <a:lightRig rig="twoPt" dir="t">
+              <a:rot lat="0" lon="0" rev="7200000"/>
+            </a:lightRig>
+          </a:scene3d>
+          <a:sp3d>
+            <a:bevelT w="25400" h="19050"/>
+            <a:contourClr>
+              <a:srgbClr val="FFFFFF"/>
+            </a:contourClr>
+          </a:sp3d>
+          <a:extLst>
+            <a:ext uri="{909E8E84-426E-40DD-AFC4-6F175D3DCCD1}">
+              <a14:hiddenFill xmlns:a14="http://schemas.microsoft.com/office/drawing/2010/main">
+                <a:solidFill>
+                  <a:srgbClr val="FFFFFF"/>
+                </a:solidFill>
+              </a14:hiddenFill>
+            </a:ext>
+          </a:extLst>
+        </p:spPr>
+      </p:pic>
+    </p:spTree>
+    <p:extLst>
+      <p:ext uri="{BB962C8B-B14F-4D97-AF65-F5344CB8AC3E}">
+        <p14:creationId xmlns:p14="http://schemas.microsoft.com/office/powerpoint/2010/main" val="2565735704"/>
+      </p:ext>
+    </p:extLst>
+  </p:cSld>
+  <p:clrMapOvr>
+    <a:masterClrMapping/>
+  </p:clrMapOvr>
+  <p:timing>
+    <p:tnLst>
+      <p:par>
+        <p:cTn id="1" dur="indefinite" restart="never" nodeType="tmRoot"/>
+      </p:par>
+    </p:tnLst>
+  </p:timing>
+</p:sld>
+</file>
+
+<file path=ppt/slides/slide101.xml><?xml version="1.0" encoding="utf-8"?>
+<p:sld xmlns:a="http://schemas.openxmlformats.org/drawingml/2006/main" xmlns:r="http://schemas.openxmlformats.org/officeDocument/2006/relationships" xmlns:p="http://schemas.openxmlformats.org/presentationml/2006/main">
+  <p:cSld>
+    <p:spTree>
+      <p:nvGrpSpPr>
+        <p:cNvPr id="1" name=""/>
+        <p:cNvGrpSpPr/>
+        <p:nvPr/>
+      </p:nvGrpSpPr>
+      <p:grpSpPr>
+        <a:xfrm>
+          <a:off x="0" y="0"/>
+          <a:ext cx="0" cy="0"/>
+          <a:chOff x="0" y="0"/>
+          <a:chExt cx="0" cy="0"/>
+        </a:xfrm>
+      </p:grpSpPr>
+      <p:sp>
+        <p:nvSpPr>
+          <p:cNvPr id="4" name="Title 3"/>
+          <p:cNvSpPr>
+            <a:spLocks noGrp="1"/>
+          </p:cNvSpPr>
+          <p:nvPr>
+            <p:ph type="title"/>
+          </p:nvPr>
+        </p:nvSpPr>
+        <p:spPr/>
+        <p:txBody>
+          <a:bodyPr/>
+          <a:lstStyle/>
+          <a:p>
+            <a:r>
+              <a:rPr lang="en-US" dirty="0" smtClean="0"/>
+              <a:t>Links + Contact info</a:t>
+            </a:r>
+            <a:endParaRPr lang="en-US" dirty="0"/>
+          </a:p>
+        </p:txBody>
+      </p:sp>
+      <p:sp>
+        <p:nvSpPr>
+          <p:cNvPr id="5" name="Content Placeholder 4"/>
+          <p:cNvSpPr>
+            <a:spLocks noGrp="1"/>
+          </p:cNvSpPr>
+          <p:nvPr>
+            <p:ph idx="1"/>
+          </p:nvPr>
+        </p:nvSpPr>
+        <p:spPr/>
+        <p:txBody>
+          <a:bodyPr>
+            <a:normAutofit fontScale="85000" lnSpcReduction="20000"/>
+          </a:bodyPr>
+          <a:lstStyle/>
+          <a:p>
+            <a:r>
+              <a:rPr lang="en-US" dirty="0" smtClean="0"/>
+              <a:t>Me:</a:t>
+            </a:r>
+          </a:p>
+          <a:p>
+            <a:pPr lvl="1"/>
+            <a:r>
+              <a:rPr lang="en-US" dirty="0" smtClean="0"/>
+              <a:t>Ron Bowes &lt;</a:t>
+            </a:r>
+            <a:r>
+              <a:rPr lang="en-US" dirty="0" smtClean="0">
+                <a:hlinkClick r:id="rId2"/>
+              </a:rPr>
+              <a:t>ron@skullsecurity.net</a:t>
+            </a:r>
+            <a:r>
+              <a:rPr lang="en-US" dirty="0" smtClean="0"/>
+              <a:t>&gt;</a:t>
+            </a:r>
+          </a:p>
+          <a:p>
+            <a:pPr lvl="1"/>
+            <a:r>
+              <a:rPr lang="en-US" dirty="0" smtClean="0"/>
+              <a:t>@iagox86</a:t>
+            </a:r>
+          </a:p>
+          <a:p>
+            <a:pPr lvl="1"/>
+            <a:r>
+              <a:rPr lang="en-US" dirty="0" smtClean="0">
+                <a:hlinkClick r:id="rId3"/>
+              </a:rPr>
+              <a:t>http://www.skullsecurity.org</a:t>
+            </a:r>
+            <a:endParaRPr lang="en-US" dirty="0" smtClean="0"/>
+          </a:p>
+          <a:p>
+            <a:pPr lvl="1"/>
+            <a:r>
+              <a:rPr lang="en-US" dirty="0" smtClean="0">
+                <a:hlinkClick r:id="rId4"/>
+              </a:rPr>
+              <a:t>http://www.leviathansecurity.com</a:t>
+            </a:r>
+            <a:endParaRPr lang="en-US" dirty="0" smtClean="0"/>
+          </a:p>
+          <a:p>
+            <a:r>
+              <a:rPr lang="en-US" dirty="0" smtClean="0"/>
+              <a:t>Tools released:</a:t>
+            </a:r>
+          </a:p>
+          <a:p>
+            <a:pPr lvl="1"/>
+            <a:r>
+              <a:rPr lang="en-US" dirty="0" smtClean="0">
+                <a:hlinkClick r:id="rId5"/>
+              </a:rPr>
+              <a:t>https://www.github.com/iagox86/prephixer</a:t>
+            </a:r>
+            <a:r>
+              <a:rPr lang="en-US" dirty="0" smtClean="0"/>
+              <a:t> </a:t>
+            </a:r>
+          </a:p>
+          <a:p>
+            <a:pPr lvl="1"/>
+            <a:r>
+              <a:rPr lang="en-US" dirty="0">
+                <a:hlinkClick r:id="rId6"/>
+              </a:rPr>
+              <a:t>https://</a:t>
+            </a:r>
+            <a:r>
+              <a:rPr lang="en-US" dirty="0" smtClean="0">
+                <a:hlinkClick r:id="rId6"/>
+              </a:rPr>
+              <a:t>www.github.com/iagox86/poracle</a:t>
+            </a:r>
+            <a:endParaRPr lang="en-US" dirty="0" smtClean="0"/>
+          </a:p>
+          <a:p>
+            <a:pPr lvl="1"/>
+            <a:r>
+              <a:rPr lang="en-US" dirty="0">
+                <a:hlinkClick r:id="rId7"/>
+              </a:rPr>
+              <a:t>https://</a:t>
+            </a:r>
+            <a:r>
+              <a:rPr lang="en-US" dirty="0" smtClean="0">
+                <a:hlinkClick r:id="rId7"/>
+              </a:rPr>
+              <a:t>www.github.com/iagox86/hash_extender</a:t>
+            </a:r>
+            <a:r>
+              <a:rPr lang="en-US" dirty="0" smtClean="0"/>
+              <a:t> </a:t>
+            </a:r>
+          </a:p>
+          <a:p>
+            <a:pPr lvl="1"/>
+            <a:r>
+              <a:rPr lang="en-US" dirty="0">
+                <a:hlinkClick r:id="rId8"/>
+              </a:rPr>
+              <a:t>https://</a:t>
+            </a:r>
+            <a:r>
+              <a:rPr lang="en-US" dirty="0" smtClean="0">
+                <a:hlinkClick r:id="rId8"/>
+              </a:rPr>
+              <a:t>www.github.com/iagox86/unzipher</a:t>
+            </a:r>
+            <a:r>
+              <a:rPr lang="en-US" dirty="0" smtClean="0"/>
+              <a:t> </a:t>
+            </a:r>
+            <a:endParaRPr lang="en-US" dirty="0" smtClean="0"/>
+          </a:p>
+          <a:p>
+            <a:r>
+              <a:rPr lang="en-US" dirty="0" smtClean="0"/>
+              <a:t>This talk will be on </a:t>
+            </a:r>
+            <a:r>
+              <a:rPr lang="en-US" dirty="0" smtClean="0">
+                <a:hlinkClick r:id="rId9"/>
+              </a:rPr>
+              <a:t>https://www.github.com/iagox86</a:t>
+            </a:r>
+            <a:r>
+              <a:rPr lang="en-US" dirty="0" smtClean="0"/>
+              <a:t> as well</a:t>
+            </a:r>
+            <a:endParaRPr lang="en-US" dirty="0" smtClean="0"/>
+          </a:p>
+          <a:p>
+            <a:endParaRPr lang="en-US" dirty="0" smtClean="0"/>
+          </a:p>
+          <a:p>
+            <a:endParaRPr lang="en-US" dirty="0"/>
+          </a:p>
+        </p:txBody>
+      </p:sp>
+    </p:spTree>
+    <p:extLst>
+      <p:ext uri="{BB962C8B-B14F-4D97-AF65-F5344CB8AC3E}">
+        <p14:creationId xmlns:p14="http://schemas.microsoft.com/office/powerpoint/2010/main" val="4232121080"/>
+      </p:ext>
+    </p:extLst>
+  </p:cSld>
+  <p:clrMapOvr>
+    <a:masterClrMapping/>
+  </p:clrMapOvr>
+  <p:timing>
+    <p:tnLst>
+      <p:par>
+        <p:cTn id="1" dur="indefinite" restart="never" nodeType="tmRoot"/>
+      </p:par>
+    </p:tnLst>
+  </p:timing>
+</p:sld>
+</file>
+
 <file path=ppt/slides/slide11.xml><?xml version="1.0" encoding="utf-8"?>
 <p:sld xmlns:a="http://schemas.openxmlformats.org/drawingml/2006/main" xmlns:r="http://schemas.openxmlformats.org/officeDocument/2006/relationships" xmlns:p="http://schemas.openxmlformats.org/presentationml/2006/main">
   <p:cSld>
@@ -6032,6 +6623,36 @@
           </a:p>
         </p:txBody>
       </p:sp>
+      <p:pic>
+        <p:nvPicPr>
+          <p:cNvPr id="2" name="Picture 1"/>
+          <p:cNvPicPr>
+            <a:picLocks noChangeAspect="1"/>
+          </p:cNvPicPr>
+          <p:nvPr/>
+        </p:nvPicPr>
+        <p:blipFill>
+          <a:blip r:embed="rId2" cstate="print">
+            <a:extLst>
+              <a:ext uri="{28A0092B-C50C-407E-A947-70E740481C1C}">
+                <a14:useLocalDpi xmlns:a14="http://schemas.microsoft.com/office/drawing/2010/main" val="0"/>
+              </a:ext>
+            </a:extLst>
+          </a:blip>
+          <a:stretch>
+            <a:fillRect/>
+          </a:stretch>
+        </p:blipFill>
+        <p:spPr>
+          <a:xfrm>
+            <a:off x="2133600" y="76200"/>
+            <a:ext cx="4419600" cy="3264611"/>
+          </a:xfrm>
+          <a:prstGeom prst="rect">
+            <a:avLst/>
+          </a:prstGeom>
+        </p:spPr>
+      </p:pic>
     </p:spTree>
     <p:extLst>
       <p:ext uri="{BB962C8B-B14F-4D97-AF65-F5344CB8AC3E}">
@@ -6394,7 +7015,7 @@
           <p:nvPr>
             <p:extLst>
               <p:ext uri="{D42A27DB-BD31-4B8C-83A1-F6EECF244321}">
-                <p14:modId xmlns:p14="http://schemas.microsoft.com/office/powerpoint/2010/main" val="2253760423"/>
+                <p14:modId xmlns:p14="http://schemas.microsoft.com/office/powerpoint/2010/main" val="1970755997"/>
               </p:ext>
             </p:extLst>
           </p:nvPr>
@@ -7259,12 +7880,18 @@
                     <a:p>
                       <a:pPr algn="l" fontAlgn="b"/>
                       <a:r>
-                        <a:rPr lang="en-US" sz="2000" u="none" strike="noStrike">
+                        <a:rPr lang="en-US" sz="2000" u="none" strike="noStrike" dirty="0" err="1" smtClean="0">
                           <a:effectLst/>
                         </a:rPr>
                         <a:t>Keystream</a:t>
                       </a:r>
-                      <a:endParaRPr lang="en-US" sz="2000" b="0" i="0" u="none" strike="noStrike">
+                      <a:r>
+                        <a:rPr lang="en-US" sz="2000" u="none" strike="noStrike" dirty="0" smtClean="0">
+                          <a:effectLst/>
+                        </a:rPr>
+                        <a:t> (again)</a:t>
+                      </a:r>
+                      <a:endParaRPr lang="en-US" sz="2000" b="0" i="0" u="none" strike="noStrike" dirty="0">
                         <a:solidFill>
                           <a:srgbClr val="000000"/>
                         </a:solidFill>
@@ -8494,89 +9121,6 @@
           <a:p>
             <a:r>
               <a:rPr lang="en-US" dirty="0" smtClean="0"/>
-              <a:t>Random numbers</a:t>
-            </a:r>
-            <a:endParaRPr lang="en-US" dirty="0"/>
-          </a:p>
-        </p:txBody>
-      </p:sp>
-      <p:sp>
-        <p:nvSpPr>
-          <p:cNvPr id="3" name="Content Placeholder 2"/>
-          <p:cNvSpPr>
-            <a:spLocks noGrp="1"/>
-          </p:cNvSpPr>
-          <p:nvPr>
-            <p:ph idx="1"/>
-          </p:nvPr>
-        </p:nvSpPr>
-        <p:spPr/>
-        <p:txBody>
-          <a:bodyPr/>
-          <a:lstStyle/>
-          <a:p>
-            <a:r>
-              <a:rPr lang="en-US" dirty="0" smtClean="0"/>
-              <a:t>TODO, if needed</a:t>
-            </a:r>
-            <a:endParaRPr lang="en-US" dirty="0"/>
-          </a:p>
-        </p:txBody>
-      </p:sp>
-    </p:spTree>
-    <p:extLst>
-      <p:ext uri="{BB962C8B-B14F-4D97-AF65-F5344CB8AC3E}">
-        <p14:creationId xmlns:p14="http://schemas.microsoft.com/office/powerpoint/2010/main" val="4133354445"/>
-      </p:ext>
-    </p:extLst>
-  </p:cSld>
-  <p:clrMapOvr>
-    <a:masterClrMapping/>
-  </p:clrMapOvr>
-  <p:timing>
-    <p:tnLst>
-      <p:par>
-        <p:cTn id="1" dur="indefinite" restart="never" nodeType="tmRoot"/>
-      </p:par>
-    </p:tnLst>
-  </p:timing>
-</p:sld>
-</file>
-
-<file path=ppt/slides/slide26.xml><?xml version="1.0" encoding="utf-8"?>
-<p:sld xmlns:a="http://schemas.openxmlformats.org/drawingml/2006/main" xmlns:r="http://schemas.openxmlformats.org/officeDocument/2006/relationships" xmlns:p="http://schemas.openxmlformats.org/presentationml/2006/main">
-  <p:cSld>
-    <p:spTree>
-      <p:nvGrpSpPr>
-        <p:cNvPr id="1" name=""/>
-        <p:cNvGrpSpPr/>
-        <p:nvPr/>
-      </p:nvGrpSpPr>
-      <p:grpSpPr>
-        <a:xfrm>
-          <a:off x="0" y="0"/>
-          <a:ext cx="0" cy="0"/>
-          <a:chOff x="0" y="0"/>
-          <a:chExt cx="0" cy="0"/>
-        </a:xfrm>
-      </p:grpSpPr>
-      <p:sp>
-        <p:nvSpPr>
-          <p:cNvPr id="2" name="Title 1"/>
-          <p:cNvSpPr>
-            <a:spLocks noGrp="1"/>
-          </p:cNvSpPr>
-          <p:nvPr>
-            <p:ph type="title"/>
-          </p:nvPr>
-        </p:nvSpPr>
-        <p:spPr/>
-        <p:txBody>
-          <a:bodyPr/>
-          <a:lstStyle/>
-          <a:p>
-            <a:r>
-              <a:rPr lang="en-US" dirty="0" smtClean="0"/>
               <a:t>Attacks</a:t>
             </a:r>
             <a:endParaRPr lang="en-US" dirty="0"/>
@@ -8598,6 +9142,10 @@
           <a:bodyPr/>
           <a:lstStyle/>
           <a:p>
+            <a:r>
+              <a:rPr lang="en-US" dirty="0" smtClean="0"/>
+              <a:t>Now, what you all came here for…</a:t>
+            </a:r>
             <a:endParaRPr lang="en-US" dirty="0"/>
           </a:p>
         </p:txBody>
@@ -8652,7 +9200,7 @@
 </p:sld>
 </file>
 
-<file path=ppt/slides/slide27.xml><?xml version="1.0" encoding="utf-8"?>
+<file path=ppt/slides/slide26.xml><?xml version="1.0" encoding="utf-8"?>
 <p:sld xmlns:a="http://schemas.openxmlformats.org/drawingml/2006/main" xmlns:r="http://schemas.openxmlformats.org/officeDocument/2006/relationships" xmlns:p="http://schemas.openxmlformats.org/presentationml/2006/main">
   <p:cSld>
     <p:spTree>
@@ -8747,7 +9295,7 @@
               <a:t>C = (P </a:t>
             </a:r>
             <a:r>
-              <a:rPr lang="en-US" sz="3200" dirty="0"/>
+              <a:rPr lang="en-US" sz="3200" dirty="0" smtClean="0"/>
               <a:t>⊕ K</a:t>
             </a:r>
             <a:r>
@@ -9077,6 +9625,126 @@
 </p:sld>
 </file>
 
+<file path=ppt/slides/slide27.xml><?xml version="1.0" encoding="utf-8"?>
+<p:sld xmlns:a="http://schemas.openxmlformats.org/drawingml/2006/main" xmlns:r="http://schemas.openxmlformats.org/officeDocument/2006/relationships" xmlns:p="http://schemas.openxmlformats.org/presentationml/2006/main">
+  <p:cSld>
+    <p:spTree>
+      <p:nvGrpSpPr>
+        <p:cNvPr id="1" name=""/>
+        <p:cNvGrpSpPr/>
+        <p:nvPr/>
+      </p:nvGrpSpPr>
+      <p:grpSpPr>
+        <a:xfrm>
+          <a:off x="0" y="0"/>
+          <a:ext cx="0" cy="0"/>
+          <a:chOff x="0" y="0"/>
+          <a:chExt cx="0" cy="0"/>
+        </a:xfrm>
+      </p:grpSpPr>
+      <p:sp>
+        <p:nvSpPr>
+          <p:cNvPr id="2" name="Title 1"/>
+          <p:cNvSpPr>
+            <a:spLocks noGrp="1"/>
+          </p:cNvSpPr>
+          <p:nvPr>
+            <p:ph type="title"/>
+          </p:nvPr>
+        </p:nvSpPr>
+        <p:spPr/>
+        <p:txBody>
+          <a:bodyPr/>
+          <a:lstStyle/>
+          <a:p>
+            <a:r>
+              <a:rPr lang="en-US" dirty="0" smtClean="0"/>
+              <a:t>That’s a lot of math!</a:t>
+            </a:r>
+            <a:endParaRPr lang="en-US" dirty="0"/>
+          </a:p>
+        </p:txBody>
+      </p:sp>
+      <p:sp>
+        <p:nvSpPr>
+          <p:cNvPr id="3" name="Content Placeholder 2"/>
+          <p:cNvSpPr>
+            <a:spLocks noGrp="1"/>
+          </p:cNvSpPr>
+          <p:nvPr>
+            <p:ph idx="1"/>
+          </p:nvPr>
+        </p:nvSpPr>
+        <p:spPr/>
+        <p:txBody>
+          <a:bodyPr/>
+          <a:lstStyle/>
+          <a:p>
+            <a:endParaRPr lang="en-US"/>
+          </a:p>
+        </p:txBody>
+      </p:sp>
+      <p:pic>
+        <p:nvPicPr>
+          <p:cNvPr id="4" name="Picture 2" descr="http://www.troll.me/images/holy-shit-batman/holy-math-batman.jpg"/>
+          <p:cNvPicPr>
+            <a:picLocks noChangeAspect="1" noChangeArrowheads="1"/>
+          </p:cNvPicPr>
+          <p:nvPr/>
+        </p:nvPicPr>
+        <p:blipFill>
+          <a:blip r:embed="rId2">
+            <a:extLst>
+              <a:ext uri="{28A0092B-C50C-407E-A947-70E740481C1C}">
+                <a14:useLocalDpi xmlns:a14="http://schemas.microsoft.com/office/drawing/2010/main" val="0"/>
+              </a:ext>
+            </a:extLst>
+          </a:blip>
+          <a:srcRect/>
+          <a:stretch>
+            <a:fillRect/>
+          </a:stretch>
+        </p:blipFill>
+        <p:spPr bwMode="auto">
+          <a:xfrm>
+            <a:off x="1497067" y="1447800"/>
+            <a:ext cx="6276480" cy="4698846"/>
+          </a:xfrm>
+          <a:prstGeom prst="rect">
+            <a:avLst/>
+          </a:prstGeom>
+          <a:noFill/>
+          <a:extLst>
+            <a:ext uri="{909E8E84-426E-40DD-AFC4-6F175D3DCCD1}">
+              <a14:hiddenFill xmlns:a14="http://schemas.microsoft.com/office/drawing/2010/main">
+                <a:solidFill>
+                  <a:srgbClr val="FFFFFF"/>
+                </a:solidFill>
+              </a14:hiddenFill>
+            </a:ext>
+          </a:extLst>
+        </p:spPr>
+      </p:pic>
+    </p:spTree>
+    <p:extLst>
+      <p:ext uri="{BB962C8B-B14F-4D97-AF65-F5344CB8AC3E}">
+        <p14:creationId xmlns:p14="http://schemas.microsoft.com/office/powerpoint/2010/main" val="1394211600"/>
+      </p:ext>
+    </p:extLst>
+  </p:cSld>
+  <p:clrMapOvr>
+    <a:masterClrMapping/>
+  </p:clrMapOvr>
+  <p:timing>
+    <p:tnLst>
+      <p:par>
+        <p:cTn id="1" dur="indefinite" restart="never" nodeType="tmRoot"/>
+      </p:par>
+    </p:tnLst>
+  </p:timing>
+</p:sld>
+</file>
+
 <file path=ppt/slides/slide28.xml><?xml version="1.0" encoding="utf-8"?>
 <p:sld xmlns:a="http://schemas.openxmlformats.org/drawingml/2006/main" xmlns:r="http://schemas.openxmlformats.org/officeDocument/2006/relationships" xmlns:p="http://schemas.openxmlformats.org/presentationml/2006/main">
   <p:cSld>
@@ -10639,7 +11307,7 @@
         <p:spPr/>
         <p:txBody>
           <a:bodyPr>
-            <a:normAutofit lnSpcReduction="10000"/>
+            <a:normAutofit/>
           </a:bodyPr>
           <a:lstStyle/>
           <a:p>
@@ -10651,7 +11319,11 @@
           <a:p>
             <a:r>
               <a:rPr lang="en-US" dirty="0" smtClean="0"/>
-              <a:t>A bunch of examples, with proofs of concept</a:t>
+              <a:t>A bunch of examples, with proofs of </a:t>
+            </a:r>
+            <a:r>
+              <a:rPr lang="en-US" dirty="0" smtClean="0"/>
+              <a:t>concept</a:t>
             </a:r>
           </a:p>
           <a:p>
@@ -10660,6 +11332,7 @@
               <a:rPr lang="en-US" dirty="0" smtClean="0"/>
               <a:t>Bit flipping</a:t>
             </a:r>
+            <a:endParaRPr lang="en-US" dirty="0" smtClean="0"/>
           </a:p>
           <a:p>
             <a:pPr lvl="1"/>
@@ -10667,34 +11340,30 @@
               <a:rPr lang="en-US" dirty="0" smtClean="0"/>
               <a:t>Key re-use</a:t>
             </a:r>
+            <a:endParaRPr lang="en-US" dirty="0" smtClean="0"/>
           </a:p>
           <a:p>
             <a:pPr lvl="1"/>
             <a:r>
               <a:rPr lang="en-US" dirty="0" smtClean="0"/>
-              <a:t>Compression attack</a:t>
+              <a:t>Padding </a:t>
+            </a:r>
+            <a:r>
+              <a:rPr lang="en-US" dirty="0" smtClean="0"/>
+              <a:t>oracle</a:t>
             </a:r>
           </a:p>
           <a:p>
             <a:pPr lvl="1"/>
             <a:r>
               <a:rPr lang="en-US" dirty="0" smtClean="0"/>
-              <a:t>Padding oracle</a:t>
-            </a:r>
-          </a:p>
-          <a:p>
-            <a:pPr lvl="1"/>
+              <a:t>Hash length </a:t>
+            </a:r>
             <a:r>
               <a:rPr lang="en-US" dirty="0" smtClean="0"/>
-              <a:t>Hash length extension</a:t>
-            </a:r>
-          </a:p>
-          <a:p>
-            <a:pPr lvl="1"/>
-            <a:r>
-              <a:rPr lang="en-US" dirty="0" smtClean="0"/>
-              <a:t>Bad random numbers</a:t>
-            </a:r>
+              <a:t>extension</a:t>
+            </a:r>
+            <a:endParaRPr lang="en-US" dirty="0" smtClean="0"/>
           </a:p>
           <a:p>
             <a:r>
@@ -32227,6 +32896,138 @@
         </p:nvSpPr>
         <p:spPr/>
         <p:txBody>
+          <a:bodyPr/>
+          <a:lstStyle/>
+          <a:p>
+            <a:r>
+              <a:rPr lang="en-US" dirty="0" smtClean="0"/>
+              <a:t>Phew, we made it!</a:t>
+            </a:r>
+            <a:endParaRPr lang="en-US" dirty="0"/>
+          </a:p>
+        </p:txBody>
+      </p:sp>
+      <p:sp>
+        <p:nvSpPr>
+          <p:cNvPr id="3" name="Content Placeholder 2"/>
+          <p:cNvSpPr>
+            <a:spLocks noGrp="1"/>
+          </p:cNvSpPr>
+          <p:nvPr>
+            <p:ph idx="1"/>
+          </p:nvPr>
+        </p:nvSpPr>
+        <p:spPr/>
+        <p:txBody>
+          <a:bodyPr/>
+          <a:lstStyle/>
+          <a:p>
+            <a:r>
+              <a:rPr lang="en-US" dirty="0" smtClean="0"/>
+              <a:t>Let’s do a demo of </a:t>
+            </a:r>
+            <a:r>
+              <a:rPr lang="en-US" dirty="0" err="1" smtClean="0"/>
+              <a:t>Prephixer</a:t>
+            </a:r>
+            <a:r>
+              <a:rPr lang="en-US" dirty="0" smtClean="0"/>
+              <a:t>!</a:t>
+            </a:r>
+            <a:endParaRPr lang="en-US" dirty="0"/>
+          </a:p>
+        </p:txBody>
+      </p:sp>
+      <p:pic>
+        <p:nvPicPr>
+          <p:cNvPr id="3074" name="Picture 2" descr="https://encrypted-tbn0.gstatic.com/images?q=tbn:ANd9GcQ6bdYBItr0MdRYd_iSgEvHN2bnnCkDEJJZ1dACv-XA7r8_2XfKsQ"/>
+          <p:cNvPicPr>
+            <a:picLocks noChangeAspect="1" noChangeArrowheads="1"/>
+          </p:cNvPicPr>
+          <p:nvPr/>
+        </p:nvPicPr>
+        <p:blipFill>
+          <a:blip r:embed="rId2">
+            <a:extLst>
+              <a:ext uri="{28A0092B-C50C-407E-A947-70E740481C1C}">
+                <a14:useLocalDpi xmlns:a14="http://schemas.microsoft.com/office/drawing/2010/main" val="0"/>
+              </a:ext>
+            </a:extLst>
+          </a:blip>
+          <a:srcRect/>
+          <a:stretch>
+            <a:fillRect/>
+          </a:stretch>
+        </p:blipFill>
+        <p:spPr bwMode="auto">
+          <a:xfrm>
+            <a:off x="5629275" y="2667000"/>
+            <a:ext cx="3514725" cy="4105275"/>
+          </a:xfrm>
+          <a:prstGeom prst="rect">
+            <a:avLst/>
+          </a:prstGeom>
+          <a:noFill/>
+          <a:extLst>
+            <a:ext uri="{909E8E84-426E-40DD-AFC4-6F175D3DCCD1}">
+              <a14:hiddenFill xmlns:a14="http://schemas.microsoft.com/office/drawing/2010/main">
+                <a:solidFill>
+                  <a:srgbClr val="FFFFFF"/>
+                </a:solidFill>
+              </a14:hiddenFill>
+            </a:ext>
+          </a:extLst>
+        </p:spPr>
+      </p:pic>
+    </p:spTree>
+    <p:extLst>
+      <p:ext uri="{BB962C8B-B14F-4D97-AF65-F5344CB8AC3E}">
+        <p14:creationId xmlns:p14="http://schemas.microsoft.com/office/powerpoint/2010/main" val="2913889897"/>
+      </p:ext>
+    </p:extLst>
+  </p:cSld>
+  <p:clrMapOvr>
+    <a:masterClrMapping/>
+  </p:clrMapOvr>
+  <p:timing>
+    <p:tnLst>
+      <p:par>
+        <p:cTn id="1" dur="indefinite" restart="never" nodeType="tmRoot"/>
+      </p:par>
+    </p:tnLst>
+  </p:timing>
+</p:sld>
+</file>
+
+<file path=ppt/slides/slide47.xml><?xml version="1.0" encoding="utf-8"?>
+<p:sld xmlns:a="http://schemas.openxmlformats.org/drawingml/2006/main" xmlns:r="http://schemas.openxmlformats.org/officeDocument/2006/relationships" xmlns:p="http://schemas.openxmlformats.org/presentationml/2006/main">
+  <p:cSld>
+    <p:spTree>
+      <p:nvGrpSpPr>
+        <p:cNvPr id="1" name=""/>
+        <p:cNvGrpSpPr/>
+        <p:nvPr/>
+      </p:nvGrpSpPr>
+      <p:grpSpPr>
+        <a:xfrm>
+          <a:off x="0" y="0"/>
+          <a:ext cx="0" cy="0"/>
+          <a:chOff x="0" y="0"/>
+          <a:chExt cx="0" cy="0"/>
+        </a:xfrm>
+      </p:grpSpPr>
+      <p:sp>
+        <p:nvSpPr>
+          <p:cNvPr id="2" name="Title 1"/>
+          <p:cNvSpPr>
+            <a:spLocks noGrp="1"/>
+          </p:cNvSpPr>
+          <p:nvPr>
+            <p:ph type="title"/>
+          </p:nvPr>
+        </p:nvSpPr>
+        <p:spPr/>
+        <p:txBody>
           <a:bodyPr>
             <a:normAutofit fontScale="90000"/>
           </a:bodyPr>
@@ -32439,89 +33240,6 @@
 </p:sld>
 </file>
 
-<file path=ppt/slides/slide47.xml><?xml version="1.0" encoding="utf-8"?>
-<p:sld xmlns:a="http://schemas.openxmlformats.org/drawingml/2006/main" xmlns:r="http://schemas.openxmlformats.org/officeDocument/2006/relationships" xmlns:p="http://schemas.openxmlformats.org/presentationml/2006/main">
-  <p:cSld>
-    <p:spTree>
-      <p:nvGrpSpPr>
-        <p:cNvPr id="1" name=""/>
-        <p:cNvGrpSpPr/>
-        <p:nvPr/>
-      </p:nvGrpSpPr>
-      <p:grpSpPr>
-        <a:xfrm>
-          <a:off x="0" y="0"/>
-          <a:ext cx="0" cy="0"/>
-          <a:chOff x="0" y="0"/>
-          <a:chExt cx="0" cy="0"/>
-        </a:xfrm>
-      </p:grpSpPr>
-      <p:sp>
-        <p:nvSpPr>
-          <p:cNvPr id="2" name="Title 1"/>
-          <p:cNvSpPr>
-            <a:spLocks noGrp="1"/>
-          </p:cNvSpPr>
-          <p:nvPr>
-            <p:ph type="title"/>
-          </p:nvPr>
-        </p:nvSpPr>
-        <p:spPr/>
-        <p:txBody>
-          <a:bodyPr/>
-          <a:lstStyle/>
-          <a:p>
-            <a:r>
-              <a:rPr lang="en-US" dirty="0" smtClean="0"/>
-              <a:t>Compression attack</a:t>
-            </a:r>
-            <a:endParaRPr lang="en-US" dirty="0"/>
-          </a:p>
-        </p:txBody>
-      </p:sp>
-      <p:sp>
-        <p:nvSpPr>
-          <p:cNvPr id="3" name="Content Placeholder 2"/>
-          <p:cNvSpPr>
-            <a:spLocks noGrp="1"/>
-          </p:cNvSpPr>
-          <p:nvPr>
-            <p:ph idx="1"/>
-          </p:nvPr>
-        </p:nvSpPr>
-        <p:spPr/>
-        <p:txBody>
-          <a:bodyPr/>
-          <a:lstStyle/>
-          <a:p>
-            <a:r>
-              <a:rPr lang="en-US" dirty="0" smtClean="0"/>
-              <a:t>TODO, if we need to fill space</a:t>
-            </a:r>
-            <a:endParaRPr lang="en-US" dirty="0"/>
-          </a:p>
-        </p:txBody>
-      </p:sp>
-    </p:spTree>
-    <p:extLst>
-      <p:ext uri="{BB962C8B-B14F-4D97-AF65-F5344CB8AC3E}">
-        <p14:creationId xmlns:p14="http://schemas.microsoft.com/office/powerpoint/2010/main" val="2049538152"/>
-      </p:ext>
-    </p:extLst>
-  </p:cSld>
-  <p:clrMapOvr>
-    <a:masterClrMapping/>
-  </p:clrMapOvr>
-  <p:timing>
-    <p:tnLst>
-      <p:par>
-        <p:cTn id="1" dur="indefinite" restart="never" nodeType="tmRoot"/>
-      </p:par>
-    </p:tnLst>
-  </p:timing>
-</p:sld>
-</file>
-
 <file path=ppt/slides/slide48.xml><?xml version="1.0" encoding="utf-8"?>
 <p:sld xmlns:a="http://schemas.openxmlformats.org/drawingml/2006/main" xmlns:r="http://schemas.openxmlformats.org/officeDocument/2006/relationships" xmlns:p="http://schemas.openxmlformats.org/presentationml/2006/main">
   <p:cSld>
@@ -32749,7 +33467,17 @@
                 <a:latin typeface="Courier New" pitchFamily="49" charset="0"/>
                 <a:cs typeface="Courier New" pitchFamily="49" charset="0"/>
               </a:rPr>
-              <a:t>H(secret + </a:t>
+              <a:t>H(secret </a:t>
+            </a:r>
+            <a:r>
+              <a:rPr lang="en-US" sz="2000" b="1" dirty="0" smtClean="0">
+                <a:solidFill>
+                  <a:srgbClr val="C00000"/>
+                </a:solidFill>
+                <a:latin typeface="Courier New" pitchFamily="49" charset="0"/>
+                <a:cs typeface="Courier New" pitchFamily="49" charset="0"/>
+              </a:rPr>
+              <a:t>|| </a:t>
             </a:r>
             <a:r>
               <a:rPr lang="en-US" sz="2000" b="1" dirty="0" err="1" smtClean="0">
@@ -32899,7 +33627,17 @@
                 <a:latin typeface="Courier New" pitchFamily="49" charset="0"/>
                 <a:cs typeface="Courier New" pitchFamily="49" charset="0"/>
               </a:rPr>
-              <a:t>H(secret + </a:t>
+              <a:t>H(secret </a:t>
+            </a:r>
+            <a:r>
+              <a:rPr lang="en-US" sz="2000" b="1" dirty="0" smtClean="0">
+                <a:solidFill>
+                  <a:srgbClr val="C00000"/>
+                </a:solidFill>
+                <a:latin typeface="Courier New" pitchFamily="49" charset="0"/>
+                <a:cs typeface="Courier New" pitchFamily="49" charset="0"/>
+              </a:rPr>
+              <a:t>|| </a:t>
             </a:r>
             <a:r>
               <a:rPr lang="en-US" sz="2000" b="1" dirty="0" err="1">
@@ -38155,21 +38893,21 @@
           <a:lstStyle/>
           <a:p>
             <a:r>
-              <a:rPr lang="en-US" sz="2400" dirty="0" smtClean="0"/>
+              <a:rPr lang="en-US" sz="2800" dirty="0" smtClean="0"/>
               <a:t>Let’s say you have an API that requires a shared secret</a:t>
             </a:r>
           </a:p>
           <a:p>
             <a:pPr lvl="1"/>
             <a:r>
-              <a:rPr lang="en-US" sz="1600" b="1" dirty="0" smtClean="0">
+              <a:rPr lang="en-US" sz="1800" b="1" dirty="0" smtClean="0">
                 <a:latin typeface="Courier New" pitchFamily="49" charset="0"/>
                 <a:cs typeface="Courier New" pitchFamily="49" charset="0"/>
               </a:rPr>
               <a:t>message = </a:t>
             </a:r>
             <a:r>
-              <a:rPr lang="en-US" sz="1600" b="1" dirty="0" smtClean="0">
+              <a:rPr lang="en-US" sz="1800" b="1" dirty="0" smtClean="0">
                 <a:solidFill>
                   <a:srgbClr val="C00000"/>
                 </a:solidFill>
@@ -38179,7 +38917,7 @@
               <a:t>SHA1(</a:t>
             </a:r>
             <a:r>
-              <a:rPr lang="en-US" sz="1600" b="1" dirty="0" err="1" smtClean="0">
+              <a:rPr lang="en-US" sz="1800" b="1" dirty="0" err="1" smtClean="0">
                 <a:solidFill>
                   <a:srgbClr val="C00000"/>
                 </a:solidFill>
@@ -38189,7 +38927,7 @@
               <a:t>shared_secret</a:t>
             </a:r>
             <a:r>
-              <a:rPr lang="en-US" sz="1600" b="1" dirty="0" smtClean="0">
+              <a:rPr lang="en-US" sz="1800" b="1" dirty="0" smtClean="0">
                 <a:solidFill>
                   <a:srgbClr val="C00000"/>
                 </a:solidFill>
@@ -38199,82 +38937,26 @@
               <a:t> || commands)</a:t>
             </a:r>
             <a:r>
-              <a:rPr lang="en-US" sz="1600" b="1" dirty="0" smtClean="0">
-                <a:latin typeface="Courier New" pitchFamily="49" charset="0"/>
-                <a:cs typeface="Courier New" pitchFamily="49" charset="0"/>
-              </a:rPr>
-              <a:t> + commands</a:t>
-            </a:r>
-          </a:p>
-          <a:p>
-            <a:r>
-              <a:rPr lang="en-US" sz="2400" dirty="0" smtClean="0"/>
-              <a:t>And let’s say commands is a URL-like list of commands.. For example:</a:t>
-            </a:r>
-          </a:p>
-          <a:p>
-            <a:pPr lvl="1"/>
-            <a:r>
-              <a:rPr lang="en-US" sz="1600" b="1" dirty="0" smtClean="0">
-                <a:latin typeface="Courier New" pitchFamily="49" charset="0"/>
-                <a:cs typeface="Courier New" pitchFamily="49" charset="0"/>
-              </a:rPr>
-              <a:t>commands = “</a:t>
-            </a:r>
-            <a:r>
-              <a:rPr lang="en-US" sz="1600" b="1" dirty="0" err="1" smtClean="0">
-                <a:latin typeface="Courier New" pitchFamily="49" charset="0"/>
-                <a:cs typeface="Courier New" pitchFamily="49" charset="0"/>
-              </a:rPr>
-              <a:t>set_firstname</a:t>
-            </a:r>
-            <a:r>
-              <a:rPr lang="en-US" sz="1600" b="1" dirty="0" smtClean="0">
-                <a:latin typeface="Courier New" pitchFamily="49" charset="0"/>
-                <a:cs typeface="Courier New" pitchFamily="49" charset="0"/>
-              </a:rPr>
-              <a:t>=</a:t>
-            </a:r>
-            <a:r>
-              <a:rPr lang="en-US" sz="1600" b="1" dirty="0" err="1" smtClean="0">
-                <a:latin typeface="Courier New" pitchFamily="49" charset="0"/>
-                <a:cs typeface="Courier New" pitchFamily="49" charset="0"/>
-              </a:rPr>
-              <a:t>ron&amp;set_lastname</a:t>
-            </a:r>
-            <a:r>
-              <a:rPr lang="en-US" sz="1600" b="1" dirty="0" smtClean="0">
-                <a:latin typeface="Courier New" pitchFamily="49" charset="0"/>
-                <a:cs typeface="Courier New" pitchFamily="49" charset="0"/>
-              </a:rPr>
-              <a:t>=</a:t>
-            </a:r>
-            <a:r>
-              <a:rPr lang="en-US" sz="1600" b="1" dirty="0" err="1" smtClean="0">
-                <a:latin typeface="Courier New" pitchFamily="49" charset="0"/>
-                <a:cs typeface="Courier New" pitchFamily="49" charset="0"/>
-              </a:rPr>
-              <a:t>bowes</a:t>
-            </a:r>
-            <a:r>
-              <a:rPr lang="en-US" sz="1600" b="1" dirty="0" smtClean="0">
-                <a:latin typeface="Courier New" pitchFamily="49" charset="0"/>
-                <a:cs typeface="Courier New" pitchFamily="49" charset="0"/>
-              </a:rPr>
-              <a:t>”</a:t>
-            </a:r>
-          </a:p>
-          <a:p>
-            <a:pPr lvl="1"/>
-            <a:r>
-              <a:rPr lang="en-US" sz="2000" dirty="0" smtClean="0"/>
-              <a:t>or, </a:t>
-            </a:r>
-            <a:r>
               <a:rPr lang="en-US" sz="1800" b="1" dirty="0" smtClean="0">
                 <a:latin typeface="Courier New" pitchFamily="49" charset="0"/>
                 <a:cs typeface="Courier New" pitchFamily="49" charset="0"/>
               </a:rPr>
+              <a:t> + commands</a:t>
+            </a:r>
+          </a:p>
+          <a:p>
+            <a:r>
+              <a:rPr lang="en-US" sz="2800" dirty="0" smtClean="0"/>
+              <a:t>And let’s say commands is a URL-like list of commands.. For example:</a:t>
+            </a:r>
+          </a:p>
+          <a:p>
+            <a:pPr lvl="1"/>
+            <a:r>
+              <a:rPr lang="en-US" sz="1800" b="1" dirty="0" smtClean="0">
+                <a:latin typeface="Courier New" pitchFamily="49" charset="0"/>
+                <a:cs typeface="Courier New" pitchFamily="49" charset="0"/>
+              </a:rPr>
               <a:t>commands = “</a:t>
             </a:r>
             <a:r>
@@ -38282,23 +38964,79 @@
                 <a:latin typeface="Courier New" pitchFamily="49" charset="0"/>
                 <a:cs typeface="Courier New" pitchFamily="49" charset="0"/>
               </a:rPr>
-              <a:t>deletemyaccount</a:t>
+              <a:t>set_firstname</a:t>
             </a:r>
             <a:r>
               <a:rPr lang="en-US" sz="1800" b="1" dirty="0" smtClean="0">
                 <a:latin typeface="Courier New" pitchFamily="49" charset="0"/>
                 <a:cs typeface="Courier New" pitchFamily="49" charset="0"/>
               </a:rPr>
+              <a:t>=</a:t>
+            </a:r>
+            <a:r>
+              <a:rPr lang="en-US" sz="1800" b="1" dirty="0" err="1" smtClean="0">
+                <a:latin typeface="Courier New" pitchFamily="49" charset="0"/>
+                <a:cs typeface="Courier New" pitchFamily="49" charset="0"/>
+              </a:rPr>
+              <a:t>ron&amp;set_lastname</a:t>
+            </a:r>
+            <a:r>
+              <a:rPr lang="en-US" sz="1800" b="1" dirty="0" smtClean="0">
+                <a:latin typeface="Courier New" pitchFamily="49" charset="0"/>
+                <a:cs typeface="Courier New" pitchFamily="49" charset="0"/>
+              </a:rPr>
+              <a:t>=</a:t>
+            </a:r>
+            <a:r>
+              <a:rPr lang="en-US" sz="1800" b="1" dirty="0" err="1" smtClean="0">
+                <a:latin typeface="Courier New" pitchFamily="49" charset="0"/>
+                <a:cs typeface="Courier New" pitchFamily="49" charset="0"/>
+              </a:rPr>
+              <a:t>bowes</a:t>
+            </a:r>
+            <a:r>
+              <a:rPr lang="en-US" sz="1800" b="1" dirty="0" smtClean="0">
+                <a:latin typeface="Courier New" pitchFamily="49" charset="0"/>
+                <a:cs typeface="Courier New" pitchFamily="49" charset="0"/>
+              </a:rPr>
+              <a:t>”</a:t>
+            </a:r>
+          </a:p>
+          <a:p>
+            <a:pPr lvl="1"/>
+            <a:r>
+              <a:rPr lang="en-US" sz="2400" dirty="0" smtClean="0"/>
+              <a:t>or, </a:t>
+            </a:r>
+            <a:r>
+              <a:rPr lang="en-US" sz="2000" b="1" dirty="0" smtClean="0">
+                <a:latin typeface="Courier New" pitchFamily="49" charset="0"/>
+                <a:cs typeface="Courier New" pitchFamily="49" charset="0"/>
+              </a:rPr>
+              <a:t>commands = “</a:t>
+            </a:r>
+            <a:r>
+              <a:rPr lang="en-US" sz="2000" b="1" dirty="0" err="1" smtClean="0">
+                <a:latin typeface="Courier New" pitchFamily="49" charset="0"/>
+                <a:cs typeface="Courier New" pitchFamily="49" charset="0"/>
+              </a:rPr>
+              <a:t>deletemyaccount</a:t>
+            </a:r>
+            <a:r>
+              <a:rPr lang="en-US" sz="2000" b="1" dirty="0" smtClean="0">
+                <a:latin typeface="Courier New" pitchFamily="49" charset="0"/>
+                <a:cs typeface="Courier New" pitchFamily="49" charset="0"/>
+              </a:rPr>
               <a:t>=1”</a:t>
             </a:r>
           </a:p>
           <a:p>
             <a:pPr lvl="1"/>
             <a:r>
-              <a:rPr lang="en-US" sz="2000" dirty="0" smtClean="0"/>
+              <a:rPr lang="en-US" sz="2400" dirty="0" smtClean="0"/>
               <a:t>Etc.</a:t>
             </a:r>
-            <a:endParaRPr lang="en-US" sz="1600" b="1" dirty="0">
+            <a:endParaRPr lang="en-US" sz="1800" b="1" dirty="0">
               <a:latin typeface="Courier New" pitchFamily="49" charset="0"/>
               <a:cs typeface="Courier New" pitchFamily="49" charset="0"/>
             </a:endParaRPr>
@@ -38392,107 +39130,107 @@
           <a:lstStyle/>
           <a:p>
             <a:r>
-              <a:rPr lang="en-US" sz="2800" dirty="0" smtClean="0"/>
+              <a:rPr lang="en-US" dirty="0" smtClean="0"/>
               <a:t>Let’s use this API to change my </a:t>
             </a:r>
             <a:r>
-              <a:rPr lang="en-US" sz="2800" dirty="0" err="1" smtClean="0"/>
+              <a:rPr lang="en-US" dirty="0" err="1" smtClean="0"/>
               <a:t>firstname</a:t>
             </a:r>
             <a:r>
-              <a:rPr lang="en-US" sz="2800" dirty="0" smtClean="0"/>
+              <a:rPr lang="en-US" dirty="0" smtClean="0"/>
               <a:t> to “</a:t>
             </a:r>
             <a:r>
-              <a:rPr lang="en-US" sz="2800" dirty="0" err="1" smtClean="0"/>
+              <a:rPr lang="en-US" dirty="0" err="1" smtClean="0"/>
               <a:t>ron</a:t>
             </a:r>
             <a:r>
-              <a:rPr lang="en-US" sz="2800" dirty="0" smtClean="0"/>
+              <a:rPr lang="en-US" dirty="0" smtClean="0"/>
               <a:t>”:</a:t>
             </a:r>
           </a:p>
           <a:p>
             <a:pPr lvl="1"/>
             <a:r>
-              <a:rPr lang="en-US" sz="1400" b="1" dirty="0" smtClean="0">
+              <a:rPr lang="en-US" sz="1600" b="1" dirty="0" smtClean="0">
                 <a:latin typeface="Courier New" pitchFamily="49" charset="0"/>
                 <a:cs typeface="Courier New" pitchFamily="49" charset="0"/>
               </a:rPr>
               <a:t>message </a:t>
             </a:r>
             <a:r>
-              <a:rPr lang="en-US" sz="1400" b="1" dirty="0">
+              <a:rPr lang="en-US" sz="1600" b="1" dirty="0">
                 <a:latin typeface="Courier New" pitchFamily="49" charset="0"/>
                 <a:cs typeface="Courier New" pitchFamily="49" charset="0"/>
               </a:rPr>
               <a:t>= SHA1(“</a:t>
             </a:r>
             <a:r>
-              <a:rPr lang="en-US" sz="1400" b="1" dirty="0" err="1">
+              <a:rPr lang="en-US" sz="1600" b="1" dirty="0" err="1">
                 <a:latin typeface="Courier New" pitchFamily="49" charset="0"/>
                 <a:cs typeface="Courier New" pitchFamily="49" charset="0"/>
               </a:rPr>
               <a:t>secretkey</a:t>
             </a:r>
             <a:r>
-              <a:rPr lang="en-US" sz="1400" b="1" dirty="0">
+              <a:rPr lang="en-US" sz="1600" b="1" dirty="0">
                 <a:latin typeface="Courier New" pitchFamily="49" charset="0"/>
                 <a:cs typeface="Courier New" pitchFamily="49" charset="0"/>
               </a:rPr>
               <a:t>” + “</a:t>
             </a:r>
             <a:r>
-              <a:rPr lang="en-US" sz="1400" b="1" dirty="0" err="1">
+              <a:rPr lang="en-US" sz="1600" b="1" dirty="0" err="1">
                 <a:latin typeface="Courier New" pitchFamily="49" charset="0"/>
                 <a:cs typeface="Courier New" pitchFamily="49" charset="0"/>
               </a:rPr>
               <a:t>set_firstname</a:t>
             </a:r>
             <a:r>
-              <a:rPr lang="en-US" sz="1400" b="1" dirty="0">
+              <a:rPr lang="en-US" sz="1600" b="1" dirty="0">
                 <a:latin typeface="Courier New" pitchFamily="49" charset="0"/>
                 <a:cs typeface="Courier New" pitchFamily="49" charset="0"/>
               </a:rPr>
               <a:t>=</a:t>
             </a:r>
             <a:r>
-              <a:rPr lang="en-US" sz="1400" b="1" dirty="0" err="1">
+              <a:rPr lang="en-US" sz="1600" b="1" dirty="0" err="1">
                 <a:latin typeface="Courier New" pitchFamily="49" charset="0"/>
                 <a:cs typeface="Courier New" pitchFamily="49" charset="0"/>
               </a:rPr>
               <a:t>ron</a:t>
             </a:r>
             <a:r>
-              <a:rPr lang="en-US" sz="1400" b="1" dirty="0">
+              <a:rPr lang="en-US" sz="1600" b="1" dirty="0">
                 <a:latin typeface="Courier New" pitchFamily="49" charset="0"/>
                 <a:cs typeface="Courier New" pitchFamily="49" charset="0"/>
               </a:rPr>
               <a:t>”) + “</a:t>
             </a:r>
             <a:r>
-              <a:rPr lang="en-US" sz="1400" b="1" dirty="0" err="1">
+              <a:rPr lang="en-US" sz="1600" b="1" dirty="0" err="1">
                 <a:latin typeface="Courier New" pitchFamily="49" charset="0"/>
                 <a:cs typeface="Courier New" pitchFamily="49" charset="0"/>
               </a:rPr>
               <a:t>set_firstname</a:t>
             </a:r>
             <a:r>
-              <a:rPr lang="en-US" sz="1400" b="1" dirty="0">
+              <a:rPr lang="en-US" sz="1600" b="1" dirty="0">
                 <a:latin typeface="Courier New" pitchFamily="49" charset="0"/>
                 <a:cs typeface="Courier New" pitchFamily="49" charset="0"/>
               </a:rPr>
               <a:t>=</a:t>
             </a:r>
             <a:r>
-              <a:rPr lang="en-US" sz="1400" b="1" dirty="0" err="1">
+              <a:rPr lang="en-US" sz="1600" b="1" dirty="0" err="1">
                 <a:latin typeface="Courier New" pitchFamily="49" charset="0"/>
                 <a:cs typeface="Courier New" pitchFamily="49" charset="0"/>
               </a:rPr>
               <a:t>ron</a:t>
             </a:r>
             <a:r>
-              <a:rPr lang="en-US" sz="1400" b="1" dirty="0">
+              <a:rPr lang="en-US" sz="1600" b="1" dirty="0">
                 <a:latin typeface="Courier New" pitchFamily="49" charset="0"/>
                 <a:cs typeface="Courier New" pitchFamily="49" charset="0"/>
               </a:rPr>
@@ -38502,49 +39240,49 @@
           <a:p>
             <a:pPr lvl="1"/>
             <a:r>
-              <a:rPr lang="en-US" sz="1400" b="1" dirty="0">
+              <a:rPr lang="en-US" sz="1600" b="1" dirty="0">
                 <a:latin typeface="Courier New" pitchFamily="49" charset="0"/>
                 <a:cs typeface="Courier New" pitchFamily="49" charset="0"/>
               </a:rPr>
               <a:t>message </a:t>
             </a:r>
             <a:r>
-              <a:rPr lang="en-US" sz="1400" b="1" dirty="0" smtClean="0">
+              <a:rPr lang="en-US" sz="1600" b="1" dirty="0" smtClean="0">
                 <a:latin typeface="Courier New" pitchFamily="49" charset="0"/>
                 <a:cs typeface="Courier New" pitchFamily="49" charset="0"/>
               </a:rPr>
               <a:t>= </a:t>
             </a:r>
             <a:r>
-              <a:rPr lang="en-US" sz="1400" b="1" dirty="0">
+              <a:rPr lang="en-US" sz="1600" b="1" dirty="0">
                 <a:latin typeface="Courier New" pitchFamily="49" charset="0"/>
                 <a:cs typeface="Courier New" pitchFamily="49" charset="0"/>
               </a:rPr>
               <a:t>“\x5e\x8a\x88\x6a\x5f\x9c\xa9\x77\x42\x1a\xe0\x67\</a:t>
             </a:r>
             <a:r>
-              <a:rPr lang="en-US" sz="1400" b="1" dirty="0" err="1">
+              <a:rPr lang="en-US" sz="1600" b="1" dirty="0" err="1">
                 <a:latin typeface="Courier New" pitchFamily="49" charset="0"/>
                 <a:cs typeface="Courier New" pitchFamily="49" charset="0"/>
               </a:rPr>
               <a:t>xcc</a:t>
             </a:r>
             <a:r>
-              <a:rPr lang="en-US" sz="1400" b="1" dirty="0">
+              <a:rPr lang="en-US" sz="1600" b="1" dirty="0">
                 <a:latin typeface="Courier New" pitchFamily="49" charset="0"/>
                 <a:cs typeface="Courier New" pitchFamily="49" charset="0"/>
               </a:rPr>
               <a:t>\x56\x55\xb7\xf3\x47\x97\x4dset_firstname=</a:t>
             </a:r>
             <a:r>
-              <a:rPr lang="en-US" sz="1400" b="1" dirty="0" err="1">
+              <a:rPr lang="en-US" sz="1600" b="1" dirty="0" err="1">
                 <a:latin typeface="Courier New" pitchFamily="49" charset="0"/>
                 <a:cs typeface="Courier New" pitchFamily="49" charset="0"/>
               </a:rPr>
               <a:t>ron</a:t>
             </a:r>
             <a:r>
-              <a:rPr lang="en-US" sz="1400" b="1" dirty="0">
+              <a:rPr lang="en-US" sz="1600" b="1" dirty="0">
                 <a:latin typeface="Courier New" pitchFamily="49" charset="0"/>
                 <a:cs typeface="Courier New" pitchFamily="49" charset="0"/>
               </a:rPr>
@@ -38578,7 +39316,7 @@
         </p:blipFill>
         <p:spPr>
           <a:xfrm>
-            <a:off x="1143000" y="3777089"/>
+            <a:off x="1164157" y="4319768"/>
             <a:ext cx="1189637" cy="1073630"/>
           </a:xfrm>
           <a:prstGeom prst="rect">
@@ -38608,7 +39346,7 @@
         </p:blipFill>
         <p:spPr>
           <a:xfrm>
-            <a:off x="5486400" y="3507521"/>
+            <a:off x="5507557" y="4050200"/>
             <a:ext cx="2183349" cy="1612767"/>
           </a:xfrm>
           <a:prstGeom prst="rect">
@@ -38624,7 +39362,7 @@
         </p:nvCxnSpPr>
         <p:spPr>
           <a:xfrm>
-            <a:off x="2514600" y="4191001"/>
+            <a:off x="2535757" y="4733680"/>
             <a:ext cx="2971800" cy="0"/>
           </a:xfrm>
           <a:prstGeom prst="straightConnector1">
@@ -38652,13 +39390,15 @@
       <p:cxnSp>
         <p:nvCxnSpPr>
           <p:cNvPr id="7" name="Straight Arrow Connector 6"/>
-          <p:cNvCxnSpPr/>
+          <p:cNvCxnSpPr>
+            <a:endCxn id="8" idx="0"/>
+          </p:cNvCxnSpPr>
           <p:nvPr/>
         </p:nvCxnSpPr>
         <p:spPr>
           <a:xfrm>
-            <a:off x="3505200" y="4191001"/>
-            <a:ext cx="0" cy="1371599"/>
+            <a:off x="3526357" y="4733680"/>
+            <a:ext cx="16943" cy="905119"/>
           </a:xfrm>
           <a:prstGeom prst="straightConnector1">
             <a:avLst/>
@@ -38720,7 +39460,7 @@
         </p:nvSpPr>
         <p:spPr>
           <a:xfrm>
-            <a:off x="2366091" y="3852447"/>
+            <a:off x="2387248" y="4395126"/>
             <a:ext cx="3484756" cy="338554"/>
           </a:xfrm>
           <a:prstGeom prst="rect">
@@ -38781,7 +39521,7 @@
         </p:nvSpPr>
         <p:spPr>
           <a:xfrm>
-            <a:off x="6400800" y="5171791"/>
+            <a:off x="6421957" y="5714470"/>
             <a:ext cx="990600" cy="369332"/>
           </a:xfrm>
           <a:prstGeom prst="rect">
@@ -38841,7 +39581,7 @@
         </p:nvSpPr>
         <p:spPr>
           <a:xfrm>
-            <a:off x="1219200" y="4987125"/>
+            <a:off x="1240357" y="5529804"/>
             <a:ext cx="762000" cy="369332"/>
           </a:xfrm>
           <a:prstGeom prst="rect">
@@ -38968,7 +39708,21 @@
                 <a:latin typeface="Courier New" pitchFamily="49" charset="0"/>
                 <a:cs typeface="Courier New" pitchFamily="49" charset="0"/>
               </a:rPr>
-              <a:t>” + “</a:t>
+              <a:t>” </a:t>
+            </a:r>
+            <a:r>
+              <a:rPr lang="en-US" sz="1800" b="1" dirty="0" smtClean="0">
+                <a:latin typeface="Courier New" pitchFamily="49" charset="0"/>
+                <a:cs typeface="Courier New" pitchFamily="49" charset="0"/>
+              </a:rPr>
+              <a:t>|| </a:t>
+            </a:r>
+            <a:r>
+              <a:rPr lang="en-US" sz="1800" b="1" dirty="0">
+                <a:latin typeface="Courier New" pitchFamily="49" charset="0"/>
+                <a:cs typeface="Courier New" pitchFamily="49" charset="0"/>
+              </a:rPr>
+              <a:t>“</a:t>
             </a:r>
             <a:r>
               <a:rPr lang="en-US" sz="1800" b="1" dirty="0" err="1" smtClean="0">
@@ -41051,147 +41805,95 @@
         <p:spPr/>
         <p:txBody>
           <a:bodyPr>
-            <a:normAutofit fontScale="55000" lnSpcReduction="20000"/>
+            <a:noAutofit/>
           </a:bodyPr>
           <a:lstStyle/>
           <a:p>
             <a:r>
-              <a:rPr lang="en-US" dirty="0" smtClean="0"/>
+              <a:rPr lang="en-US" sz="2400" dirty="0" smtClean="0"/>
               <a:t>It’s amazingly difficult to write these attacks by hand</a:t>
             </a:r>
           </a:p>
           <a:p>
             <a:pPr lvl="1"/>
             <a:r>
-              <a:rPr lang="en-US" dirty="0" smtClean="0"/>
+              <a:rPr lang="en-US" sz="1800" dirty="0" smtClean="0"/>
               <a:t>I never fail to mess up the number of zeroes, or forget to convert the length to bits, or screw up </a:t>
             </a:r>
             <a:r>
-              <a:rPr lang="en-US" dirty="0" err="1" smtClean="0"/>
+              <a:rPr lang="en-US" sz="1800" dirty="0" err="1" smtClean="0"/>
               <a:t>endianness</a:t>
             </a:r>
-            <a:endParaRPr lang="en-US" dirty="0"/>
-          </a:p>
-          <a:p>
-            <a:r>
-              <a:rPr lang="en-US" dirty="0" smtClean="0"/>
+            <a:endParaRPr lang="en-US" sz="1800" dirty="0"/>
+          </a:p>
+          <a:p>
+            <a:r>
+              <a:rPr lang="en-US" sz="2400" dirty="0" smtClean="0"/>
               <a:t>Luckily, you don’t have to! I wrote </a:t>
             </a:r>
             <a:r>
-              <a:rPr lang="en-US" dirty="0" err="1" smtClean="0"/>
+              <a:rPr lang="en-US" sz="2400" dirty="0" err="1" smtClean="0"/>
               <a:t>hash_extender</a:t>
             </a:r>
             <a:r>
-              <a:rPr lang="en-US" dirty="0" smtClean="0"/>
+              <a:rPr lang="en-US" sz="2400" dirty="0" smtClean="0"/>
               <a:t> to take care of that</a:t>
             </a:r>
           </a:p>
           <a:p>
             <a:r>
-              <a:rPr lang="en-US" dirty="0" err="1" smtClean="0"/>
+              <a:rPr lang="en-US" sz="2400" dirty="0" err="1" smtClean="0"/>
               <a:t>hash_extender</a:t>
             </a:r>
             <a:r>
-              <a:rPr lang="en-US" dirty="0" smtClean="0"/>
+              <a:rPr lang="en-US" sz="2400" dirty="0" smtClean="0"/>
               <a:t> supports the following hashes:</a:t>
             </a:r>
           </a:p>
           <a:p>
             <a:pPr lvl="1"/>
             <a:r>
-              <a:rPr lang="en-US" dirty="0" smtClean="0"/>
-              <a:t>md4</a:t>
-            </a:r>
+              <a:rPr lang="en-US" sz="1800" b="1" dirty="0" smtClean="0"/>
+              <a:t>MD4, MD5, RIPEMD160, SHA, SHA1, SHA256, SHA512, Whirlpool</a:t>
+            </a:r>
+            <a:endParaRPr lang="en-US" sz="1800" b="1" dirty="0" smtClean="0"/>
+          </a:p>
+          <a:p>
+            <a:r>
+              <a:rPr lang="en-US" sz="2400" dirty="0" smtClean="0"/>
+              <a:t>The following hash types are more </a:t>
+            </a:r>
+            <a:r>
+              <a:rPr lang="en-US" sz="2400" dirty="0" smtClean="0"/>
+              <a:t>difficult to extend, because the state is truncated before being used:</a:t>
+            </a:r>
+            <a:endParaRPr lang="en-US" sz="2400" dirty="0" smtClean="0"/>
           </a:p>
           <a:p>
             <a:pPr lvl="1"/>
             <a:r>
-              <a:rPr lang="en-US" dirty="0" smtClean="0"/>
-              <a:t>md5</a:t>
-            </a:r>
+              <a:rPr lang="en-US" sz="1800" b="1" dirty="0" smtClean="0"/>
+              <a:t>SHA224, SHA384</a:t>
+            </a:r>
+          </a:p>
+          <a:p>
+            <a:r>
+              <a:rPr lang="en-US" sz="2400" dirty="0" smtClean="0"/>
+              <a:t>And, the following hash type is impossible to extend, by design, although time will tell:</a:t>
+            </a:r>
+            <a:endParaRPr lang="en-US" sz="2400" dirty="0" smtClean="0"/>
           </a:p>
           <a:p>
             <a:pPr lvl="1"/>
             <a:r>
-              <a:rPr lang="en-US" dirty="0" smtClean="0"/>
-              <a:t>ripemd160</a:t>
-            </a:r>
-          </a:p>
-          <a:p>
-            <a:pPr lvl="1"/>
-            <a:r>
-              <a:rPr lang="en-US" dirty="0" err="1" smtClean="0"/>
-              <a:t>sha</a:t>
-            </a:r>
-            <a:endParaRPr lang="en-US" dirty="0" smtClean="0"/>
-          </a:p>
-          <a:p>
-            <a:pPr lvl="1"/>
-            <a:r>
-              <a:rPr lang="en-US" dirty="0" smtClean="0"/>
-              <a:t>sha1</a:t>
-            </a:r>
-          </a:p>
-          <a:p>
-            <a:pPr lvl="1"/>
-            <a:r>
-              <a:rPr lang="en-US" dirty="0" smtClean="0"/>
-              <a:t>sha256</a:t>
-            </a:r>
-          </a:p>
-          <a:p>
-            <a:pPr lvl="1"/>
-            <a:r>
-              <a:rPr lang="en-US" dirty="0" smtClean="0"/>
-              <a:t>sha512</a:t>
-            </a:r>
-          </a:p>
-          <a:p>
-            <a:pPr lvl="1"/>
-            <a:r>
-              <a:rPr lang="en-US" dirty="0" smtClean="0"/>
-              <a:t>Whirlpool</a:t>
-            </a:r>
-          </a:p>
-          <a:p>
-            <a:r>
-              <a:rPr lang="en-US" dirty="0" smtClean="0"/>
-              <a:t>The following hash types are more difficult or impossible to extend:</a:t>
-            </a:r>
-          </a:p>
-          <a:p>
-            <a:pPr lvl="1"/>
-            <a:r>
-              <a:rPr lang="en-US" dirty="0"/>
+              <a:rPr lang="en-US" sz="1800" b="1" dirty="0"/>
               <a:t>s</a:t>
             </a:r>
             <a:r>
-              <a:rPr lang="en-US" dirty="0" smtClean="0"/>
-              <a:t>ha224</a:t>
-            </a:r>
-          </a:p>
-          <a:p>
-            <a:pPr lvl="1"/>
-            <a:r>
-              <a:rPr lang="en-US" dirty="0"/>
-              <a:t>s</a:t>
-            </a:r>
-            <a:r>
-              <a:rPr lang="en-US" dirty="0" smtClean="0"/>
-              <a:t>ha384</a:t>
-            </a:r>
-          </a:p>
-          <a:p>
-            <a:pPr lvl="1"/>
-            <a:r>
-              <a:rPr lang="en-US" dirty="0"/>
-              <a:t>s</a:t>
-            </a:r>
-            <a:r>
-              <a:rPr lang="en-US" dirty="0" smtClean="0"/>
+              <a:rPr lang="en-US" sz="1800" b="1" dirty="0" smtClean="0"/>
               <a:t>ha-3</a:t>
             </a:r>
-            <a:endParaRPr lang="en-US" dirty="0"/>
+            <a:endParaRPr lang="en-US" sz="1800" b="1" dirty="0"/>
           </a:p>
         </p:txBody>
       </p:sp>
@@ -41573,7 +42275,7 @@
           <a:p>
             <a:r>
               <a:rPr lang="en-US" dirty="0" smtClean="0"/>
-              <a:t>So here’s some cats</a:t>
+              <a:t>So let’s look at some cats then do a demo</a:t>
             </a:r>
             <a:endParaRPr lang="en-US" dirty="0"/>
           </a:p>
@@ -43976,7 +44678,11 @@
             </a:r>
             <a:r>
               <a:rPr lang="en-US" sz="2000" dirty="0" smtClean="0"/>
-              <a:t> XOR C</a:t>
+              <a:t> </a:t>
+            </a:r>
+            <a:r>
+              <a:rPr lang="en-US" sz="2000" dirty="0"/>
+              <a:t>⊕ C</a:t>
             </a:r>
             <a:r>
               <a:rPr lang="en-US" sz="2000" baseline="-25000" dirty="0" smtClean="0"/>
@@ -44156,7 +44862,11 @@
             </a:r>
             <a:r>
               <a:rPr lang="en-US" dirty="0" smtClean="0"/>
-              <a:t>) XOR C</a:t>
+              <a:t>) </a:t>
+            </a:r>
+            <a:r>
+              <a:rPr lang="en-US" dirty="0"/>
+              <a:t>⊕ C</a:t>
             </a:r>
             <a:r>
               <a:rPr lang="en-US" baseline="-25000" dirty="0" smtClean="0"/>
@@ -44331,26 +45041,6 @@
               <a:t> </a:t>
             </a:r>
             <a:r>
-              <a:rPr lang="en-US" dirty="0">
-                <a:solidFill>
-                  <a:schemeClr val="accent3">
-                    <a:lumMod val="75000"/>
-                  </a:schemeClr>
-                </a:solidFill>
-              </a:rPr>
-              <a:t>XOR C</a:t>
-            </a:r>
-            <a:r>
-              <a:rPr lang="en-US" baseline="-25000" dirty="0">
-                <a:solidFill>
-                  <a:schemeClr val="accent3">
-                    <a:lumMod val="75000"/>
-                  </a:schemeClr>
-                </a:solidFill>
-              </a:rPr>
-              <a:t>n-1</a:t>
-            </a:r>
-            <a:r>
               <a:rPr lang="en-US" dirty="0" smtClean="0">
                 <a:solidFill>
                   <a:schemeClr val="accent3">
@@ -44358,6 +45048,26 @@
                   </a:schemeClr>
                 </a:solidFill>
               </a:rPr>
+              <a:t>⊕ C</a:t>
+            </a:r>
+            <a:r>
+              <a:rPr lang="en-US" baseline="-25000" dirty="0" smtClean="0">
+                <a:solidFill>
+                  <a:schemeClr val="accent3">
+                    <a:lumMod val="75000"/>
+                  </a:schemeClr>
+                </a:solidFill>
+              </a:rPr>
+              <a:t>n-1</a:t>
+            </a:r>
+            <a:r>
+              <a:rPr lang="en-US" dirty="0" smtClean="0">
+                <a:solidFill>
+                  <a:schemeClr val="accent3">
+                    <a:lumMod val="75000"/>
+                  </a:schemeClr>
+                </a:solidFill>
+              </a:rPr>
               <a:t>)</a:t>
             </a:r>
           </a:p>
@@ -44413,7 +45123,27 @@
                   </a:schemeClr>
                 </a:solidFill>
               </a:rPr>
-              <a:t>) XOR C</a:t>
+              <a:t>) </a:t>
+            </a:r>
+            <a:r>
+              <a:rPr lang="en-US" dirty="0">
+                <a:solidFill>
+                  <a:schemeClr val="accent2">
+                    <a:lumMod val="75000"/>
+                  </a:schemeClr>
+                </a:solidFill>
+              </a:rPr>
+              <a:t>⊕ </a:t>
+            </a:r>
+            <a:r>
+              <a:rPr lang="en-US" dirty="0">
+                <a:solidFill>
+                  <a:schemeClr val="accent2">
+                    <a:lumMod val="75000"/>
+                  </a:schemeClr>
+                </a:solidFill>
+              </a:rPr>
+              <a:t>C</a:t>
             </a:r>
             <a:r>
               <a:rPr lang="en-US" baseline="-25000" dirty="0">
@@ -44501,7 +45231,27 @@
                   </a:schemeClr>
                 </a:solidFill>
               </a:rPr>
-              <a:t> XOR C</a:t>
+              <a:t> </a:t>
+            </a:r>
+            <a:r>
+              <a:rPr lang="en-US" dirty="0">
+                <a:solidFill>
+                  <a:schemeClr val="accent3">
+                    <a:lumMod val="75000"/>
+                  </a:schemeClr>
+                </a:solidFill>
+              </a:rPr>
+              <a:t>⊕ </a:t>
+            </a:r>
+            <a:r>
+              <a:rPr lang="en-US" dirty="0" smtClean="0">
+                <a:solidFill>
+                  <a:schemeClr val="accent3">
+                    <a:lumMod val="75000"/>
+                  </a:schemeClr>
+                </a:solidFill>
+              </a:rPr>
+              <a:t>C</a:t>
             </a:r>
             <a:r>
               <a:rPr lang="en-US" baseline="-25000" dirty="0" smtClean="0">
@@ -44531,7 +45281,27 @@
                   </a:schemeClr>
                 </a:solidFill>
               </a:rPr>
-              <a:t>) XOR C</a:t>
+              <a:t>) </a:t>
+            </a:r>
+            <a:r>
+              <a:rPr lang="en-US" dirty="0">
+                <a:solidFill>
+                  <a:schemeClr val="accent2">
+                    <a:lumMod val="75000"/>
+                  </a:schemeClr>
+                </a:solidFill>
+              </a:rPr>
+              <a:t>⊕ </a:t>
+            </a:r>
+            <a:r>
+              <a:rPr lang="en-US" dirty="0" smtClean="0">
+                <a:solidFill>
+                  <a:schemeClr val="accent2">
+                    <a:lumMod val="75000"/>
+                  </a:schemeClr>
+                </a:solidFill>
+              </a:rPr>
+              <a:t>C</a:t>
             </a:r>
             <a:r>
               <a:rPr lang="en-US" baseline="-25000" dirty="0" smtClean="0">
@@ -44607,17 +45377,7 @@
                   </a:schemeClr>
                 </a:solidFill>
               </a:rPr>
-              <a:t>XOR </a:t>
-            </a:r>
-            <a:r>
-              <a:rPr lang="en-US" dirty="0" smtClean="0">
-                <a:solidFill>
-                  <a:schemeClr val="accent3">
-                    <a:lumMod val="75000"/>
-                  </a:schemeClr>
-                </a:solidFill>
-              </a:rPr>
-              <a:t>C</a:t>
+              <a:t>⊕C</a:t>
             </a:r>
             <a:r>
               <a:rPr lang="en-US" baseline="-25000" dirty="0" smtClean="0">
@@ -44637,7 +45397,7 @@
                   </a:schemeClr>
                 </a:solidFill>
               </a:rPr>
-              <a:t>XOR </a:t>
+              <a:t>⊕ </a:t>
             </a:r>
             <a:r>
               <a:rPr lang="en-US" dirty="0" smtClean="0">
@@ -46380,7 +47140,7 @@
         </p:nvSpPr>
         <p:spPr>
           <a:xfrm>
-            <a:off x="5611390" y="4572000"/>
+            <a:off x="5557026" y="4530081"/>
             <a:ext cx="636085" cy="369332"/>
           </a:xfrm>
           <a:prstGeom prst="rect">
@@ -46395,8 +47155,8 @@
           <a:lstStyle/>
           <a:p>
             <a:r>
-              <a:rPr lang="en-US" dirty="0" smtClean="0"/>
-              <a:t>XOR</a:t>
+              <a:rPr lang="en-US" dirty="0"/>
+              <a:t>⊕</a:t>
             </a:r>
             <a:endParaRPr lang="en-US" dirty="0"/>
           </a:p>
@@ -47659,7 +48419,11 @@
             </a:r>
             <a:r>
               <a:rPr lang="en-US" sz="2400" dirty="0" smtClean="0"/>
-              <a:t>) XOR </a:t>
+              <a:t>) </a:t>
+            </a:r>
+            <a:r>
+              <a:rPr lang="en-US" sz="2400" dirty="0" smtClean="0"/>
+              <a:t>⊕ </a:t>
             </a:r>
             <a:r>
               <a:rPr lang="en-US" sz="2400" b="1" dirty="0" smtClean="0">
@@ -47669,7 +48433,17 @@
                   </a:schemeClr>
                 </a:solidFill>
               </a:rPr>
-              <a:t>C’</a:t>
+              <a:t>C</a:t>
+            </a:r>
+            <a:r>
+              <a:rPr lang="en-US" sz="2400" b="1" dirty="0" smtClean="0">
+                <a:solidFill>
+                  <a:schemeClr val="accent5">
+                    <a:lumMod val="50000"/>
+                  </a:schemeClr>
+                </a:solidFill>
+              </a:rPr>
+              <a:t>’</a:t>
             </a:r>
             <a:endParaRPr lang="en-US" sz="2400" b="1" dirty="0">
               <a:solidFill>
@@ -47739,7 +48513,15 @@
             </a:r>
             <a:r>
               <a:rPr lang="en-US" sz="2400" dirty="0"/>
-              <a:t>) XOR C</a:t>
+              <a:t>) </a:t>
+            </a:r>
+            <a:r>
+              <a:rPr lang="en-US" sz="2400" dirty="0"/>
+              <a:t>⊕ </a:t>
+            </a:r>
+            <a:r>
+              <a:rPr lang="en-US" sz="2400" dirty="0"/>
+              <a:t>C</a:t>
             </a:r>
             <a:r>
               <a:rPr lang="en-US" sz="2400" baseline="-25000" dirty="0"/>
@@ -48027,7 +48809,11 @@
             </a:r>
             <a:r>
               <a:rPr lang="en-US" sz="2400" dirty="0" smtClean="0"/>
-              <a:t>) XOR </a:t>
+              <a:t>) </a:t>
+            </a:r>
+            <a:r>
+              <a:rPr lang="en-US" sz="2400" dirty="0" smtClean="0"/>
+              <a:t>⊕ </a:t>
             </a:r>
             <a:r>
               <a:rPr lang="en-US" sz="2400" b="1" dirty="0" smtClean="0">
@@ -48037,7 +48823,17 @@
                   </a:schemeClr>
                 </a:solidFill>
               </a:rPr>
-              <a:t>C’</a:t>
+              <a:t>C</a:t>
+            </a:r>
+            <a:r>
+              <a:rPr lang="en-US" sz="2400" b="1" dirty="0" smtClean="0">
+                <a:solidFill>
+                  <a:schemeClr val="accent5">
+                    <a:lumMod val="50000"/>
+                  </a:schemeClr>
+                </a:solidFill>
+              </a:rPr>
+              <a:t>’</a:t>
             </a:r>
             <a:endParaRPr lang="en-US" sz="2400" b="1" dirty="0">
               <a:solidFill>
@@ -48294,7 +49090,7 @@
                   <a:schemeClr val="tx1"/>
                 </a:solidFill>
               </a:rPr>
-              <a:t>XOR </a:t>
+              <a:t>⊕ </a:t>
             </a:r>
             <a:r>
               <a:rPr lang="en-US" sz="2400" dirty="0" smtClean="0">
@@ -48426,7 +49222,7 @@
                   <a:schemeClr val="tx1"/>
                 </a:solidFill>
               </a:rPr>
-              <a:t>XOR </a:t>
+              <a:t>⊕ </a:t>
             </a:r>
             <a:r>
               <a:rPr lang="en-US" sz="2400" dirty="0" smtClean="0">
@@ -48563,7 +49359,23 @@
                   <a:schemeClr val="tx1"/>
                 </a:solidFill>
               </a:rPr>
-              <a:t> XOR C</a:t>
+              <a:t> </a:t>
+            </a:r>
+            <a:r>
+              <a:rPr lang="en-US" sz="2400" dirty="0">
+                <a:solidFill>
+                  <a:schemeClr val="tx1"/>
+                </a:solidFill>
+              </a:rPr>
+              <a:t>⊕ </a:t>
+            </a:r>
+            <a:r>
+              <a:rPr lang="en-US" sz="2400" dirty="0">
+                <a:solidFill>
+                  <a:schemeClr val="tx1"/>
+                </a:solidFill>
+              </a:rPr>
+              <a:t>C</a:t>
             </a:r>
             <a:r>
               <a:rPr lang="en-US" sz="2400" b="1" baseline="-25000" dirty="0">
@@ -48583,7 +49395,11 @@
             </a:r>
             <a:r>
               <a:rPr lang="en-US" sz="2400" dirty="0" smtClean="0"/>
-              <a:t>) XOR </a:t>
+              <a:t>) </a:t>
+            </a:r>
+            <a:r>
+              <a:rPr lang="en-US" sz="2400" dirty="0"/>
+              <a:t>⊕ </a:t>
             </a:r>
             <a:r>
               <a:rPr lang="en-US" sz="2400" b="1" dirty="0" smtClean="0">
@@ -48888,7 +49704,7 @@
                   <a:schemeClr val="tx1"/>
                 </a:solidFill>
               </a:rPr>
-              <a:t>XOR </a:t>
+              <a:t>⊕ </a:t>
             </a:r>
             <a:r>
               <a:rPr lang="en-US" sz="2400" dirty="0" smtClean="0">
@@ -48908,7 +49724,11 @@
             </a:r>
             <a:r>
               <a:rPr lang="en-US" sz="2400" dirty="0" smtClean="0"/>
-              <a:t> XOR </a:t>
+              <a:t> </a:t>
+            </a:r>
+            <a:r>
+              <a:rPr lang="en-US" sz="2400" dirty="0"/>
+              <a:t>⊕ </a:t>
             </a:r>
             <a:r>
               <a:rPr lang="en-US" sz="2400" b="1" dirty="0" smtClean="0">
@@ -49131,7 +49951,7 @@
                   <a:schemeClr val="tx1"/>
                 </a:solidFill>
               </a:rPr>
-              <a:t>XOR </a:t>
+              <a:t>⊕ </a:t>
             </a:r>
             <a:r>
               <a:rPr lang="en-US" sz="2400" dirty="0" smtClean="0">
@@ -49151,7 +49971,11 @@
             </a:r>
             <a:r>
               <a:rPr lang="en-US" sz="2400" dirty="0" smtClean="0"/>
-              <a:t> XOR </a:t>
+              <a:t> </a:t>
+            </a:r>
+            <a:r>
+              <a:rPr lang="en-US" sz="2400" dirty="0"/>
+              <a:t>⊕ </a:t>
             </a:r>
             <a:r>
               <a:rPr lang="en-US" sz="2400" b="1" dirty="0" smtClean="0">
@@ -49538,12 +50362,8 @@
               <a:t> </a:t>
             </a:r>
             <a:r>
-              <a:rPr lang="en-US" sz="2400" dirty="0">
-                <a:solidFill>
-                  <a:schemeClr val="tx1"/>
-                </a:solidFill>
-              </a:rPr>
-              <a:t>XOR </a:t>
+              <a:rPr lang="en-US" sz="2400" dirty="0"/>
+              <a:t>⊕</a:t>
             </a:r>
             <a:r>
               <a:rPr lang="en-US" sz="2400" dirty="0" smtClean="0">
@@ -49551,6 +50371,14 @@
                   <a:schemeClr val="tx1"/>
                 </a:solidFill>
               </a:rPr>
+              <a:t> </a:t>
+            </a:r>
+            <a:r>
+              <a:rPr lang="en-US" sz="2400" dirty="0" smtClean="0">
+                <a:solidFill>
+                  <a:schemeClr val="tx1"/>
+                </a:solidFill>
+              </a:rPr>
               <a:t>C</a:t>
             </a:r>
             <a:r>
@@ -49563,7 +50391,11 @@
             </a:r>
             <a:r>
               <a:rPr lang="en-US" sz="2400" dirty="0" smtClean="0"/>
-              <a:t> XOR </a:t>
+              <a:t> </a:t>
+            </a:r>
+            <a:r>
+              <a:rPr lang="en-US" sz="2400" dirty="0"/>
+              <a:t>⊕ </a:t>
             </a:r>
             <a:r>
               <a:rPr lang="en-US" sz="2400" b="1" dirty="0" smtClean="0">
@@ -49904,12 +50736,8 @@
               <a:t> </a:t>
             </a:r>
             <a:r>
-              <a:rPr lang="en-US" sz="2400" dirty="0">
-                <a:solidFill>
-                  <a:schemeClr val="tx1"/>
-                </a:solidFill>
-              </a:rPr>
-              <a:t>XOR </a:t>
+              <a:rPr lang="en-US" sz="2400" dirty="0"/>
+              <a:t>⊕ </a:t>
             </a:r>
             <a:r>
               <a:rPr lang="en-US" sz="2400" dirty="0" smtClean="0">
@@ -49928,8 +50756,8 @@
               <a:t>0</a:t>
             </a:r>
             <a:r>
-              <a:rPr lang="en-US" sz="2400" dirty="0" smtClean="0"/>
-              <a:t> XOR </a:t>
+              <a:rPr lang="en-US" sz="2400" dirty="0"/>
+              <a:t> ⊕ </a:t>
             </a:r>
             <a:r>
               <a:rPr lang="en-US" sz="2400" b="1" dirty="0" smtClean="0">
@@ -49939,7 +50767,17 @@
                   </a:schemeClr>
                 </a:solidFill>
               </a:rPr>
-              <a:t>C’</a:t>
+              <a:t>C</a:t>
+            </a:r>
+            <a:r>
+              <a:rPr lang="en-US" sz="2400" b="1" dirty="0" smtClean="0">
+                <a:solidFill>
+                  <a:schemeClr val="accent5">
+                    <a:lumMod val="50000"/>
+                  </a:schemeClr>
+                </a:solidFill>
+              </a:rPr>
+              <a:t>’</a:t>
             </a:r>
             <a:endParaRPr lang="en-US" sz="2400" b="1" dirty="0">
               <a:solidFill>
@@ -50207,12 +51045,8 @@
               <a:t> </a:t>
             </a:r>
             <a:r>
-              <a:rPr lang="en-US" sz="2400" dirty="0">
-                <a:solidFill>
-                  <a:schemeClr val="tx1"/>
-                </a:solidFill>
-              </a:rPr>
-              <a:t>XOR </a:t>
+              <a:rPr lang="en-US" sz="2400" dirty="0"/>
+              <a:t>⊕ </a:t>
             </a:r>
             <a:r>
               <a:rPr lang="en-US" sz="2400" dirty="0" smtClean="0">
@@ -50231,12 +51065,20 @@
               <a:t>0</a:t>
             </a:r>
             <a:r>
+              <a:rPr lang="en-US" sz="2400" dirty="0" smtClean="0"/>
+              <a:t>[N</a:t>
+            </a:r>
+            <a:r>
               <a:rPr lang="en-US" sz="2400" dirty="0"/>
-              <a:t>[N]</a:t>
+              <a:t>]</a:t>
             </a:r>
             <a:r>
               <a:rPr lang="en-US" sz="2400" dirty="0" smtClean="0"/>
-              <a:t> XOR </a:t>
+              <a:t> </a:t>
+            </a:r>
+            <a:r>
+              <a:rPr lang="en-US" sz="2400" dirty="0"/>
+              <a:t>⊕ </a:t>
             </a:r>
             <a:r>
               <a:rPr lang="en-US" sz="2400" b="1" dirty="0" smtClean="0">
@@ -50246,7 +51088,17 @@
                   </a:schemeClr>
                 </a:solidFill>
               </a:rPr>
-              <a:t>C’</a:t>
+              <a:t>C</a:t>
+            </a:r>
+            <a:r>
+              <a:rPr lang="en-US" sz="2400" b="1" dirty="0" smtClean="0">
+                <a:solidFill>
+                  <a:schemeClr val="accent5">
+                    <a:lumMod val="50000"/>
+                  </a:schemeClr>
+                </a:solidFill>
+              </a:rPr>
+              <a:t>’</a:t>
             </a:r>
             <a:r>
               <a:rPr lang="en-US" sz="2400" dirty="0" smtClean="0"/>
@@ -50343,12 +51195,8 @@
               <a:t> </a:t>
             </a:r>
             <a:r>
-              <a:rPr lang="en-US" sz="2400" dirty="0">
-                <a:solidFill>
-                  <a:schemeClr val="tx1"/>
-                </a:solidFill>
-              </a:rPr>
-              <a:t>XOR </a:t>
+              <a:rPr lang="en-US" sz="2400" dirty="0"/>
+              <a:t>⊕ </a:t>
             </a:r>
             <a:r>
               <a:rPr lang="en-US" sz="2400" dirty="0" smtClean="0">
@@ -50367,12 +51215,20 @@
               <a:t>0</a:t>
             </a:r>
             <a:r>
+              <a:rPr lang="en-US" sz="2400" dirty="0" smtClean="0"/>
+              <a:t>[N</a:t>
+            </a:r>
+            <a:r>
               <a:rPr lang="en-US" sz="2400" dirty="0"/>
-              <a:t>[N]</a:t>
+              <a:t>]</a:t>
             </a:r>
             <a:r>
               <a:rPr lang="en-US" sz="2400" dirty="0" smtClean="0"/>
-              <a:t> XOR </a:t>
+              <a:t> </a:t>
+            </a:r>
+            <a:r>
+              <a:rPr lang="en-US" sz="2400" dirty="0"/>
+              <a:t>⊕ </a:t>
             </a:r>
             <a:r>
               <a:rPr lang="en-US" sz="2400" b="1" dirty="0" smtClean="0">
@@ -50382,7 +51238,17 @@
                   </a:schemeClr>
                 </a:solidFill>
               </a:rPr>
-              <a:t>C’</a:t>
+              <a:t>C</a:t>
+            </a:r>
+            <a:r>
+              <a:rPr lang="en-US" sz="2400" b="1" dirty="0" smtClean="0">
+                <a:solidFill>
+                  <a:schemeClr val="accent5">
+                    <a:lumMod val="50000"/>
+                  </a:schemeClr>
+                </a:solidFill>
+              </a:rPr>
+              <a:t>’</a:t>
             </a:r>
             <a:r>
               <a:rPr lang="en-US" sz="2400" dirty="0" smtClean="0"/>
@@ -50822,12 +51688,8 @@
               <a:t> </a:t>
             </a:r>
             <a:r>
-              <a:rPr lang="en-US" sz="2400" dirty="0">
-                <a:solidFill>
-                  <a:schemeClr val="tx1"/>
-                </a:solidFill>
-              </a:rPr>
-              <a:t>XOR </a:t>
+              <a:rPr lang="en-US" sz="2400" dirty="0"/>
+              <a:t>⊕ </a:t>
             </a:r>
             <a:r>
               <a:rPr lang="en-US" sz="2400" dirty="0" smtClean="0">
@@ -50846,12 +51708,20 @@
               <a:t>0</a:t>
             </a:r>
             <a:r>
+              <a:rPr lang="en-US" sz="2400" dirty="0" smtClean="0"/>
+              <a:t>[N</a:t>
+            </a:r>
+            <a:r>
               <a:rPr lang="en-US" sz="2400" dirty="0"/>
-              <a:t>[N]</a:t>
+              <a:t>]</a:t>
             </a:r>
             <a:r>
               <a:rPr lang="en-US" sz="2400" dirty="0" smtClean="0"/>
-              <a:t> XOR </a:t>
+              <a:t> </a:t>
+            </a:r>
+            <a:r>
+              <a:rPr lang="en-US" sz="2400" dirty="0"/>
+              <a:t>⊕ </a:t>
             </a:r>
             <a:r>
               <a:rPr lang="en-US" sz="2400" b="1" dirty="0" smtClean="0">
@@ -50861,7 +51731,17 @@
                   </a:schemeClr>
                 </a:solidFill>
               </a:rPr>
-              <a:t>C’</a:t>
+              <a:t>C</a:t>
+            </a:r>
+            <a:r>
+              <a:rPr lang="en-US" sz="2400" b="1" dirty="0" smtClean="0">
+                <a:solidFill>
+                  <a:schemeClr val="accent5">
+                    <a:lumMod val="50000"/>
+                  </a:schemeClr>
+                </a:solidFill>
+              </a:rPr>
+              <a:t>’</a:t>
             </a:r>
             <a:r>
               <a:rPr lang="en-US" sz="2400" dirty="0"/>
@@ -50934,12 +51814,8 @@
               <a:t>0x01 </a:t>
             </a:r>
             <a:r>
-              <a:rPr lang="en-US" sz="2400" dirty="0">
-                <a:solidFill>
-                  <a:schemeClr val="tx1"/>
-                </a:solidFill>
-              </a:rPr>
-              <a:t>XOR </a:t>
+              <a:rPr lang="en-US" sz="2400" dirty="0"/>
+              <a:t>⊕ </a:t>
             </a:r>
             <a:r>
               <a:rPr lang="en-US" sz="2400" dirty="0" smtClean="0">
@@ -50950,8 +51826,8 @@
               <a:t>0x22</a:t>
             </a:r>
             <a:r>
-              <a:rPr lang="en-US" sz="2400" dirty="0" smtClean="0"/>
-              <a:t> XOR </a:t>
+              <a:rPr lang="en-US" sz="2400" dirty="0"/>
+              <a:t> ⊕ </a:t>
             </a:r>
             <a:r>
               <a:rPr lang="en-US" sz="2400" b="1" dirty="0" smtClean="0">
@@ -51263,7 +52139,11 @@
           <a:p>
             <a:r>
               <a:rPr lang="en-US" dirty="0" smtClean="0"/>
-              <a:t>Padding oracles: Prevention</a:t>
+              <a:t>Introducing: </a:t>
+            </a:r>
+            <a:r>
+              <a:rPr lang="en-US" dirty="0" err="1" smtClean="0"/>
+              <a:t>Poracle</a:t>
             </a:r>
             <a:endParaRPr lang="en-US" dirty="0"/>
           </a:p>
@@ -51281,62 +52161,41 @@
         </p:nvSpPr>
         <p:spPr/>
         <p:txBody>
-          <a:bodyPr>
-            <a:normAutofit fontScale="92500" lnSpcReduction="10000"/>
-          </a:bodyPr>
+          <a:bodyPr/>
           <a:lstStyle/>
           <a:p>
             <a:r>
               <a:rPr lang="en-US" dirty="0" smtClean="0"/>
-              <a:t>How do you prevent padding oracles?</a:t>
-            </a:r>
-          </a:p>
-          <a:p>
-            <a:pPr lvl="1"/>
+              <a:t>Like all these attacks, I wrote a tool</a:t>
+            </a:r>
+          </a:p>
+          <a:p>
             <a:r>
               <a:rPr lang="en-US" dirty="0" smtClean="0"/>
-              <a:t>HMAC!</a:t>
-            </a:r>
-          </a:p>
-          <a:p>
+              <a:t>This one’s called “</a:t>
+            </a:r>
+            <a:r>
+              <a:rPr lang="en-US" dirty="0" err="1" smtClean="0"/>
+              <a:t>Poracle</a:t>
+            </a:r>
             <a:r>
               <a:rPr lang="en-US" dirty="0" smtClean="0"/>
-              <a:t>By prepending an HMAC hash to the encrypted data – </a:t>
-            </a:r>
-            <a:r>
-              <a:rPr lang="en-US" i="1" dirty="0" smtClean="0"/>
-              <a:t>and validating it before the decryption is performed</a:t>
-            </a:r>
+              <a:t>”</a:t>
+            </a:r>
+          </a:p>
+          <a:p>
             <a:r>
               <a:rPr lang="en-US" dirty="0" smtClean="0"/>
-              <a:t> – you can check if anybody has tampered with the hash!</a:t>
-            </a:r>
-          </a:p>
-          <a:p>
-            <a:r>
-              <a:rPr lang="en-US" dirty="0" smtClean="0"/>
-              <a:t>You can also prevent this by using a block cipher mode of operation other than cipher-block chaining – </a:t>
-            </a:r>
-            <a:r>
-              <a:rPr lang="en-US" dirty="0" err="1" smtClean="0"/>
-              <a:t>eg</a:t>
-            </a:r>
-            <a:r>
-              <a:rPr lang="en-US" dirty="0" smtClean="0"/>
-              <a:t>, counter mode, output feedback, </a:t>
-            </a:r>
-            <a:r>
-              <a:rPr lang="en-US" smtClean="0"/>
-              <a:t>plaintext feedback, etc.</a:t>
-            </a:r>
-            <a:endParaRPr lang="en-US"/>
+              <a:t>Let’s see it in action!</a:t>
+            </a:r>
+            <a:endParaRPr lang="en-US" dirty="0"/>
           </a:p>
         </p:txBody>
       </p:sp>
     </p:spTree>
     <p:extLst>
       <p:ext uri="{BB962C8B-B14F-4D97-AF65-F5344CB8AC3E}">
-        <p14:creationId xmlns:p14="http://schemas.microsoft.com/office/powerpoint/2010/main" val="1640138364"/>
+        <p14:creationId xmlns:p14="http://schemas.microsoft.com/office/powerpoint/2010/main" val="2818765991"/>
       </p:ext>
     </p:extLst>
   </p:cSld>
@@ -51419,11 +52278,11 @@
           <a:p>
             <a:r>
               <a:rPr lang="en-US" sz="2000" dirty="0" smtClean="0"/>
-              <a:t>Not shown: the part where they call me a </a:t>
+              <a:t>Not shown: the part where they call </a:t>
             </a:r>
             <a:r>
               <a:rPr lang="en-US" sz="2000" dirty="0" smtClean="0"/>
-              <a:t>f**</a:t>
+              <a:t>OP a “fag” (&lt;3 4chan)</a:t>
             </a:r>
             <a:endParaRPr lang="en-US" sz="2000" dirty="0"/>
           </a:p>
@@ -51480,6 +52339,372 @@
 </file>
 
 <file path=ppt/slides/slide90.xml><?xml version="1.0" encoding="utf-8"?>
+<p:sld xmlns:a="http://schemas.openxmlformats.org/drawingml/2006/main" xmlns:r="http://schemas.openxmlformats.org/officeDocument/2006/relationships" xmlns:p="http://schemas.openxmlformats.org/presentationml/2006/main">
+  <p:cSld>
+    <p:spTree>
+      <p:nvGrpSpPr>
+        <p:cNvPr id="1" name=""/>
+        <p:cNvGrpSpPr/>
+        <p:nvPr/>
+      </p:nvGrpSpPr>
+      <p:grpSpPr>
+        <a:xfrm>
+          <a:off x="0" y="0"/>
+          <a:ext cx="0" cy="0"/>
+          <a:chOff x="0" y="0"/>
+          <a:chExt cx="0" cy="0"/>
+        </a:xfrm>
+      </p:grpSpPr>
+      <p:sp>
+        <p:nvSpPr>
+          <p:cNvPr id="2" name="Title 1"/>
+          <p:cNvSpPr>
+            <a:spLocks noGrp="1"/>
+          </p:cNvSpPr>
+          <p:nvPr>
+            <p:ph type="title"/>
+          </p:nvPr>
+        </p:nvSpPr>
+        <p:spPr/>
+        <p:txBody>
+          <a:bodyPr>
+            <a:normAutofit fontScale="90000"/>
+          </a:bodyPr>
+          <a:lstStyle/>
+          <a:p>
+            <a:r>
+              <a:rPr lang="en-US" dirty="0" smtClean="0"/>
+              <a:t>We made it through padding oracles!</a:t>
+            </a:r>
+            <a:endParaRPr lang="en-US" dirty="0"/>
+          </a:p>
+        </p:txBody>
+      </p:sp>
+      <p:sp>
+        <p:nvSpPr>
+          <p:cNvPr id="3" name="Content Placeholder 2"/>
+          <p:cNvSpPr>
+            <a:spLocks noGrp="1"/>
+          </p:cNvSpPr>
+          <p:nvPr>
+            <p:ph idx="1"/>
+          </p:nvPr>
+        </p:nvSpPr>
+        <p:spPr/>
+        <p:txBody>
+          <a:bodyPr/>
+          <a:lstStyle/>
+          <a:p>
+            <a:r>
+              <a:rPr lang="en-US" dirty="0" smtClean="0"/>
+              <a:t>Give each other a high five, and sit back and watch the demo</a:t>
+            </a:r>
+            <a:endParaRPr lang="en-US" dirty="0"/>
+          </a:p>
+        </p:txBody>
+      </p:sp>
+      <p:pic>
+        <p:nvPicPr>
+          <p:cNvPr id="4" name="Picture 2" descr="https://gs1.wac.edgecastcdn.net/8019B6/data.tumblr.com/tumblr_mcxhnl6tAx1rksg3yo1_500.jpg"/>
+          <p:cNvPicPr>
+            <a:picLocks noChangeAspect="1" noChangeArrowheads="1"/>
+          </p:cNvPicPr>
+          <p:nvPr/>
+        </p:nvPicPr>
+        <p:blipFill>
+          <a:blip r:embed="rId2">
+            <a:extLst>
+              <a:ext uri="{28A0092B-C50C-407E-A947-70E740481C1C}">
+                <a14:useLocalDpi xmlns:a14="http://schemas.microsoft.com/office/drawing/2010/main" val="0"/>
+              </a:ext>
+            </a:extLst>
+          </a:blip>
+          <a:srcRect/>
+          <a:stretch>
+            <a:fillRect/>
+          </a:stretch>
+        </p:blipFill>
+        <p:spPr bwMode="auto">
+          <a:xfrm>
+            <a:off x="1300843" y="2895600"/>
+            <a:ext cx="6847114" cy="3834384"/>
+          </a:xfrm>
+          <a:prstGeom prst="rect">
+            <a:avLst/>
+          </a:prstGeom>
+          <a:noFill/>
+          <a:extLst>
+            <a:ext uri="{909E8E84-426E-40DD-AFC4-6F175D3DCCD1}">
+              <a14:hiddenFill xmlns:a14="http://schemas.microsoft.com/office/drawing/2010/main">
+                <a:solidFill>
+                  <a:srgbClr val="FFFFFF"/>
+                </a:solidFill>
+              </a14:hiddenFill>
+            </a:ext>
+          </a:extLst>
+        </p:spPr>
+      </p:pic>
+    </p:spTree>
+    <p:extLst>
+      <p:ext uri="{BB962C8B-B14F-4D97-AF65-F5344CB8AC3E}">
+        <p14:creationId xmlns:p14="http://schemas.microsoft.com/office/powerpoint/2010/main" val="2736760537"/>
+      </p:ext>
+    </p:extLst>
+  </p:cSld>
+  <p:clrMapOvr>
+    <a:masterClrMapping/>
+  </p:clrMapOvr>
+  <p:timing>
+    <p:tnLst>
+      <p:par>
+        <p:cTn id="1" dur="indefinite" restart="never" nodeType="tmRoot"/>
+      </p:par>
+    </p:tnLst>
+  </p:timing>
+</p:sld>
+</file>
+
+<file path=ppt/slides/slide91.xml><?xml version="1.0" encoding="utf-8"?>
+<p:sld xmlns:a="http://schemas.openxmlformats.org/drawingml/2006/main" xmlns:r="http://schemas.openxmlformats.org/officeDocument/2006/relationships" xmlns:p="http://schemas.openxmlformats.org/presentationml/2006/main">
+  <p:cSld>
+    <p:spTree>
+      <p:nvGrpSpPr>
+        <p:cNvPr id="1" name=""/>
+        <p:cNvGrpSpPr/>
+        <p:nvPr/>
+      </p:nvGrpSpPr>
+      <p:grpSpPr>
+        <a:xfrm>
+          <a:off x="0" y="0"/>
+          <a:ext cx="0" cy="0"/>
+          <a:chOff x="0" y="0"/>
+          <a:chExt cx="0" cy="0"/>
+        </a:xfrm>
+      </p:grpSpPr>
+      <p:sp>
+        <p:nvSpPr>
+          <p:cNvPr id="2" name="Title 1"/>
+          <p:cNvSpPr>
+            <a:spLocks noGrp="1"/>
+          </p:cNvSpPr>
+          <p:nvPr>
+            <p:ph type="title"/>
+          </p:nvPr>
+        </p:nvSpPr>
+        <p:spPr/>
+        <p:txBody>
+          <a:bodyPr/>
+          <a:lstStyle/>
+          <a:p>
+            <a:r>
+              <a:rPr lang="en-US" dirty="0" smtClean="0"/>
+              <a:t>Padding oracles: Prevention</a:t>
+            </a:r>
+            <a:endParaRPr lang="en-US" dirty="0"/>
+          </a:p>
+        </p:txBody>
+      </p:sp>
+      <p:sp>
+        <p:nvSpPr>
+          <p:cNvPr id="3" name="Content Placeholder 2"/>
+          <p:cNvSpPr>
+            <a:spLocks noGrp="1"/>
+          </p:cNvSpPr>
+          <p:nvPr>
+            <p:ph idx="1"/>
+          </p:nvPr>
+        </p:nvSpPr>
+        <p:spPr/>
+        <p:txBody>
+          <a:bodyPr>
+            <a:normAutofit fontScale="92500" lnSpcReduction="10000"/>
+          </a:bodyPr>
+          <a:lstStyle/>
+          <a:p>
+            <a:r>
+              <a:rPr lang="en-US" dirty="0" smtClean="0"/>
+              <a:t>How do you prevent padding oracles?</a:t>
+            </a:r>
+          </a:p>
+          <a:p>
+            <a:pPr lvl="1"/>
+            <a:r>
+              <a:rPr lang="en-US" dirty="0" smtClean="0"/>
+              <a:t>HMAC!</a:t>
+            </a:r>
+          </a:p>
+          <a:p>
+            <a:r>
+              <a:rPr lang="en-US" dirty="0" smtClean="0"/>
+              <a:t>By prepending an HMAC hash to the encrypted data – </a:t>
+            </a:r>
+            <a:r>
+              <a:rPr lang="en-US" i="1" dirty="0" smtClean="0"/>
+              <a:t>and validating it before the decryption is performed</a:t>
+            </a:r>
+            <a:r>
+              <a:rPr lang="en-US" dirty="0" smtClean="0"/>
+              <a:t> – you can check if anybody has tampered with the hash!</a:t>
+            </a:r>
+          </a:p>
+          <a:p>
+            <a:r>
+              <a:rPr lang="en-US" dirty="0" smtClean="0"/>
+              <a:t>You can also prevent this by using a block cipher mode of operation other than cipher-block chaining – </a:t>
+            </a:r>
+            <a:r>
+              <a:rPr lang="en-US" dirty="0" err="1" smtClean="0"/>
+              <a:t>eg</a:t>
+            </a:r>
+            <a:r>
+              <a:rPr lang="en-US" dirty="0" smtClean="0"/>
+              <a:t>, counter mode, output feedback, plaintext feedback, etc.</a:t>
+            </a:r>
+            <a:endParaRPr lang="en-US" dirty="0"/>
+          </a:p>
+        </p:txBody>
+      </p:sp>
+    </p:spTree>
+    <p:extLst>
+      <p:ext uri="{BB962C8B-B14F-4D97-AF65-F5344CB8AC3E}">
+        <p14:creationId xmlns:p14="http://schemas.microsoft.com/office/powerpoint/2010/main" val="1640138364"/>
+      </p:ext>
+    </p:extLst>
+  </p:cSld>
+  <p:clrMapOvr>
+    <a:masterClrMapping/>
+  </p:clrMapOvr>
+  <p:timing>
+    <p:tnLst>
+      <p:par>
+        <p:cTn id="1" dur="indefinite" restart="never" nodeType="tmRoot"/>
+      </p:par>
+    </p:tnLst>
+  </p:timing>
+</p:sld>
+</file>
+
+<file path=ppt/slides/slide92.xml><?xml version="1.0" encoding="utf-8"?>
+<p:sld xmlns:a="http://schemas.openxmlformats.org/drawingml/2006/main" xmlns:r="http://schemas.openxmlformats.org/officeDocument/2006/relationships" xmlns:p="http://schemas.openxmlformats.org/presentationml/2006/main">
+  <p:cSld>
+    <p:spTree>
+      <p:nvGrpSpPr>
+        <p:cNvPr id="1" name=""/>
+        <p:cNvGrpSpPr/>
+        <p:nvPr/>
+      </p:nvGrpSpPr>
+      <p:grpSpPr>
+        <a:xfrm>
+          <a:off x="0" y="0"/>
+          <a:ext cx="0" cy="0"/>
+          <a:chOff x="0" y="0"/>
+          <a:chExt cx="0" cy="0"/>
+        </a:xfrm>
+      </p:grpSpPr>
+      <p:sp>
+        <p:nvSpPr>
+          <p:cNvPr id="2" name="Title 1"/>
+          <p:cNvSpPr>
+            <a:spLocks noGrp="1"/>
+          </p:cNvSpPr>
+          <p:nvPr>
+            <p:ph type="title"/>
+          </p:nvPr>
+        </p:nvSpPr>
+        <p:spPr/>
+        <p:txBody>
+          <a:bodyPr/>
+          <a:lstStyle/>
+          <a:p>
+            <a:r>
+              <a:rPr lang="en-US" dirty="0" smtClean="0"/>
+              <a:t>Almost there!</a:t>
+            </a:r>
+            <a:endParaRPr lang="en-US" dirty="0"/>
+          </a:p>
+        </p:txBody>
+      </p:sp>
+      <p:sp>
+        <p:nvSpPr>
+          <p:cNvPr id="3" name="Content Placeholder 2"/>
+          <p:cNvSpPr>
+            <a:spLocks noGrp="1"/>
+          </p:cNvSpPr>
+          <p:nvPr>
+            <p:ph idx="1"/>
+          </p:nvPr>
+        </p:nvSpPr>
+        <p:spPr/>
+        <p:txBody>
+          <a:bodyPr/>
+          <a:lstStyle/>
+          <a:p>
+            <a:endParaRPr lang="en-US"/>
+          </a:p>
+        </p:txBody>
+      </p:sp>
+      <p:pic>
+        <p:nvPicPr>
+          <p:cNvPr id="10242" name="Picture 2" descr="https://lh3.ggpht.com/-ajTe66KAecQ/TXf4NYSlC8I/AAAAAAAAACw/LAxtSwk6jmk/s1600/129136986998794039.jpg"/>
+          <p:cNvPicPr>
+            <a:picLocks noChangeAspect="1" noChangeArrowheads="1"/>
+          </p:cNvPicPr>
+          <p:nvPr/>
+        </p:nvPicPr>
+        <p:blipFill>
+          <a:blip r:embed="rId2">
+            <a:extLst>
+              <a:ext uri="{28A0092B-C50C-407E-A947-70E740481C1C}">
+                <a14:useLocalDpi xmlns:a14="http://schemas.microsoft.com/office/drawing/2010/main" val="0"/>
+              </a:ext>
+            </a:extLst>
+          </a:blip>
+          <a:srcRect/>
+          <a:stretch>
+            <a:fillRect/>
+          </a:stretch>
+        </p:blipFill>
+        <p:spPr bwMode="auto">
+          <a:xfrm>
+            <a:off x="1295400" y="1752600"/>
+            <a:ext cx="6629400" cy="4945532"/>
+          </a:xfrm>
+          <a:prstGeom prst="rect">
+            <a:avLst/>
+          </a:prstGeom>
+          <a:noFill/>
+          <a:extLst>
+            <a:ext uri="{909E8E84-426E-40DD-AFC4-6F175D3DCCD1}">
+              <a14:hiddenFill xmlns:a14="http://schemas.microsoft.com/office/drawing/2010/main">
+                <a:solidFill>
+                  <a:srgbClr val="FFFFFF"/>
+                </a:solidFill>
+              </a14:hiddenFill>
+            </a:ext>
+          </a:extLst>
+        </p:spPr>
+      </p:pic>
+    </p:spTree>
+    <p:extLst>
+      <p:ext uri="{BB962C8B-B14F-4D97-AF65-F5344CB8AC3E}">
+        <p14:creationId xmlns:p14="http://schemas.microsoft.com/office/powerpoint/2010/main" val="1729240493"/>
+      </p:ext>
+    </p:extLst>
+  </p:cSld>
+  <p:clrMapOvr>
+    <a:masterClrMapping/>
+  </p:clrMapOvr>
+  <p:timing>
+    <p:tnLst>
+      <p:par>
+        <p:cTn id="1" dur="indefinite" restart="never" nodeType="tmRoot"/>
+      </p:par>
+    </p:tnLst>
+  </p:timing>
+</p:sld>
+</file>
+
+<file path=ppt/slides/slide93.xml><?xml version="1.0" encoding="utf-8"?>
 <p:sld xmlns:a="http://schemas.openxmlformats.org/drawingml/2006/main" xmlns:r="http://schemas.openxmlformats.org/officeDocument/2006/relationships" xmlns:p="http://schemas.openxmlformats.org/presentationml/2006/main">
   <p:cSld>
     <p:spTree>
@@ -51660,7 +52885,88 @@
 </p:sld>
 </file>
 
-<file path=ppt/slides/slide91.xml><?xml version="1.0" encoding="utf-8"?>
+<file path=ppt/slides/slide94.xml><?xml version="1.0" encoding="utf-8"?>
+<p:sld xmlns:a="http://schemas.openxmlformats.org/drawingml/2006/main" xmlns:r="http://schemas.openxmlformats.org/officeDocument/2006/relationships" xmlns:p="http://schemas.openxmlformats.org/presentationml/2006/main">
+  <p:cSld>
+    <p:spTree>
+      <p:nvGrpSpPr>
+        <p:cNvPr id="1" name=""/>
+        <p:cNvGrpSpPr/>
+        <p:nvPr/>
+      </p:nvGrpSpPr>
+      <p:grpSpPr>
+        <a:xfrm>
+          <a:off x="0" y="0"/>
+          <a:ext cx="0" cy="0"/>
+          <a:chOff x="0" y="0"/>
+          <a:chExt cx="0" cy="0"/>
+        </a:xfrm>
+      </p:grpSpPr>
+      <p:sp>
+        <p:nvSpPr>
+          <p:cNvPr id="4" name="Title 3"/>
+          <p:cNvSpPr>
+            <a:spLocks noGrp="1"/>
+          </p:cNvSpPr>
+          <p:nvPr>
+            <p:ph type="title"/>
+          </p:nvPr>
+        </p:nvSpPr>
+        <p:spPr/>
+        <p:txBody>
+          <a:bodyPr>
+            <a:normAutofit fontScale="90000"/>
+          </a:bodyPr>
+          <a:lstStyle/>
+          <a:p>
+            <a:r>
+              <a:rPr lang="en-US" dirty="0" smtClean="0"/>
+              <a:t>Solution #1: don’t give attackers encrypted data</a:t>
+            </a:r>
+            <a:endParaRPr lang="en-US" dirty="0"/>
+          </a:p>
+        </p:txBody>
+      </p:sp>
+      <p:sp>
+        <p:nvSpPr>
+          <p:cNvPr id="5" name="Content Placeholder 4"/>
+          <p:cNvSpPr>
+            <a:spLocks noGrp="1"/>
+          </p:cNvSpPr>
+          <p:nvPr>
+            <p:ph idx="1"/>
+          </p:nvPr>
+        </p:nvSpPr>
+        <p:spPr/>
+        <p:txBody>
+          <a:bodyPr/>
+          <a:lstStyle/>
+          <a:p>
+            <a:endParaRPr lang="en-US" dirty="0"/>
+          </a:p>
+        </p:txBody>
+      </p:sp>
+    </p:spTree>
+    <p:extLst>
+      <p:ext uri="{BB962C8B-B14F-4D97-AF65-F5344CB8AC3E}">
+        <p14:creationId xmlns:p14="http://schemas.microsoft.com/office/powerpoint/2010/main" val="360182384"/>
+      </p:ext>
+    </p:extLst>
+  </p:cSld>
+  <p:clrMapOvr>
+    <a:masterClrMapping/>
+  </p:clrMapOvr>
+  <p:timing>
+    <p:tnLst>
+      <p:par>
+        <p:cTn id="1" dur="indefinite" restart="never" nodeType="tmRoot"/>
+      </p:par>
+    </p:tnLst>
+  </p:timing>
+</p:sld>
+</file>
+
+<file path=ppt/slides/slide95.xml><?xml version="1.0" encoding="utf-8"?>
 <p:sld xmlns:a="http://schemas.openxmlformats.org/drawingml/2006/main" xmlns:r="http://schemas.openxmlformats.org/officeDocument/2006/relationships" xmlns:p="http://schemas.openxmlformats.org/presentationml/2006/main">
   <p:cSld>
     <p:spTree>
@@ -51692,22 +52998,18 @@
           <a:bodyPr/>
           <a:lstStyle/>
           <a:p>
-            <a:r>
-              <a:rPr lang="en-US" dirty="0" smtClean="0"/>
-              <a:t>All done!</a:t>
-            </a:r>
-            <a:endParaRPr lang="en-US" dirty="0"/>
+            <a:endParaRPr lang="en-US"/>
           </a:p>
         </p:txBody>
       </p:sp>
       <p:sp>
         <p:nvSpPr>
-          <p:cNvPr id="3" name="Text Placeholder 2"/>
+          <p:cNvPr id="3" name="Content Placeholder 2"/>
           <p:cNvSpPr>
             <a:spLocks noGrp="1"/>
           </p:cNvSpPr>
           <p:nvPr>
-            <p:ph type="body" idx="1"/>
+            <p:ph idx="1"/>
           </p:nvPr>
         </p:nvSpPr>
         <p:spPr/>
@@ -51715,14 +53017,55 @@
           <a:bodyPr/>
           <a:lstStyle/>
           <a:p>
-            <a:endParaRPr lang="en-US" dirty="0"/>
+            <a:endParaRPr lang="en-US"/>
           </a:p>
         </p:txBody>
       </p:sp>
+      <p:pic>
+        <p:nvPicPr>
+          <p:cNvPr id="6146" name="Picture 2" descr="if you let attackers hold your encrypted data youre gonna h - Super Cool Ski Instructor"/>
+          <p:cNvPicPr>
+            <a:picLocks noChangeAspect="1" noChangeArrowheads="1"/>
+          </p:cNvPicPr>
+          <p:nvPr/>
+        </p:nvPicPr>
+        <p:blipFill>
+          <a:blip r:embed="rId2">
+            <a:extLst>
+              <a:ext uri="{28A0092B-C50C-407E-A947-70E740481C1C}">
+                <a14:useLocalDpi xmlns:a14="http://schemas.microsoft.com/office/drawing/2010/main" val="0"/>
+              </a:ext>
+            </a:extLst>
+          </a:blip>
+          <a:srcRect/>
+          <a:stretch>
+            <a:fillRect/>
+          </a:stretch>
+        </p:blipFill>
+        <p:spPr bwMode="auto">
+          <a:xfrm>
+            <a:off x="838200" y="1592580"/>
+            <a:ext cx="7543800" cy="5092066"/>
+          </a:xfrm>
+          <a:prstGeom prst="rect">
+            <a:avLst/>
+          </a:prstGeom>
+          <a:noFill/>
+          <a:extLst>
+            <a:ext uri="{909E8E84-426E-40DD-AFC4-6F175D3DCCD1}">
+              <a14:hiddenFill xmlns:a14="http://schemas.microsoft.com/office/drawing/2010/main">
+                <a:solidFill>
+                  <a:srgbClr val="FFFFFF"/>
+                </a:solidFill>
+              </a14:hiddenFill>
+            </a:ext>
+          </a:extLst>
+        </p:spPr>
+      </p:pic>
     </p:spTree>
     <p:extLst>
       <p:ext uri="{BB962C8B-B14F-4D97-AF65-F5344CB8AC3E}">
-        <p14:creationId xmlns:p14="http://schemas.microsoft.com/office/powerpoint/2010/main" val="2565735704"/>
+        <p14:creationId xmlns:p14="http://schemas.microsoft.com/office/powerpoint/2010/main" val="663724246"/>
       </p:ext>
     </p:extLst>
   </p:cSld>
@@ -51739,7 +53082,7 @@
 </p:sld>
 </file>
 
-<file path=ppt/slides/slide92.xml><?xml version="1.0" encoding="utf-8"?>
+<file path=ppt/slides/slide96.xml><?xml version="1.0" encoding="utf-8"?>
 <p:sld xmlns:a="http://schemas.openxmlformats.org/drawingml/2006/main" xmlns:r="http://schemas.openxmlformats.org/officeDocument/2006/relationships" xmlns:p="http://schemas.openxmlformats.org/presentationml/2006/main">
   <p:cSld>
     <p:spTree>
@@ -51758,7 +53101,124 @@
       </p:grpSpPr>
       <p:sp>
         <p:nvSpPr>
-          <p:cNvPr id="4" name="Title 3"/>
+          <p:cNvPr id="2" name="Title 1"/>
+          <p:cNvSpPr>
+            <a:spLocks noGrp="1"/>
+          </p:cNvSpPr>
+          <p:nvPr>
+            <p:ph type="title"/>
+          </p:nvPr>
+        </p:nvSpPr>
+        <p:spPr/>
+        <p:txBody>
+          <a:bodyPr>
+            <a:normAutofit fontScale="90000"/>
+          </a:bodyPr>
+          <a:lstStyle/>
+          <a:p>
+            <a:r>
+              <a:rPr lang="en-US" dirty="0" smtClean="0"/>
+              <a:t>Solution #2: When you give them encrypted data, validate it</a:t>
+            </a:r>
+            <a:endParaRPr lang="en-US" dirty="0"/>
+          </a:p>
+        </p:txBody>
+      </p:sp>
+      <p:sp>
+        <p:nvSpPr>
+          <p:cNvPr id="3" name="Content Placeholder 2"/>
+          <p:cNvSpPr>
+            <a:spLocks noGrp="1"/>
+          </p:cNvSpPr>
+          <p:nvPr>
+            <p:ph idx="1"/>
+          </p:nvPr>
+        </p:nvSpPr>
+        <p:spPr/>
+        <p:txBody>
+          <a:bodyPr>
+            <a:normAutofit lnSpcReduction="10000"/>
+          </a:bodyPr>
+          <a:lstStyle/>
+          <a:p>
+            <a:r>
+              <a:rPr lang="en-US" dirty="0" smtClean="0"/>
+              <a:t>Calculate a HMAC and send it with the encrypted data</a:t>
+            </a:r>
+          </a:p>
+          <a:p>
+            <a:pPr lvl="1"/>
+            <a:r>
+              <a:rPr lang="en-US" dirty="0" smtClean="0"/>
+              <a:t>Validate the HMAC before attempting to decrypt</a:t>
+            </a:r>
+          </a:p>
+          <a:p>
+            <a:r>
+              <a:rPr lang="en-US" dirty="0" smtClean="0"/>
+              <a:t>Alternatively, use encryption in “EAX mode” – a NIST standard for authenticated encryption</a:t>
+            </a:r>
+          </a:p>
+          <a:p>
+            <a:r>
+              <a:rPr lang="en-US" dirty="0" smtClean="0"/>
+              <a:t>Coming soon: CAESAR</a:t>
+            </a:r>
+          </a:p>
+          <a:p>
+            <a:pPr lvl="1"/>
+            <a:r>
+              <a:rPr lang="en-US" b="1" dirty="0"/>
+              <a:t>CAESAR: Competition for Authenticated Encryption: Security, Applicability, and </a:t>
+            </a:r>
+            <a:r>
+              <a:rPr lang="en-US" b="1" dirty="0" smtClean="0"/>
+              <a:t>Robustness</a:t>
+            </a:r>
+            <a:endParaRPr lang="en-US" b="1" dirty="0"/>
+          </a:p>
+        </p:txBody>
+      </p:sp>
+    </p:spTree>
+    <p:extLst>
+      <p:ext uri="{BB962C8B-B14F-4D97-AF65-F5344CB8AC3E}">
+        <p14:creationId xmlns:p14="http://schemas.microsoft.com/office/powerpoint/2010/main" val="1771997933"/>
+      </p:ext>
+    </p:extLst>
+  </p:cSld>
+  <p:clrMapOvr>
+    <a:masterClrMapping/>
+  </p:clrMapOvr>
+  <p:timing>
+    <p:tnLst>
+      <p:par>
+        <p:cTn id="1" dur="indefinite" restart="never" nodeType="tmRoot"/>
+      </p:par>
+    </p:tnLst>
+  </p:timing>
+</p:sld>
+</file>
+
+<file path=ppt/slides/slide97.xml><?xml version="1.0" encoding="utf-8"?>
+<p:sld xmlns:a="http://schemas.openxmlformats.org/drawingml/2006/main" xmlns:r="http://schemas.openxmlformats.org/officeDocument/2006/relationships" xmlns:p="http://schemas.openxmlformats.org/presentationml/2006/main">
+  <p:cSld>
+    <p:spTree>
+      <p:nvGrpSpPr>
+        <p:cNvPr id="1" name=""/>
+        <p:cNvGrpSpPr/>
+        <p:nvPr/>
+      </p:nvGrpSpPr>
+      <p:grpSpPr>
+        <a:xfrm>
+          <a:off x="0" y="0"/>
+          <a:ext cx="0" cy="0"/>
+          <a:chOff x="0" y="0"/>
+          <a:chExt cx="0" cy="0"/>
+        </a:xfrm>
+      </p:grpSpPr>
+      <p:sp>
+        <p:nvSpPr>
+          <p:cNvPr id="2" name="Title 1"/>
           <p:cNvSpPr>
             <a:spLocks noGrp="1"/>
           </p:cNvSpPr>
@@ -51773,7 +53233,7 @@
           <a:p>
             <a:r>
               <a:rPr lang="en-US" dirty="0" smtClean="0"/>
-              <a:t>Links + Contact info</a:t>
+              <a:t>It bears repeating…</a:t>
             </a:r>
             <a:endParaRPr lang="en-US" dirty="0"/>
           </a:p>
@@ -51781,7 +53241,7 @@
       </p:sp>
       <p:sp>
         <p:nvSpPr>
-          <p:cNvPr id="5" name="Content Placeholder 4"/>
+          <p:cNvPr id="3" name="Content Placeholder 2"/>
           <p:cNvSpPr>
             <a:spLocks noGrp="1"/>
           </p:cNvSpPr>
@@ -51791,137 +53251,163 @@
         </p:nvSpPr>
         <p:spPr/>
         <p:txBody>
+          <a:bodyPr/>
+          <a:lstStyle/>
+          <a:p>
+            <a:endParaRPr lang="en-US"/>
+          </a:p>
+        </p:txBody>
+      </p:sp>
+      <p:pic>
+        <p:nvPicPr>
+          <p:cNvPr id="4" name="Content Placeholder 3"/>
+          <p:cNvPicPr>
+            <a:picLocks noGrp="1" noChangeAspect="1"/>
+          </p:cNvPicPr>
+          <p:nvPr>
+            <p:ph idx="1"/>
+          </p:nvPr>
+        </p:nvPicPr>
+        <p:blipFill>
+          <a:blip r:embed="rId2">
+            <a:extLst>
+              <a:ext uri="{28A0092B-C50C-407E-A947-70E740481C1C}">
+                <a14:useLocalDpi xmlns:a14="http://schemas.microsoft.com/office/drawing/2010/main" val="0"/>
+              </a:ext>
+            </a:extLst>
+          </a:blip>
+          <a:stretch>
+            <a:fillRect/>
+          </a:stretch>
+        </p:blipFill>
+        <p:spPr>
+          <a:xfrm>
+            <a:off x="685800" y="1447800"/>
+            <a:ext cx="8015111" cy="5410200"/>
+          </a:xfrm>
+        </p:spPr>
+      </p:pic>
+      <p:pic>
+        <p:nvPicPr>
+          <p:cNvPr id="5" name="Content Placeholder 3"/>
+          <p:cNvPicPr>
+            <a:picLocks noChangeAspect="1"/>
+          </p:cNvPicPr>
+          <p:nvPr/>
+        </p:nvPicPr>
+        <p:blipFill>
+          <a:blip r:embed="rId2">
+            <a:extLst>
+              <a:ext uri="{28A0092B-C50C-407E-A947-70E740481C1C}">
+                <a14:useLocalDpi xmlns:a14="http://schemas.microsoft.com/office/drawing/2010/main" val="0"/>
+              </a:ext>
+            </a:extLst>
+          </a:blip>
+          <a:stretch>
+            <a:fillRect/>
+          </a:stretch>
+        </p:blipFill>
+        <p:spPr>
+          <a:xfrm>
+            <a:off x="762000" y="1371600"/>
+            <a:ext cx="8015111" cy="5410200"/>
+          </a:xfrm>
+          <a:prstGeom prst="rect">
+            <a:avLst/>
+          </a:prstGeom>
+        </p:spPr>
+      </p:pic>
+    </p:spTree>
+    <p:extLst>
+      <p:ext uri="{BB962C8B-B14F-4D97-AF65-F5344CB8AC3E}">
+        <p14:creationId xmlns:p14="http://schemas.microsoft.com/office/powerpoint/2010/main" val="1993946077"/>
+      </p:ext>
+    </p:extLst>
+  </p:cSld>
+  <p:clrMapOvr>
+    <a:masterClrMapping/>
+  </p:clrMapOvr>
+  <p:timing>
+    <p:tnLst>
+      <p:par>
+        <p:cTn id="1" dur="indefinite" restart="never" nodeType="tmRoot"/>
+      </p:par>
+    </p:tnLst>
+  </p:timing>
+</p:sld>
+</file>
+
+<file path=ppt/slides/slide98.xml><?xml version="1.0" encoding="utf-8"?>
+<p:sld xmlns:a="http://schemas.openxmlformats.org/drawingml/2006/main" xmlns:r="http://schemas.openxmlformats.org/officeDocument/2006/relationships" xmlns:p="http://schemas.openxmlformats.org/presentationml/2006/main">
+  <p:cSld>
+    <p:spTree>
+      <p:nvGrpSpPr>
+        <p:cNvPr id="1" name=""/>
+        <p:cNvGrpSpPr/>
+        <p:nvPr/>
+      </p:nvGrpSpPr>
+      <p:grpSpPr>
+        <a:xfrm>
+          <a:off x="0" y="0"/>
+          <a:ext cx="0" cy="0"/>
+          <a:chOff x="0" y="0"/>
+          <a:chExt cx="0" cy="0"/>
+        </a:xfrm>
+      </p:grpSpPr>
+      <p:sp>
+        <p:nvSpPr>
+          <p:cNvPr id="2" name="Title 1"/>
+          <p:cNvSpPr>
+            <a:spLocks noGrp="1"/>
+          </p:cNvSpPr>
+          <p:nvPr>
+            <p:ph type="title"/>
+          </p:nvPr>
+        </p:nvSpPr>
+        <p:spPr/>
+        <p:txBody>
           <a:bodyPr>
-            <a:normAutofit fontScale="92500" lnSpcReduction="10000"/>
+            <a:normAutofit fontScale="90000"/>
           </a:bodyPr>
           <a:lstStyle/>
           <a:p>
             <a:r>
               <a:rPr lang="en-US" dirty="0" smtClean="0"/>
-              <a:t>Me:</a:t>
-            </a:r>
-          </a:p>
-          <a:p>
-            <a:pPr lvl="1"/>
+              <a:t>Solution #3: Never encrypt the same thing with the same key and IV</a:t>
+            </a:r>
+            <a:endParaRPr lang="en-US" dirty="0"/>
+          </a:p>
+        </p:txBody>
+      </p:sp>
+      <p:sp>
+        <p:nvSpPr>
+          <p:cNvPr id="3" name="Content Placeholder 2"/>
+          <p:cNvSpPr>
+            <a:spLocks noGrp="1"/>
+          </p:cNvSpPr>
+          <p:nvPr>
+            <p:ph idx="1"/>
+          </p:nvPr>
+        </p:nvSpPr>
+        <p:spPr/>
+        <p:txBody>
+          <a:bodyPr/>
+          <a:lstStyle/>
+          <a:p>
             <a:r>
               <a:rPr lang="en-US" dirty="0" smtClean="0"/>
-              <a:t>Ron Bowes &lt;</a:t>
-            </a:r>
-            <a:r>
-              <a:rPr lang="en-US" dirty="0" smtClean="0">
-                <a:hlinkClick r:id="rId2"/>
-              </a:rPr>
-              <a:t>ron@skullsecurity.net</a:t>
-            </a:r>
+              <a:t>Almost every cipher fails if you use the same key and IV</a:t>
+            </a:r>
+          </a:p>
+          <a:p>
             <a:r>
               <a:rPr lang="en-US" dirty="0" smtClean="0"/>
-              <a:t>&gt;</a:t>
-            </a:r>
-          </a:p>
-          <a:p>
-            <a:pPr lvl="1"/>
-            <a:r>
-              <a:rPr lang="en-US" dirty="0" smtClean="0"/>
-              <a:t>@iagox86</a:t>
-            </a:r>
-          </a:p>
-          <a:p>
-            <a:pPr lvl="1"/>
-            <a:r>
-              <a:rPr lang="en-US" dirty="0" smtClean="0">
-                <a:hlinkClick r:id="rId3"/>
-              </a:rPr>
-              <a:t>http://www.skullsecurity.org</a:t>
-            </a:r>
-            <a:endParaRPr lang="en-US" dirty="0" smtClean="0"/>
-          </a:p>
-          <a:p>
-            <a:pPr lvl="1"/>
-            <a:r>
-              <a:rPr lang="en-US" dirty="0" smtClean="0">
-                <a:hlinkClick r:id="rId4"/>
-              </a:rPr>
-              <a:t>http://www.leviathansecurity.com</a:t>
-            </a:r>
-            <a:endParaRPr lang="en-US" dirty="0" smtClean="0"/>
-          </a:p>
-          <a:p>
-            <a:r>
-              <a:rPr lang="en-US" dirty="0" smtClean="0"/>
-              <a:t>Tools released:</a:t>
-            </a:r>
-          </a:p>
-          <a:p>
-            <a:pPr lvl="1"/>
-            <a:r>
-              <a:rPr lang="en-US" dirty="0" smtClean="0">
-                <a:hlinkClick r:id="rId5"/>
-              </a:rPr>
-              <a:t>https://www.github.com/iagox86/prephixer</a:t>
-            </a:r>
-            <a:r>
-              <a:rPr lang="en-US" dirty="0" smtClean="0"/>
-              <a:t> </a:t>
-            </a:r>
-          </a:p>
-          <a:p>
-            <a:pPr lvl="1"/>
-            <a:r>
-              <a:rPr lang="en-US" dirty="0">
-                <a:hlinkClick r:id="rId6"/>
-              </a:rPr>
-              <a:t>https://</a:t>
-            </a:r>
-            <a:r>
-              <a:rPr lang="en-US" dirty="0" smtClean="0">
-                <a:hlinkClick r:id="rId6"/>
-              </a:rPr>
-              <a:t>www.github.com/iagox86/poracle</a:t>
-            </a:r>
-            <a:endParaRPr lang="en-US" dirty="0" smtClean="0"/>
-          </a:p>
-          <a:p>
-            <a:pPr lvl="1"/>
-            <a:r>
-              <a:rPr lang="en-US" dirty="0">
-                <a:hlinkClick r:id="rId7"/>
-              </a:rPr>
-              <a:t>https://</a:t>
-            </a:r>
-            <a:r>
-              <a:rPr lang="en-US" dirty="0" smtClean="0">
-                <a:hlinkClick r:id="rId7"/>
-              </a:rPr>
-              <a:t>www.github.com/iagox86/hash_extender</a:t>
-            </a:r>
-            <a:r>
-              <a:rPr lang="en-US" dirty="0" smtClean="0"/>
-              <a:t> </a:t>
-            </a:r>
-          </a:p>
-          <a:p>
-            <a:pPr lvl="1"/>
-            <a:r>
-              <a:rPr lang="en-US" dirty="0">
-                <a:hlinkClick r:id="rId8"/>
-              </a:rPr>
-              <a:t>https://</a:t>
-            </a:r>
-            <a:r>
-              <a:rPr lang="en-US" dirty="0" smtClean="0">
-                <a:hlinkClick r:id="rId8"/>
-              </a:rPr>
-              <a:t>www.github.com/iagox86/unzipher</a:t>
-            </a:r>
-            <a:r>
-              <a:rPr lang="en-US" dirty="0" smtClean="0"/>
-              <a:t> </a:t>
-            </a:r>
-          </a:p>
-          <a:p>
-            <a:endParaRPr lang="en-US" dirty="0" smtClean="0"/>
-          </a:p>
-          <a:p>
+              <a:t>Change keys when it makes sense, and change IVs </a:t>
+            </a:r>
+            <a:r>
+              <a:rPr lang="en-US" i="1" dirty="0" smtClean="0"/>
+              <a:t>every time</a:t>
+            </a:r>
             <a:endParaRPr lang="en-US" dirty="0"/>
           </a:p>
         </p:txBody>
@@ -51929,7 +53415,110 @@
     </p:spTree>
     <p:extLst>
       <p:ext uri="{BB962C8B-B14F-4D97-AF65-F5344CB8AC3E}">
-        <p14:creationId xmlns:p14="http://schemas.microsoft.com/office/powerpoint/2010/main" val="4232121080"/>
+        <p14:creationId xmlns:p14="http://schemas.microsoft.com/office/powerpoint/2010/main" val="4280423253"/>
+      </p:ext>
+    </p:extLst>
+  </p:cSld>
+  <p:clrMapOvr>
+    <a:masterClrMapping/>
+  </p:clrMapOvr>
+  <p:timing>
+    <p:tnLst>
+      <p:par>
+        <p:cTn id="1" dur="indefinite" restart="never" nodeType="tmRoot"/>
+      </p:par>
+    </p:tnLst>
+  </p:timing>
+</p:sld>
+</file>
+
+<file path=ppt/slides/slide99.xml><?xml version="1.0" encoding="utf-8"?>
+<p:sld xmlns:a="http://schemas.openxmlformats.org/drawingml/2006/main" xmlns:r="http://schemas.openxmlformats.org/officeDocument/2006/relationships" xmlns:p="http://schemas.openxmlformats.org/presentationml/2006/main">
+  <p:cSld>
+    <p:spTree>
+      <p:nvGrpSpPr>
+        <p:cNvPr id="1" name=""/>
+        <p:cNvGrpSpPr/>
+        <p:nvPr/>
+      </p:nvGrpSpPr>
+      <p:grpSpPr>
+        <a:xfrm>
+          <a:off x="0" y="0"/>
+          <a:ext cx="0" cy="0"/>
+          <a:chOff x="0" y="0"/>
+          <a:chExt cx="0" cy="0"/>
+        </a:xfrm>
+      </p:grpSpPr>
+      <p:sp>
+        <p:nvSpPr>
+          <p:cNvPr id="2" name="Title 1"/>
+          <p:cNvSpPr>
+            <a:spLocks noGrp="1"/>
+          </p:cNvSpPr>
+          <p:nvPr>
+            <p:ph type="title"/>
+          </p:nvPr>
+        </p:nvSpPr>
+        <p:spPr/>
+        <p:txBody>
+          <a:bodyPr>
+            <a:normAutofit fontScale="90000"/>
+          </a:bodyPr>
+          <a:lstStyle/>
+          <a:p>
+            <a:r>
+              <a:rPr lang="en-US" dirty="0" smtClean="0"/>
+              <a:t>One last ski instructor, then we’re done!</a:t>
+            </a:r>
+            <a:endParaRPr lang="en-US" dirty="0"/>
+          </a:p>
+        </p:txBody>
+      </p:sp>
+      <p:pic>
+        <p:nvPicPr>
+          <p:cNvPr id="8194" name="Picture 2" descr="if you encrypt two things with the same key and iv imma com - Super Cool Ski Instructor"/>
+          <p:cNvPicPr>
+            <a:picLocks noChangeAspect="1" noChangeArrowheads="1"/>
+          </p:cNvPicPr>
+          <p:nvPr/>
+        </p:nvPicPr>
+        <p:blipFill>
+          <a:blip r:embed="rId2">
+            <a:extLst>
+              <a:ext uri="{28A0092B-C50C-407E-A947-70E740481C1C}">
+                <a14:useLocalDpi xmlns:a14="http://schemas.microsoft.com/office/drawing/2010/main" val="0"/>
+              </a:ext>
+            </a:extLst>
+          </a:blip>
+          <a:srcRect/>
+          <a:stretch>
+            <a:fillRect/>
+          </a:stretch>
+        </p:blipFill>
+        <p:spPr bwMode="auto">
+          <a:xfrm>
+            <a:off x="990600" y="1543747"/>
+            <a:ext cx="7154332" cy="4829176"/>
+          </a:xfrm>
+          <a:prstGeom prst="rect">
+            <a:avLst/>
+          </a:prstGeom>
+          <a:noFill/>
+          <a:extLst>
+            <a:ext uri="{909E8E84-426E-40DD-AFC4-6F175D3DCCD1}">
+              <a14:hiddenFill xmlns:a14="http://schemas.microsoft.com/office/drawing/2010/main">
+                <a:solidFill>
+                  <a:srgbClr val="FFFFFF"/>
+                </a:solidFill>
+              </a14:hiddenFill>
+            </a:ext>
+          </a:extLst>
+        </p:spPr>
+      </p:pic>
+    </p:spTree>
+    <p:extLst>
+      <p:ext uri="{BB962C8B-B14F-4D97-AF65-F5344CB8AC3E}">
+        <p14:creationId xmlns:p14="http://schemas.microsoft.com/office/powerpoint/2010/main" val="2719671012"/>
       </p:ext>
     </p:extLst>
   </p:cSld>

</xml_diff>

<commit_message>
More updates to the slides
</commit_message>
<xml_diff>
--- a/Shmoocon.pptx
+++ b/Shmoocon.pptx
@@ -5,7 +5,7 @@
     <p:sldMasterId id="2147483708" r:id="rId1"/>
   </p:sldMasterIdLst>
   <p:notesMasterIdLst>
-    <p:notesMasterId r:id="rId103"/>
+    <p:notesMasterId r:id="rId102"/>
   </p:notesMasterIdLst>
   <p:sldIdLst>
     <p:sldId id="256" r:id="rId2"/>
@@ -31,29 +31,29 @@
     <p:sldId id="274" r:id="rId22"/>
     <p:sldId id="307" r:id="rId23"/>
     <p:sldId id="308" r:id="rId24"/>
-    <p:sldId id="275" r:id="rId25"/>
-    <p:sldId id="277" r:id="rId26"/>
-    <p:sldId id="287" r:id="rId27"/>
-    <p:sldId id="357" r:id="rId28"/>
-    <p:sldId id="288" r:id="rId29"/>
-    <p:sldId id="289" r:id="rId30"/>
-    <p:sldId id="290" r:id="rId31"/>
-    <p:sldId id="291" r:id="rId32"/>
-    <p:sldId id="292" r:id="rId33"/>
-    <p:sldId id="293" r:id="rId34"/>
-    <p:sldId id="294" r:id="rId35"/>
-    <p:sldId id="295" r:id="rId36"/>
-    <p:sldId id="296" r:id="rId37"/>
-    <p:sldId id="306" r:id="rId38"/>
-    <p:sldId id="298" r:id="rId39"/>
-    <p:sldId id="300" r:id="rId40"/>
-    <p:sldId id="299" r:id="rId41"/>
-    <p:sldId id="301" r:id="rId42"/>
-    <p:sldId id="302" r:id="rId43"/>
-    <p:sldId id="303" r:id="rId44"/>
-    <p:sldId id="304" r:id="rId45"/>
-    <p:sldId id="314" r:id="rId46"/>
-    <p:sldId id="358" r:id="rId47"/>
+    <p:sldId id="368" r:id="rId25"/>
+    <p:sldId id="275" r:id="rId26"/>
+    <p:sldId id="277" r:id="rId27"/>
+    <p:sldId id="287" r:id="rId28"/>
+    <p:sldId id="357" r:id="rId29"/>
+    <p:sldId id="288" r:id="rId30"/>
+    <p:sldId id="289" r:id="rId31"/>
+    <p:sldId id="290" r:id="rId32"/>
+    <p:sldId id="291" r:id="rId33"/>
+    <p:sldId id="292" r:id="rId34"/>
+    <p:sldId id="293" r:id="rId35"/>
+    <p:sldId id="294" r:id="rId36"/>
+    <p:sldId id="295" r:id="rId37"/>
+    <p:sldId id="296" r:id="rId38"/>
+    <p:sldId id="306" r:id="rId39"/>
+    <p:sldId id="298" r:id="rId40"/>
+    <p:sldId id="300" r:id="rId41"/>
+    <p:sldId id="299" r:id="rId42"/>
+    <p:sldId id="301" r:id="rId43"/>
+    <p:sldId id="302" r:id="rId44"/>
+    <p:sldId id="303" r:id="rId45"/>
+    <p:sldId id="304" r:id="rId46"/>
+    <p:sldId id="314" r:id="rId47"/>
     <p:sldId id="305" r:id="rId48"/>
     <p:sldId id="311" r:id="rId49"/>
     <p:sldId id="317" r:id="rId50"/>
@@ -97,18 +97,17 @@
     <p:sldId id="355" r:id="rId88"/>
     <p:sldId id="351" r:id="rId89"/>
     <p:sldId id="359" r:id="rId90"/>
-    <p:sldId id="360" r:id="rId91"/>
-    <p:sldId id="356" r:id="rId92"/>
-    <p:sldId id="367" r:id="rId93"/>
-    <p:sldId id="313" r:id="rId94"/>
-    <p:sldId id="361" r:id="rId95"/>
-    <p:sldId id="365" r:id="rId96"/>
-    <p:sldId id="362" r:id="rId97"/>
-    <p:sldId id="364" r:id="rId98"/>
-    <p:sldId id="363" r:id="rId99"/>
-    <p:sldId id="366" r:id="rId100"/>
-    <p:sldId id="315" r:id="rId101"/>
-    <p:sldId id="316" r:id="rId102"/>
+    <p:sldId id="356" r:id="rId91"/>
+    <p:sldId id="367" r:id="rId92"/>
+    <p:sldId id="313" r:id="rId93"/>
+    <p:sldId id="361" r:id="rId94"/>
+    <p:sldId id="365" r:id="rId95"/>
+    <p:sldId id="362" r:id="rId96"/>
+    <p:sldId id="364" r:id="rId97"/>
+    <p:sldId id="363" r:id="rId98"/>
+    <p:sldId id="366" r:id="rId99"/>
+    <p:sldId id="315" r:id="rId100"/>
+    <p:sldId id="316" r:id="rId101"/>
   </p:sldIdLst>
   <p:sldSz cx="9144000" cy="6858000" type="screen4x3"/>
   <p:notesSz cx="6858000" cy="9144000"/>
@@ -292,7 +291,7 @@
           <a:p>
             <a:fld id="{B518C13D-2B3F-42C3-B83D-5B01E1232990}" type="datetimeFigureOut">
               <a:rPr lang="en-US" smtClean="0"/>
-              <a:t>2/9/2013</a:t>
+              <a:t>2/13/2013</a:t>
             </a:fld>
             <a:endParaRPr lang="en-US"/>
           </a:p>
@@ -977,7 +976,7 @@
           <a:p>
             <a:fld id="{C7363F1F-ADBF-4FAE-A422-131859708330}" type="datetimeFigureOut">
               <a:rPr lang="en-US" smtClean="0"/>
-              <a:t>2/9/2013</a:t>
+              <a:t>2/13/2013</a:t>
             </a:fld>
             <a:endParaRPr lang="en-US"/>
           </a:p>
@@ -1147,7 +1146,7 @@
           <a:p>
             <a:fld id="{C7363F1F-ADBF-4FAE-A422-131859708330}" type="datetimeFigureOut">
               <a:rPr lang="en-US" smtClean="0"/>
-              <a:t>2/9/2013</a:t>
+              <a:t>2/13/2013</a:t>
             </a:fld>
             <a:endParaRPr lang="en-US"/>
           </a:p>
@@ -1327,7 +1326,7 @@
           <a:p>
             <a:fld id="{C7363F1F-ADBF-4FAE-A422-131859708330}" type="datetimeFigureOut">
               <a:rPr lang="en-US" smtClean="0"/>
-              <a:t>2/9/2013</a:t>
+              <a:t>2/13/2013</a:t>
             </a:fld>
             <a:endParaRPr lang="en-US"/>
           </a:p>
@@ -1497,7 +1496,7 @@
           <a:p>
             <a:fld id="{C7363F1F-ADBF-4FAE-A422-131859708330}" type="datetimeFigureOut">
               <a:rPr lang="en-US" smtClean="0"/>
-              <a:t>2/9/2013</a:t>
+              <a:t>2/13/2013</a:t>
             </a:fld>
             <a:endParaRPr lang="en-US"/>
           </a:p>
@@ -1743,7 +1742,7 @@
           <a:p>
             <a:fld id="{C7363F1F-ADBF-4FAE-A422-131859708330}" type="datetimeFigureOut">
               <a:rPr lang="en-US" smtClean="0"/>
-              <a:t>2/9/2013</a:t>
+              <a:t>2/13/2013</a:t>
             </a:fld>
             <a:endParaRPr lang="en-US"/>
           </a:p>
@@ -2031,7 +2030,7 @@
           <a:p>
             <a:fld id="{C7363F1F-ADBF-4FAE-A422-131859708330}" type="datetimeFigureOut">
               <a:rPr lang="en-US" smtClean="0"/>
-              <a:t>2/9/2013</a:t>
+              <a:t>2/13/2013</a:t>
             </a:fld>
             <a:endParaRPr lang="en-US"/>
           </a:p>
@@ -2453,7 +2452,7 @@
           <a:p>
             <a:fld id="{C7363F1F-ADBF-4FAE-A422-131859708330}" type="datetimeFigureOut">
               <a:rPr lang="en-US" smtClean="0"/>
-              <a:t>2/9/2013</a:t>
+              <a:t>2/13/2013</a:t>
             </a:fld>
             <a:endParaRPr lang="en-US"/>
           </a:p>
@@ -2571,7 +2570,7 @@
           <a:p>
             <a:fld id="{C7363F1F-ADBF-4FAE-A422-131859708330}" type="datetimeFigureOut">
               <a:rPr lang="en-US" smtClean="0"/>
-              <a:t>2/9/2013</a:t>
+              <a:t>2/13/2013</a:t>
             </a:fld>
             <a:endParaRPr lang="en-US"/>
           </a:p>
@@ -2666,7 +2665,7 @@
           <a:p>
             <a:fld id="{C7363F1F-ADBF-4FAE-A422-131859708330}" type="datetimeFigureOut">
               <a:rPr lang="en-US" smtClean="0"/>
-              <a:t>2/9/2013</a:t>
+              <a:t>2/13/2013</a:t>
             </a:fld>
             <a:endParaRPr lang="en-US"/>
           </a:p>
@@ -2943,7 +2942,7 @@
           <a:p>
             <a:fld id="{C7363F1F-ADBF-4FAE-A422-131859708330}" type="datetimeFigureOut">
               <a:rPr lang="en-US" smtClean="0"/>
-              <a:t>2/9/2013</a:t>
+              <a:t>2/13/2013</a:t>
             </a:fld>
             <a:endParaRPr lang="en-US"/>
           </a:p>
@@ -3196,7 +3195,7 @@
           <a:p>
             <a:fld id="{C7363F1F-ADBF-4FAE-A422-131859708330}" type="datetimeFigureOut">
               <a:rPr lang="en-US" smtClean="0"/>
-              <a:t>2/9/2013</a:t>
+              <a:t>2/13/2013</a:t>
             </a:fld>
             <a:endParaRPr lang="en-US"/>
           </a:p>
@@ -3409,7 +3408,7 @@
           <a:p>
             <a:fld id="{C7363F1F-ADBF-4FAE-A422-131859708330}" type="datetimeFigureOut">
               <a:rPr lang="en-US" smtClean="0"/>
-              <a:t>2/9/2013</a:t>
+              <a:t>2/13/2013</a:t>
             </a:fld>
             <a:endParaRPr lang="en-US"/>
           </a:p>
@@ -4070,355 +4069,6 @@
       </p:grpSpPr>
       <p:sp>
         <p:nvSpPr>
-          <p:cNvPr id="2" name="Title 1"/>
-          <p:cNvSpPr>
-            <a:spLocks noGrp="1"/>
-          </p:cNvSpPr>
-          <p:nvPr>
-            <p:ph type="title"/>
-          </p:nvPr>
-        </p:nvSpPr>
-        <p:spPr/>
-        <p:txBody>
-          <a:bodyPr/>
-          <a:lstStyle/>
-          <a:p>
-            <a:r>
-              <a:rPr lang="en-US" dirty="0" smtClean="0"/>
-              <a:t>That’s all!</a:t>
-            </a:r>
-            <a:endParaRPr lang="en-US" dirty="0"/>
-          </a:p>
-        </p:txBody>
-      </p:sp>
-      <p:pic>
-        <p:nvPicPr>
-          <p:cNvPr id="9218" name="Picture 2" descr="http://fun-gallery.com/wp-content/uploads/2011/09/Fast-And-Funny-640x469.jpg"/>
-          <p:cNvPicPr>
-            <a:picLocks noChangeAspect="1" noChangeArrowheads="1"/>
-          </p:cNvPicPr>
-          <p:nvPr/>
-        </p:nvPicPr>
-        <p:blipFill>
-          <a:blip r:embed="rId2">
-            <a:extLst>
-              <a:ext uri="{28A0092B-C50C-407E-A947-70E740481C1C}">
-                <a14:useLocalDpi xmlns:a14="http://schemas.microsoft.com/office/drawing/2010/main" val="0"/>
-              </a:ext>
-            </a:extLst>
-          </a:blip>
-          <a:srcRect/>
-          <a:stretch>
-            <a:fillRect/>
-          </a:stretch>
-        </p:blipFill>
-        <p:spPr bwMode="auto">
-          <a:xfrm>
-            <a:off x="1912434" y="152400"/>
-            <a:ext cx="5631366" cy="4126736"/>
-          </a:xfrm>
-          <a:prstGeom prst="rect">
-            <a:avLst/>
-          </a:prstGeom>
-          <a:noFill/>
-          <a:extLst>
-            <a:ext uri="{909E8E84-426E-40DD-AFC4-6F175D3DCCD1}">
-              <a14:hiddenFill xmlns:a14="http://schemas.microsoft.com/office/drawing/2010/main">
-                <a:solidFill>
-                  <a:srgbClr val="FFFFFF"/>
-                </a:solidFill>
-              </a14:hiddenFill>
-            </a:ext>
-          </a:extLst>
-        </p:spPr>
-      </p:pic>
-      <p:sp>
-        <p:nvSpPr>
-          <p:cNvPr id="4" name="Rectangle 3"/>
-          <p:cNvSpPr/>
-          <p:nvPr/>
-        </p:nvSpPr>
-        <p:spPr>
-          <a:xfrm>
-            <a:off x="3124200" y="152400"/>
-            <a:ext cx="1752600" cy="1219200"/>
-          </a:xfrm>
-          <a:prstGeom prst="rect">
-            <a:avLst/>
-          </a:prstGeom>
-          <a:noFill/>
-          <a:ln>
-            <a:solidFill>
-              <a:srgbClr val="FF0000"/>
-            </a:solidFill>
-          </a:ln>
-        </p:spPr>
-        <p:style>
-          <a:lnRef idx="2">
-            <a:schemeClr val="accent1">
-              <a:shade val="50000"/>
-            </a:schemeClr>
-          </a:lnRef>
-          <a:fillRef idx="1">
-            <a:schemeClr val="accent1"/>
-          </a:fillRef>
-          <a:effectRef idx="0">
-            <a:schemeClr val="accent1"/>
-          </a:effectRef>
-          <a:fontRef idx="minor">
-            <a:schemeClr val="lt1"/>
-          </a:fontRef>
-        </p:style>
-        <p:txBody>
-          <a:bodyPr rtlCol="0" anchor="ctr"/>
-          <a:lstStyle/>
-          <a:p>
-            <a:pPr algn="ctr"/>
-            <a:endParaRPr lang="en-US"/>
-          </a:p>
-        </p:txBody>
-      </p:sp>
-      <p:cxnSp>
-        <p:nvCxnSpPr>
-          <p:cNvPr id="6" name="Straight Connector 5"/>
-          <p:cNvCxnSpPr/>
-          <p:nvPr/>
-        </p:nvCxnSpPr>
-        <p:spPr>
-          <a:xfrm>
-            <a:off x="4876800" y="152400"/>
-            <a:ext cx="4285785" cy="2895600"/>
-          </a:xfrm>
-          <a:prstGeom prst="line">
-            <a:avLst/>
-          </a:prstGeom>
-          <a:ln w="28575">
-            <a:solidFill>
-              <a:srgbClr val="FF0000"/>
-            </a:solidFill>
-          </a:ln>
-        </p:spPr>
-        <p:style>
-          <a:lnRef idx="1">
-            <a:schemeClr val="accent1"/>
-          </a:lnRef>
-          <a:fillRef idx="0">
-            <a:schemeClr val="accent1"/>
-          </a:fillRef>
-          <a:effectRef idx="0">
-            <a:schemeClr val="accent1"/>
-          </a:effectRef>
-          <a:fontRef idx="minor">
-            <a:schemeClr val="tx1"/>
-          </a:fontRef>
-        </p:style>
-      </p:cxnSp>
-      <p:cxnSp>
-        <p:nvCxnSpPr>
-          <p:cNvPr id="10" name="Straight Connector 9"/>
-          <p:cNvCxnSpPr/>
-          <p:nvPr/>
-        </p:nvCxnSpPr>
-        <p:spPr>
-          <a:xfrm>
-            <a:off x="3124200" y="1371600"/>
-            <a:ext cx="1466385" cy="4724400"/>
-          </a:xfrm>
-          <a:prstGeom prst="line">
-            <a:avLst/>
-          </a:prstGeom>
-          <a:ln w="28575">
-            <a:solidFill>
-              <a:srgbClr val="FF0000"/>
-            </a:solidFill>
-          </a:ln>
-        </p:spPr>
-        <p:style>
-          <a:lnRef idx="1">
-            <a:schemeClr val="accent1"/>
-          </a:lnRef>
-          <a:fillRef idx="0">
-            <a:schemeClr val="accent1"/>
-          </a:fillRef>
-          <a:effectRef idx="0">
-            <a:schemeClr val="accent1"/>
-          </a:effectRef>
-          <a:fontRef idx="minor">
-            <a:schemeClr val="tx1"/>
-          </a:fontRef>
-        </p:style>
-      </p:cxnSp>
-      <p:cxnSp>
-        <p:nvCxnSpPr>
-          <p:cNvPr id="15" name="Straight Connector 14"/>
-          <p:cNvCxnSpPr/>
-          <p:nvPr/>
-        </p:nvCxnSpPr>
-        <p:spPr>
-          <a:xfrm>
-            <a:off x="3124200" y="152400"/>
-            <a:ext cx="1466385" cy="2895600"/>
-          </a:xfrm>
-          <a:prstGeom prst="line">
-            <a:avLst/>
-          </a:prstGeom>
-          <a:ln w="28575">
-            <a:solidFill>
-              <a:srgbClr val="FF0000"/>
-            </a:solidFill>
-          </a:ln>
-        </p:spPr>
-        <p:style>
-          <a:lnRef idx="1">
-            <a:schemeClr val="accent1"/>
-          </a:lnRef>
-          <a:fillRef idx="0">
-            <a:schemeClr val="accent1"/>
-          </a:fillRef>
-          <a:effectRef idx="0">
-            <a:schemeClr val="accent1"/>
-          </a:effectRef>
-          <a:fontRef idx="minor">
-            <a:schemeClr val="tx1"/>
-          </a:fontRef>
-        </p:style>
-      </p:cxnSp>
-      <p:cxnSp>
-        <p:nvCxnSpPr>
-          <p:cNvPr id="18" name="Straight Connector 17"/>
-          <p:cNvCxnSpPr/>
-          <p:nvPr/>
-        </p:nvCxnSpPr>
-        <p:spPr>
-          <a:xfrm>
-            <a:off x="4876801" y="1371600"/>
-            <a:ext cx="4285784" cy="4724400"/>
-          </a:xfrm>
-          <a:prstGeom prst="line">
-            <a:avLst/>
-          </a:prstGeom>
-          <a:ln w="28575">
-            <a:solidFill>
-              <a:srgbClr val="FF0000"/>
-            </a:solidFill>
-          </a:ln>
-        </p:spPr>
-        <p:style>
-          <a:lnRef idx="1">
-            <a:schemeClr val="accent1"/>
-          </a:lnRef>
-          <a:fillRef idx="0">
-            <a:schemeClr val="accent1"/>
-          </a:fillRef>
-          <a:effectRef idx="0">
-            <a:schemeClr val="accent1"/>
-          </a:effectRef>
-          <a:fontRef idx="minor">
-            <a:schemeClr val="tx1"/>
-          </a:fontRef>
-        </p:style>
-      </p:cxnSp>
-      <p:pic>
-        <p:nvPicPr>
-          <p:cNvPr id="9220" name="Picture 4" descr="http://fun-gallery.com/wp-content/uploads/2011/09/Running-Race-Finish-Line-Funny-Picture.jpg"/>
-          <p:cNvPicPr>
-            <a:picLocks noChangeAspect="1" noChangeArrowheads="1"/>
-          </p:cNvPicPr>
-          <p:nvPr/>
-        </p:nvPicPr>
-        <p:blipFill>
-          <a:blip r:embed="rId3">
-            <a:extLst>
-              <a:ext uri="{28A0092B-C50C-407E-A947-70E740481C1C}">
-                <a14:useLocalDpi xmlns:a14="http://schemas.microsoft.com/office/drawing/2010/main" val="0"/>
-              </a:ext>
-            </a:extLst>
-          </a:blip>
-          <a:srcRect/>
-          <a:stretch>
-            <a:fillRect/>
-          </a:stretch>
-        </p:blipFill>
-        <p:spPr bwMode="auto">
-          <a:xfrm>
-            <a:off x="4590585" y="3048000"/>
-            <a:ext cx="4572000" cy="3048000"/>
-          </a:xfrm>
-          <a:prstGeom prst="rect">
-            <a:avLst/>
-          </a:prstGeom>
-          <a:solidFill>
-            <a:srgbClr val="FFFFFF">
-              <a:shade val="85000"/>
-            </a:srgbClr>
-          </a:solidFill>
-          <a:ln w="19050" cap="sq">
-            <a:solidFill>
-              <a:srgbClr val="FF0000"/>
-            </a:solidFill>
-            <a:miter lim="800000"/>
-          </a:ln>
-          <a:effectLst>
-            <a:outerShdw blurRad="55000" dist="18000" dir="5400000" algn="tl" rotWithShape="0">
-              <a:srgbClr val="000000">
-                <a:alpha val="40000"/>
-              </a:srgbClr>
-            </a:outerShdw>
-          </a:effectLst>
-          <a:scene3d>
-            <a:camera prst="orthographicFront"/>
-            <a:lightRig rig="twoPt" dir="t">
-              <a:rot lat="0" lon="0" rev="7200000"/>
-            </a:lightRig>
-          </a:scene3d>
-          <a:sp3d>
-            <a:bevelT w="25400" h="19050"/>
-            <a:contourClr>
-              <a:srgbClr val="FFFFFF"/>
-            </a:contourClr>
-          </a:sp3d>
-          <a:extLst/>
-        </p:spPr>
-      </p:pic>
-    </p:spTree>
-    <p:extLst>
-      <p:ext uri="{BB962C8B-B14F-4D97-AF65-F5344CB8AC3E}">
-        <p14:creationId xmlns:p14="http://schemas.microsoft.com/office/powerpoint/2010/main" val="2565735704"/>
-      </p:ext>
-    </p:extLst>
-  </p:cSld>
-  <p:clrMapOvr>
-    <a:masterClrMapping/>
-  </p:clrMapOvr>
-  <p:timing>
-    <p:tnLst>
-      <p:par>
-        <p:cTn id="1" dur="indefinite" restart="never" nodeType="tmRoot"/>
-      </p:par>
-    </p:tnLst>
-  </p:timing>
-</p:sld>
-</file>
-
-<file path=ppt/slides/slide101.xml><?xml version="1.0" encoding="utf-8"?>
-<p:sld xmlns:a="http://schemas.openxmlformats.org/drawingml/2006/main" xmlns:r="http://schemas.openxmlformats.org/officeDocument/2006/relationships" xmlns:p="http://schemas.openxmlformats.org/presentationml/2006/main">
-  <p:cSld>
-    <p:spTree>
-      <p:nvGrpSpPr>
-        <p:cNvPr id="1" name=""/>
-        <p:cNvGrpSpPr/>
-        <p:nvPr/>
-      </p:nvGrpSpPr>
-      <p:grpSpPr>
-        <a:xfrm>
-          <a:off x="0" y="0"/>
-          <a:ext cx="0" cy="0"/>
-          <a:chOff x="0" y="0"/>
-          <a:chExt cx="0" cy="0"/>
-        </a:xfrm>
-      </p:grpSpPr>
-      <p:sp>
-        <p:nvSpPr>
           <p:cNvPr id="4" name="Title 3"/>
           <p:cNvSpPr>
             <a:spLocks noGrp="1"/>
@@ -5683,15 +5333,7 @@
             <a:pPr algn="r"/>
             <a:r>
               <a:rPr lang="en-US" dirty="0" smtClean="0"/>
-              <a:t>Now you can see if any of 100s of </a:t>
-            </a:r>
-            <a:r>
-              <a:rPr lang="en-US" dirty="0" smtClean="0"/>
-              <a:t>companies thinks </a:t>
-            </a:r>
-            <a:r>
-              <a:rPr lang="en-US" dirty="0" smtClean="0"/>
-              <a:t>the “Bob” is actually “Bob”</a:t>
+              <a:t>Now you can see if any of 100s of companies thinks the “Bob” is actually “Bob”</a:t>
             </a:r>
             <a:endParaRPr lang="en-US" dirty="0"/>
           </a:p>
@@ -6811,18 +6453,15 @@
           <a:p>
             <a:pPr lvl="1"/>
             <a:r>
-              <a:rPr lang="en-US" dirty="0"/>
-              <a:t>r</a:t>
+              <a:rPr lang="en-US" dirty="0" smtClean="0">
+                <a:hlinkClick r:id="rId3"/>
+              </a:rPr>
+              <a:t>ron.bowes@leviathansecurity.com</a:t>
             </a:r>
             <a:r>
               <a:rPr lang="en-US" dirty="0" smtClean="0"/>
-              <a:t>on.bowes@leviathansecurity.com</a:t>
-            </a:r>
-            <a:r>
-              <a:rPr lang="en-US" dirty="0" smtClean="0"/>
-              <a:t> </a:t>
-            </a:r>
-            <a:endParaRPr lang="en-US" dirty="0" smtClean="0"/>
+              <a:t>  </a:t>
+            </a:r>
           </a:p>
           <a:p>
             <a:r>
@@ -6848,7 +6487,7 @@
           <p:nvPr/>
         </p:nvPicPr>
         <p:blipFill>
-          <a:blip r:embed="rId3">
+          <a:blip r:embed="rId4">
             <a:extLst>
               <a:ext uri="{28A0092B-C50C-407E-A947-70E740481C1C}">
                 <a14:useLocalDpi xmlns:a14="http://schemas.microsoft.com/office/drawing/2010/main" val="0"/>
@@ -6918,7 +6557,7 @@
 </file>
 
 <file path=ppt/slides/slide20.xml><?xml version="1.0" encoding="utf-8"?>
-<p:sld xmlns:a="http://schemas.openxmlformats.org/drawingml/2006/main" xmlns:r="http://schemas.openxmlformats.org/officeDocument/2006/relationships" xmlns:p="http://schemas.openxmlformats.org/presentationml/2006/main">
+<p:sld xmlns:a="http://schemas.openxmlformats.org/drawingml/2006/main" xmlns:r="http://schemas.openxmlformats.org/officeDocument/2006/relationships" xmlns:p="http://schemas.openxmlformats.org/presentationml/2006/main" show="0">
   <p:cSld>
     <p:spTree>
       <p:nvGrpSpPr>
@@ -8448,6 +8087,14 @@
   <p:clrMapOvr>
     <a:masterClrMapping/>
   </p:clrMapOvr>
+  <mc:AlternateContent xmlns:mc="http://schemas.openxmlformats.org/markup-compatibility/2006" xmlns:p14="http://schemas.microsoft.com/office/powerpoint/2010/main">
+    <mc:Choice Requires="p14">
+      <p:transition spd="slow" p14:dur="2000"/>
+    </mc:Choice>
+    <mc:Fallback xmlns="">
+      <p:transition spd="slow"/>
+    </mc:Fallback>
+  </mc:AlternateContent>
   <p:timing>
     <p:tnLst>
       <p:par>
@@ -8974,6 +8621,111 @@
           <a:p>
             <a:r>
               <a:rPr lang="en-US" dirty="0" smtClean="0"/>
+              <a:t>Initialization vectors: IVs</a:t>
+            </a:r>
+            <a:endParaRPr lang="en-US" dirty="0"/>
+          </a:p>
+        </p:txBody>
+      </p:sp>
+      <p:sp>
+        <p:nvSpPr>
+          <p:cNvPr id="3" name="Content Placeholder 2"/>
+          <p:cNvSpPr>
+            <a:spLocks noGrp="1"/>
+          </p:cNvSpPr>
+          <p:nvPr>
+            <p:ph idx="1"/>
+          </p:nvPr>
+        </p:nvSpPr>
+        <p:spPr/>
+        <p:txBody>
+          <a:bodyPr/>
+          <a:lstStyle/>
+          <a:p>
+            <a:r>
+              <a:rPr lang="en-US" dirty="0" smtClean="0"/>
+              <a:t>The ‘input’ into </a:t>
+            </a:r>
+            <a:r>
+              <a:rPr lang="en-US" dirty="0" smtClean="0"/>
+              <a:t>an encryption function</a:t>
+            </a:r>
+            <a:endParaRPr lang="en-US" dirty="0" smtClean="0"/>
+          </a:p>
+          <a:p>
+            <a:r>
+              <a:rPr lang="en-US" dirty="0" smtClean="0"/>
+              <a:t>Designed so that the same data encrypted with the same key doesn’t generate the same </a:t>
+            </a:r>
+            <a:r>
+              <a:rPr lang="en-US" dirty="0" err="1" smtClean="0"/>
+              <a:t>ciphertext</a:t>
+            </a:r>
+            <a:endParaRPr lang="en-US" dirty="0" smtClean="0"/>
+          </a:p>
+          <a:p>
+            <a:r>
+              <a:rPr lang="en-US" dirty="0" smtClean="0"/>
+              <a:t>We’ll see why that’s a problem</a:t>
+            </a:r>
+            <a:endParaRPr lang="en-US" dirty="0"/>
+          </a:p>
+        </p:txBody>
+      </p:sp>
+    </p:spTree>
+    <p:extLst>
+      <p:ext uri="{BB962C8B-B14F-4D97-AF65-F5344CB8AC3E}">
+        <p14:creationId xmlns:p14="http://schemas.microsoft.com/office/powerpoint/2010/main" val="1536535151"/>
+      </p:ext>
+    </p:extLst>
+  </p:cSld>
+  <p:clrMapOvr>
+    <a:masterClrMapping/>
+  </p:clrMapOvr>
+  <p:timing>
+    <p:tnLst>
+      <p:par>
+        <p:cTn id="1" dur="indefinite" restart="never" nodeType="tmRoot"/>
+      </p:par>
+    </p:tnLst>
+  </p:timing>
+</p:sld>
+</file>
+
+<file path=ppt/slides/slide25.xml><?xml version="1.0" encoding="utf-8"?>
+<p:sld xmlns:a="http://schemas.openxmlformats.org/drawingml/2006/main" xmlns:r="http://schemas.openxmlformats.org/officeDocument/2006/relationships" xmlns:p="http://schemas.openxmlformats.org/presentationml/2006/main">
+  <p:cSld>
+    <p:spTree>
+      <p:nvGrpSpPr>
+        <p:cNvPr id="1" name=""/>
+        <p:cNvGrpSpPr/>
+        <p:nvPr/>
+      </p:nvGrpSpPr>
+      <p:grpSpPr>
+        <a:xfrm>
+          <a:off x="0" y="0"/>
+          <a:ext cx="0" cy="0"/>
+          <a:chOff x="0" y="0"/>
+          <a:chExt cx="0" cy="0"/>
+        </a:xfrm>
+      </p:grpSpPr>
+      <p:sp>
+        <p:nvSpPr>
+          <p:cNvPr id="2" name="Title 1"/>
+          <p:cNvSpPr>
+            <a:spLocks noGrp="1"/>
+          </p:cNvSpPr>
+          <p:nvPr>
+            <p:ph type="title"/>
+          </p:nvPr>
+        </p:nvSpPr>
+        <p:spPr/>
+        <p:txBody>
+          <a:bodyPr/>
+          <a:lstStyle/>
+          <a:p>
+            <a:r>
+              <a:rPr lang="en-US" dirty="0" smtClean="0"/>
               <a:t>Hashing</a:t>
             </a:r>
             <a:endParaRPr lang="en-US" dirty="0"/>
@@ -9093,7 +8845,7 @@
 </p:sld>
 </file>
 
-<file path=ppt/slides/slide25.xml><?xml version="1.0" encoding="utf-8"?>
+<file path=ppt/slides/slide26.xml><?xml version="1.0" encoding="utf-8"?>
 <p:sld xmlns:a="http://schemas.openxmlformats.org/drawingml/2006/main" xmlns:r="http://schemas.openxmlformats.org/officeDocument/2006/relationships" xmlns:p="http://schemas.openxmlformats.org/presentationml/2006/main">
   <p:cSld>
     <p:spTree>
@@ -9206,8 +8958,8 @@
 </p:sld>
 </file>
 
-<file path=ppt/slides/slide26.xml><?xml version="1.0" encoding="utf-8"?>
-<p:sld xmlns:a="http://schemas.openxmlformats.org/drawingml/2006/main" xmlns:r="http://schemas.openxmlformats.org/officeDocument/2006/relationships" xmlns:p="http://schemas.openxmlformats.org/presentationml/2006/main">
+<file path=ppt/slides/slide27.xml><?xml version="1.0" encoding="utf-8"?>
+<p:sld xmlns:a="http://schemas.openxmlformats.org/drawingml/2006/main" xmlns:r="http://schemas.openxmlformats.org/officeDocument/2006/relationships" xmlns:p="http://schemas.openxmlformats.org/presentationml/2006/main" show="0">
   <p:cSld>
     <p:spTree>
       <p:nvGrpSpPr>
@@ -9613,6 +9365,14 @@
   <p:clrMapOvr>
     <a:masterClrMapping/>
   </p:clrMapOvr>
+  <mc:AlternateContent xmlns:mc="http://schemas.openxmlformats.org/markup-compatibility/2006" xmlns:p14="http://schemas.microsoft.com/office/powerpoint/2010/main">
+    <mc:Choice Requires="p14">
+      <p:transition spd="slow" p14:dur="2000"/>
+    </mc:Choice>
+    <mc:Fallback xmlns="">
+      <p:transition spd="slow"/>
+    </mc:Fallback>
+  </mc:AlternateContent>
   <p:timing>
     <p:tnLst>
       <p:par>
@@ -9623,8 +9383,8 @@
 </p:sld>
 </file>
 
-<file path=ppt/slides/slide27.xml><?xml version="1.0" encoding="utf-8"?>
-<p:sld xmlns:a="http://schemas.openxmlformats.org/drawingml/2006/main" xmlns:r="http://schemas.openxmlformats.org/officeDocument/2006/relationships" xmlns:p="http://schemas.openxmlformats.org/presentationml/2006/main">
+<file path=ppt/slides/slide28.xml><?xml version="1.0" encoding="utf-8"?>
+<p:sld xmlns:a="http://schemas.openxmlformats.org/drawingml/2006/main" xmlns:r="http://schemas.openxmlformats.org/officeDocument/2006/relationships" xmlns:p="http://schemas.openxmlformats.org/presentationml/2006/main" show="0">
   <p:cSld>
     <p:spTree>
       <p:nvGrpSpPr>
@@ -9733,6 +9493,14 @@
   <p:clrMapOvr>
     <a:masterClrMapping/>
   </p:clrMapOvr>
+  <mc:AlternateContent xmlns:mc="http://schemas.openxmlformats.org/markup-compatibility/2006" xmlns:p14="http://schemas.microsoft.com/office/powerpoint/2010/main">
+    <mc:Choice Requires="p14">
+      <p:transition spd="slow" p14:dur="2000"/>
+    </mc:Choice>
+    <mc:Fallback xmlns="">
+      <p:transition spd="slow"/>
+    </mc:Fallback>
+  </mc:AlternateContent>
   <p:timing>
     <p:tnLst>
       <p:par>
@@ -9743,8 +9511,8 @@
 </p:sld>
 </file>
 
-<file path=ppt/slides/slide28.xml><?xml version="1.0" encoding="utf-8"?>
-<p:sld xmlns:a="http://schemas.openxmlformats.org/drawingml/2006/main" xmlns:r="http://schemas.openxmlformats.org/officeDocument/2006/relationships" xmlns:p="http://schemas.openxmlformats.org/presentationml/2006/main">
+<file path=ppt/slides/slide29.xml><?xml version="1.0" encoding="utf-8"?>
+<p:sld xmlns:a="http://schemas.openxmlformats.org/drawingml/2006/main" xmlns:r="http://schemas.openxmlformats.org/officeDocument/2006/relationships" xmlns:p="http://schemas.openxmlformats.org/presentationml/2006/main" show="0">
   <p:cSld>
     <p:spTree>
       <p:nvGrpSpPr>
@@ -11125,121 +10893,14 @@
   <p:clrMapOvr>
     <a:masterClrMapping/>
   </p:clrMapOvr>
-  <p:timing>
-    <p:tnLst>
-      <p:par>
-        <p:cTn id="1" dur="indefinite" restart="never" nodeType="tmRoot"/>
-      </p:par>
-    </p:tnLst>
-  </p:timing>
-</p:sld>
-</file>
-
-<file path=ppt/slides/slide29.xml><?xml version="1.0" encoding="utf-8"?>
-<p:sld xmlns:a="http://schemas.openxmlformats.org/drawingml/2006/main" xmlns:r="http://schemas.openxmlformats.org/officeDocument/2006/relationships" xmlns:p="http://schemas.openxmlformats.org/presentationml/2006/main">
-  <p:cSld>
-    <p:spTree>
-      <p:nvGrpSpPr>
-        <p:cNvPr id="1" name=""/>
-        <p:cNvGrpSpPr/>
-        <p:nvPr/>
-      </p:nvGrpSpPr>
-      <p:grpSpPr>
-        <a:xfrm>
-          <a:off x="0" y="0"/>
-          <a:ext cx="0" cy="0"/>
-          <a:chOff x="0" y="0"/>
-          <a:chExt cx="0" cy="0"/>
-        </a:xfrm>
-      </p:grpSpPr>
-      <p:sp>
-        <p:nvSpPr>
-          <p:cNvPr id="2" name="Title 1"/>
-          <p:cNvSpPr>
-            <a:spLocks noGrp="1"/>
-          </p:cNvSpPr>
-          <p:nvPr>
-            <p:ph type="title"/>
-          </p:nvPr>
-        </p:nvSpPr>
-        <p:spPr/>
-        <p:txBody>
-          <a:bodyPr/>
-          <a:lstStyle/>
-          <a:p>
-            <a:r>
-              <a:rPr lang="en-US" dirty="0" smtClean="0"/>
-              <a:t>Why does bit flipping matter?</a:t>
-            </a:r>
-            <a:endParaRPr lang="en-US" dirty="0"/>
-          </a:p>
-        </p:txBody>
-      </p:sp>
-      <p:sp>
-        <p:nvSpPr>
-          <p:cNvPr id="3" name="Content Placeholder 2"/>
-          <p:cNvSpPr>
-            <a:spLocks noGrp="1"/>
-          </p:cNvSpPr>
-          <p:nvPr>
-            <p:ph idx="1"/>
-          </p:nvPr>
-        </p:nvSpPr>
-        <p:spPr/>
-        <p:txBody>
-          <a:bodyPr/>
-          <a:lstStyle/>
-          <a:p>
-            <a:r>
-              <a:rPr lang="en-US" dirty="0" smtClean="0"/>
-              <a:t>The plaintext packet can be controlled by modifying the encrypted packet</a:t>
-            </a:r>
-          </a:p>
-          <a:p>
-            <a:r>
-              <a:rPr lang="en-US" dirty="0" smtClean="0"/>
-              <a:t>This works against any algorithm that XORs the plaintext with a </a:t>
-            </a:r>
-            <a:r>
-              <a:rPr lang="en-US" dirty="0" err="1" smtClean="0"/>
-              <a:t>keystream</a:t>
-            </a:r>
-            <a:endParaRPr lang="en-US" dirty="0" smtClean="0"/>
-          </a:p>
-          <a:p>
-            <a:pPr lvl="1"/>
-            <a:r>
-              <a:rPr lang="en-US" dirty="0" smtClean="0"/>
-              <a:t>RC4</a:t>
-            </a:r>
-          </a:p>
-          <a:p>
-            <a:pPr lvl="1"/>
-            <a:r>
-              <a:rPr lang="en-US" dirty="0" smtClean="0"/>
-              <a:t>One-time pads</a:t>
-            </a:r>
-          </a:p>
-          <a:p>
-            <a:pPr lvl="1"/>
-            <a:r>
-              <a:rPr lang="en-US" dirty="0" smtClean="0"/>
-              <a:t>Block ciphers in OFB, PFB, or CTR mode (we’ll talk more about those later!)</a:t>
-            </a:r>
-            <a:endParaRPr lang="en-US" dirty="0"/>
-          </a:p>
-        </p:txBody>
-      </p:sp>
-    </p:spTree>
-    <p:extLst>
-      <p:ext uri="{BB962C8B-B14F-4D97-AF65-F5344CB8AC3E}">
-        <p14:creationId xmlns:p14="http://schemas.microsoft.com/office/powerpoint/2010/main" val="337137870"/>
-      </p:ext>
-    </p:extLst>
-  </p:cSld>
-  <p:clrMapOvr>
-    <a:masterClrMapping/>
-  </p:clrMapOvr>
+  <mc:AlternateContent xmlns:mc="http://schemas.openxmlformats.org/markup-compatibility/2006" xmlns:p14="http://schemas.microsoft.com/office/powerpoint/2010/main">
+    <mc:Choice Requires="p14">
+      <p:transition spd="slow" p14:dur="2000"/>
+    </mc:Choice>
+    <mc:Fallback xmlns="">
+      <p:transition spd="slow"/>
+    </mc:Fallback>
+  </mc:AlternateContent>
   <p:timing>
     <p:tnLst>
       <p:par>
@@ -11324,21 +10985,7 @@
             <a:pPr lvl="1"/>
             <a:r>
               <a:rPr lang="en-US" dirty="0" smtClean="0"/>
-              <a:t>Bit flipping</a:t>
-            </a:r>
-          </a:p>
-          <a:p>
-            <a:pPr lvl="1"/>
-            <a:r>
-              <a:rPr lang="en-US" dirty="0" smtClean="0"/>
               <a:t>Key re-use</a:t>
-            </a:r>
-          </a:p>
-          <a:p>
-            <a:pPr lvl="1"/>
-            <a:r>
-              <a:rPr lang="en-US" dirty="0" smtClean="0"/>
-              <a:t>Padding oracle</a:t>
             </a:r>
           </a:p>
           <a:p>
@@ -11346,6 +10993,17 @@
             <a:r>
               <a:rPr lang="en-US" dirty="0" smtClean="0"/>
               <a:t>Hash length extension</a:t>
+            </a:r>
+          </a:p>
+          <a:p>
+            <a:pPr lvl="1"/>
+            <a:r>
+              <a:rPr lang="en-US" dirty="0"/>
+              <a:t>Padding </a:t>
+            </a:r>
+            <a:r>
+              <a:rPr lang="en-US" dirty="0" smtClean="0"/>
+              <a:t>oracle</a:t>
             </a:r>
           </a:p>
           <a:p>
@@ -11378,7 +11036,7 @@
 </file>
 
 <file path=ppt/slides/slide30.xml><?xml version="1.0" encoding="utf-8"?>
-<p:sld xmlns:a="http://schemas.openxmlformats.org/drawingml/2006/main" xmlns:r="http://schemas.openxmlformats.org/officeDocument/2006/relationships" xmlns:p="http://schemas.openxmlformats.org/presentationml/2006/main">
+<p:sld xmlns:a="http://schemas.openxmlformats.org/drawingml/2006/main" xmlns:r="http://schemas.openxmlformats.org/officeDocument/2006/relationships" xmlns:p="http://schemas.openxmlformats.org/presentationml/2006/main" show="0">
   <p:cSld>
     <p:spTree>
       <p:nvGrpSpPr>
@@ -11411,6 +11069,129 @@
           <a:p>
             <a:r>
               <a:rPr lang="en-US" dirty="0" smtClean="0"/>
+              <a:t>Why does bit flipping matter?</a:t>
+            </a:r>
+            <a:endParaRPr lang="en-US" dirty="0"/>
+          </a:p>
+        </p:txBody>
+      </p:sp>
+      <p:sp>
+        <p:nvSpPr>
+          <p:cNvPr id="3" name="Content Placeholder 2"/>
+          <p:cNvSpPr>
+            <a:spLocks noGrp="1"/>
+          </p:cNvSpPr>
+          <p:nvPr>
+            <p:ph idx="1"/>
+          </p:nvPr>
+        </p:nvSpPr>
+        <p:spPr/>
+        <p:txBody>
+          <a:bodyPr/>
+          <a:lstStyle/>
+          <a:p>
+            <a:r>
+              <a:rPr lang="en-US" dirty="0" smtClean="0"/>
+              <a:t>The plaintext packet can be controlled by modifying the encrypted packet</a:t>
+            </a:r>
+          </a:p>
+          <a:p>
+            <a:r>
+              <a:rPr lang="en-US" dirty="0" smtClean="0"/>
+              <a:t>This works against any algorithm that XORs the plaintext with a </a:t>
+            </a:r>
+            <a:r>
+              <a:rPr lang="en-US" dirty="0" err="1" smtClean="0"/>
+              <a:t>keystream</a:t>
+            </a:r>
+            <a:endParaRPr lang="en-US" dirty="0" smtClean="0"/>
+          </a:p>
+          <a:p>
+            <a:pPr lvl="1"/>
+            <a:r>
+              <a:rPr lang="en-US" dirty="0" smtClean="0"/>
+              <a:t>RC4</a:t>
+            </a:r>
+          </a:p>
+          <a:p>
+            <a:pPr lvl="1"/>
+            <a:r>
+              <a:rPr lang="en-US" dirty="0" smtClean="0"/>
+              <a:t>One-time pads</a:t>
+            </a:r>
+          </a:p>
+          <a:p>
+            <a:pPr lvl="1"/>
+            <a:r>
+              <a:rPr lang="en-US" dirty="0" smtClean="0"/>
+              <a:t>Block ciphers in OFB, PFB, or CTR mode (we’ll talk more about those later!)</a:t>
+            </a:r>
+            <a:endParaRPr lang="en-US" dirty="0"/>
+          </a:p>
+        </p:txBody>
+      </p:sp>
+    </p:spTree>
+    <p:extLst>
+      <p:ext uri="{BB962C8B-B14F-4D97-AF65-F5344CB8AC3E}">
+        <p14:creationId xmlns:p14="http://schemas.microsoft.com/office/powerpoint/2010/main" val="337137870"/>
+      </p:ext>
+    </p:extLst>
+  </p:cSld>
+  <p:clrMapOvr>
+    <a:masterClrMapping/>
+  </p:clrMapOvr>
+  <mc:AlternateContent xmlns:mc="http://schemas.openxmlformats.org/markup-compatibility/2006" xmlns:p14="http://schemas.microsoft.com/office/powerpoint/2010/main">
+    <mc:Choice Requires="p14">
+      <p:transition spd="slow" p14:dur="2000"/>
+    </mc:Choice>
+    <mc:Fallback xmlns="">
+      <p:transition spd="slow"/>
+    </mc:Fallback>
+  </mc:AlternateContent>
+  <p:timing>
+    <p:tnLst>
+      <p:par>
+        <p:cTn id="1" dur="indefinite" restart="never" nodeType="tmRoot"/>
+      </p:par>
+    </p:tnLst>
+  </p:timing>
+</p:sld>
+</file>
+
+<file path=ppt/slides/slide31.xml><?xml version="1.0" encoding="utf-8"?>
+<p:sld xmlns:a="http://schemas.openxmlformats.org/drawingml/2006/main" xmlns:r="http://schemas.openxmlformats.org/officeDocument/2006/relationships" xmlns:p="http://schemas.openxmlformats.org/presentationml/2006/main" show="0">
+  <p:cSld>
+    <p:spTree>
+      <p:nvGrpSpPr>
+        <p:cNvPr id="1" name=""/>
+        <p:cNvGrpSpPr/>
+        <p:nvPr/>
+      </p:nvGrpSpPr>
+      <p:grpSpPr>
+        <a:xfrm>
+          <a:off x="0" y="0"/>
+          <a:ext cx="0" cy="0"/>
+          <a:chOff x="0" y="0"/>
+          <a:chExt cx="0" cy="0"/>
+        </a:xfrm>
+      </p:grpSpPr>
+      <p:sp>
+        <p:nvSpPr>
+          <p:cNvPr id="2" name="Title 1"/>
+          <p:cNvSpPr>
+            <a:spLocks noGrp="1"/>
+          </p:cNvSpPr>
+          <p:nvPr>
+            <p:ph type="title"/>
+          </p:nvPr>
+        </p:nvSpPr>
+        <p:spPr/>
+        <p:txBody>
+          <a:bodyPr/>
+          <a:lstStyle/>
+          <a:p>
+            <a:r>
+              <a:rPr lang="en-US" dirty="0" smtClean="0"/>
               <a:t>How to prevent bit-flipping attacks</a:t>
             </a:r>
             <a:endParaRPr lang="en-US" dirty="0"/>
@@ -11446,15 +11227,7 @@
             </a:r>
             <a:r>
               <a:rPr lang="en-US" dirty="0" smtClean="0"/>
-              <a:t> HMAC(), not H(secret </a:t>
-            </a:r>
-            <a:r>
-              <a:rPr lang="en-US" dirty="0" smtClean="0"/>
-              <a:t>|| </a:t>
-            </a:r>
-            <a:r>
-              <a:rPr lang="en-US" dirty="0" smtClean="0"/>
-              <a:t>data)</a:t>
+              <a:t> HMAC(), not H(secret || data)</a:t>
             </a:r>
           </a:p>
           <a:p>
@@ -11512,6 +11285,14 @@
   <p:clrMapOvr>
     <a:masterClrMapping/>
   </p:clrMapOvr>
+  <mc:AlternateContent xmlns:mc="http://schemas.openxmlformats.org/markup-compatibility/2006" xmlns:p14="http://schemas.microsoft.com/office/powerpoint/2010/main">
+    <mc:Choice Requires="p14">
+      <p:transition spd="slow" p14:dur="2000"/>
+    </mc:Choice>
+    <mc:Fallback xmlns="">
+      <p:transition spd="slow"/>
+    </mc:Fallback>
+  </mc:AlternateContent>
   <p:timing>
     <p:tnLst>
       <p:par>
@@ -11522,8 +11303,8 @@
 </p:sld>
 </file>
 
-<file path=ppt/slides/slide31.xml><?xml version="1.0" encoding="utf-8"?>
-<p:sld xmlns:a="http://schemas.openxmlformats.org/drawingml/2006/main" xmlns:r="http://schemas.openxmlformats.org/officeDocument/2006/relationships" xmlns:p="http://schemas.openxmlformats.org/presentationml/2006/main">
+<file path=ppt/slides/slide32.xml><?xml version="1.0" encoding="utf-8"?>
+<p:sld xmlns:a="http://schemas.openxmlformats.org/drawingml/2006/main" xmlns:r="http://schemas.openxmlformats.org/officeDocument/2006/relationships" xmlns:p="http://schemas.openxmlformats.org/presentationml/2006/main" show="0">
   <p:cSld>
     <p:spTree>
       <p:nvGrpSpPr>
@@ -11603,6 +11384,14 @@
   <p:clrMapOvr>
     <a:masterClrMapping/>
   </p:clrMapOvr>
+  <mc:AlternateContent xmlns:mc="http://schemas.openxmlformats.org/markup-compatibility/2006" xmlns:p14="http://schemas.microsoft.com/office/powerpoint/2010/main">
+    <mc:Choice Requires="p14">
+      <p:transition spd="slow" p14:dur="2000"/>
+    </mc:Choice>
+    <mc:Fallback xmlns="">
+      <p:transition spd="slow"/>
+    </mc:Fallback>
+  </mc:AlternateContent>
   <p:timing>
     <p:tnLst>
       <p:par>
@@ -11613,8 +11402,8 @@
 </p:sld>
 </file>
 
-<file path=ppt/slides/slide32.xml><?xml version="1.0" encoding="utf-8"?>
-<p:sld xmlns:a="http://schemas.openxmlformats.org/drawingml/2006/main" xmlns:r="http://schemas.openxmlformats.org/officeDocument/2006/relationships" xmlns:p="http://schemas.openxmlformats.org/presentationml/2006/main">
+<file path=ppt/slides/slide33.xml><?xml version="1.0" encoding="utf-8"?>
+<p:sld xmlns:a="http://schemas.openxmlformats.org/drawingml/2006/main" xmlns:r="http://schemas.openxmlformats.org/officeDocument/2006/relationships" xmlns:p="http://schemas.openxmlformats.org/presentationml/2006/main" show="0">
   <p:cSld>
     <p:spTree>
       <p:nvGrpSpPr>
@@ -11736,6 +11525,14 @@
   <p:clrMapOvr>
     <a:masterClrMapping/>
   </p:clrMapOvr>
+  <mc:AlternateContent xmlns:mc="http://schemas.openxmlformats.org/markup-compatibility/2006" xmlns:p14="http://schemas.microsoft.com/office/powerpoint/2010/main">
+    <mc:Choice Requires="p14">
+      <p:transition spd="slow" p14:dur="2000"/>
+    </mc:Choice>
+    <mc:Fallback xmlns="">
+      <p:transition spd="slow"/>
+    </mc:Fallback>
+  </mc:AlternateContent>
   <p:timing>
     <p:tnLst>
       <p:par>
@@ -11746,8 +11543,8 @@
 </p:sld>
 </file>
 
-<file path=ppt/slides/slide33.xml><?xml version="1.0" encoding="utf-8"?>
-<p:sld xmlns:a="http://schemas.openxmlformats.org/drawingml/2006/main" xmlns:r="http://schemas.openxmlformats.org/officeDocument/2006/relationships" xmlns:p="http://schemas.openxmlformats.org/presentationml/2006/main">
+<file path=ppt/slides/slide34.xml><?xml version="1.0" encoding="utf-8"?>
+<p:sld xmlns:a="http://schemas.openxmlformats.org/drawingml/2006/main" xmlns:r="http://schemas.openxmlformats.org/officeDocument/2006/relationships" xmlns:p="http://schemas.openxmlformats.org/presentationml/2006/main" show="0">
   <p:cSld>
     <p:spTree>
       <p:nvGrpSpPr>
@@ -12671,6 +12468,14 @@
   <p:clrMapOvr>
     <a:masterClrMapping/>
   </p:clrMapOvr>
+  <mc:AlternateContent xmlns:mc="http://schemas.openxmlformats.org/markup-compatibility/2006" xmlns:p14="http://schemas.microsoft.com/office/powerpoint/2010/main">
+    <mc:Choice Requires="p14">
+      <p:transition spd="slow" p14:dur="2000"/>
+    </mc:Choice>
+    <mc:Fallback xmlns="">
+      <p:transition spd="slow"/>
+    </mc:Fallback>
+  </mc:AlternateContent>
   <p:timing>
     <p:tnLst>
       <p:par>
@@ -12681,8 +12486,8 @@
 </p:sld>
 </file>
 
-<file path=ppt/slides/slide34.xml><?xml version="1.0" encoding="utf-8"?>
-<p:sld xmlns:a="http://schemas.openxmlformats.org/drawingml/2006/main" xmlns:r="http://schemas.openxmlformats.org/officeDocument/2006/relationships" xmlns:p="http://schemas.openxmlformats.org/presentationml/2006/main">
+<file path=ppt/slides/slide35.xml><?xml version="1.0" encoding="utf-8"?>
+<p:sld xmlns:a="http://schemas.openxmlformats.org/drawingml/2006/main" xmlns:r="http://schemas.openxmlformats.org/officeDocument/2006/relationships" xmlns:p="http://schemas.openxmlformats.org/presentationml/2006/main" show="0">
   <p:cSld>
     <p:spTree>
       <p:nvGrpSpPr>
@@ -12775,6 +12580,14 @@
   <p:clrMapOvr>
     <a:masterClrMapping/>
   </p:clrMapOvr>
+  <mc:AlternateContent xmlns:mc="http://schemas.openxmlformats.org/markup-compatibility/2006" xmlns:p14="http://schemas.microsoft.com/office/powerpoint/2010/main">
+    <mc:Choice Requires="p14">
+      <p:transition spd="slow" p14:dur="2000"/>
+    </mc:Choice>
+    <mc:Fallback xmlns="">
+      <p:transition spd="slow"/>
+    </mc:Fallback>
+  </mc:AlternateContent>
   <p:timing>
     <p:tnLst>
       <p:par>
@@ -12785,8 +12598,8 @@
 </p:sld>
 </file>
 
-<file path=ppt/slides/slide35.xml><?xml version="1.0" encoding="utf-8"?>
-<p:sld xmlns:a="http://schemas.openxmlformats.org/drawingml/2006/main" xmlns:r="http://schemas.openxmlformats.org/officeDocument/2006/relationships" xmlns:p="http://schemas.openxmlformats.org/presentationml/2006/main">
+<file path=ppt/slides/slide36.xml><?xml version="1.0" encoding="utf-8"?>
+<p:sld xmlns:a="http://schemas.openxmlformats.org/drawingml/2006/main" xmlns:r="http://schemas.openxmlformats.org/officeDocument/2006/relationships" xmlns:p="http://schemas.openxmlformats.org/presentationml/2006/main" show="0">
   <p:cSld>
     <p:spTree>
       <p:nvGrpSpPr>
@@ -12866,139 +12679,14 @@
   <p:clrMapOvr>
     <a:masterClrMapping/>
   </p:clrMapOvr>
-  <p:timing>
-    <p:tnLst>
-      <p:par>
-        <p:cTn id="1" dur="indefinite" restart="never" nodeType="tmRoot"/>
-      </p:par>
-    </p:tnLst>
-  </p:timing>
-</p:sld>
-</file>
-
-<file path=ppt/slides/slide36.xml><?xml version="1.0" encoding="utf-8"?>
-<p:sld xmlns:a="http://schemas.openxmlformats.org/drawingml/2006/main" xmlns:r="http://schemas.openxmlformats.org/officeDocument/2006/relationships" xmlns:p="http://schemas.openxmlformats.org/presentationml/2006/main">
-  <p:cSld>
-    <p:spTree>
-      <p:nvGrpSpPr>
-        <p:cNvPr id="1" name=""/>
-        <p:cNvGrpSpPr/>
-        <p:nvPr/>
-      </p:nvGrpSpPr>
-      <p:grpSpPr>
-        <a:xfrm>
-          <a:off x="0" y="0"/>
-          <a:ext cx="0" cy="0"/>
-          <a:chOff x="0" y="0"/>
-          <a:chExt cx="0" cy="0"/>
-        </a:xfrm>
-      </p:grpSpPr>
-      <p:sp>
-        <p:nvSpPr>
-          <p:cNvPr id="2" name="Title 1"/>
-          <p:cNvSpPr>
-            <a:spLocks noGrp="1"/>
-          </p:cNvSpPr>
-          <p:nvPr>
-            <p:ph type="title"/>
-          </p:nvPr>
-        </p:nvSpPr>
-        <p:spPr/>
-        <p:txBody>
-          <a:bodyPr/>
-          <a:lstStyle/>
-          <a:p>
-            <a:r>
-              <a:rPr lang="en-US" dirty="0" smtClean="0"/>
-              <a:t>Key re-use in block ciphers</a:t>
-            </a:r>
-            <a:endParaRPr lang="en-US" dirty="0"/>
-          </a:p>
-        </p:txBody>
-      </p:sp>
-      <p:sp>
-        <p:nvSpPr>
-          <p:cNvPr id="3" name="Content Placeholder 2"/>
-          <p:cNvSpPr>
-            <a:spLocks noGrp="1"/>
-          </p:cNvSpPr>
-          <p:nvPr>
-            <p:ph idx="1"/>
-          </p:nvPr>
-        </p:nvSpPr>
-        <p:spPr/>
-        <p:txBody>
-          <a:bodyPr>
-            <a:normAutofit lnSpcReduction="10000"/>
-          </a:bodyPr>
-          <a:lstStyle/>
-          <a:p>
-            <a:r>
-              <a:rPr lang="en-US" dirty="0" smtClean="0"/>
-              <a:t>This is more subtle, and more difficult to exploit, but equally as dangerous</a:t>
-            </a:r>
-          </a:p>
-          <a:p>
-            <a:r>
-              <a:rPr lang="en-US" dirty="0" smtClean="0"/>
-              <a:t>This affects:</a:t>
-            </a:r>
-          </a:p>
-          <a:p>
-            <a:pPr lvl="1"/>
-            <a:r>
-              <a:rPr lang="en-US" dirty="0" smtClean="0"/>
-              <a:t>DES (all modes)</a:t>
-            </a:r>
-          </a:p>
-          <a:p>
-            <a:pPr lvl="1"/>
-            <a:r>
-              <a:rPr lang="en-US" dirty="0" smtClean="0"/>
-              <a:t>3DES (all modes)</a:t>
-            </a:r>
-          </a:p>
-          <a:p>
-            <a:pPr lvl="1"/>
-            <a:r>
-              <a:rPr lang="en-US" dirty="0" smtClean="0"/>
-              <a:t>AES (all modes)</a:t>
-            </a:r>
-          </a:p>
-          <a:p>
-            <a:pPr lvl="1"/>
-            <a:r>
-              <a:rPr lang="en-US" dirty="0" smtClean="0"/>
-              <a:t>RC2</a:t>
-            </a:r>
-          </a:p>
-          <a:p>
-            <a:pPr lvl="1"/>
-            <a:r>
-              <a:rPr lang="en-US" dirty="0" smtClean="0"/>
-              <a:t>RC5</a:t>
-            </a:r>
-          </a:p>
-          <a:p>
-            <a:pPr lvl="1"/>
-            <a:r>
-              <a:rPr lang="en-US" dirty="0" smtClean="0"/>
-              <a:t>And… well, everything else I’ve tested</a:t>
-            </a:r>
-            <a:endParaRPr lang="en-US" dirty="0"/>
-          </a:p>
-        </p:txBody>
-      </p:sp>
-    </p:spTree>
-    <p:extLst>
-      <p:ext uri="{BB962C8B-B14F-4D97-AF65-F5344CB8AC3E}">
-        <p14:creationId xmlns:p14="http://schemas.microsoft.com/office/powerpoint/2010/main" val="2529587816"/>
-      </p:ext>
-    </p:extLst>
-  </p:cSld>
-  <p:clrMapOvr>
-    <a:masterClrMapping/>
-  </p:clrMapOvr>
+  <mc:AlternateContent xmlns:mc="http://schemas.openxmlformats.org/markup-compatibility/2006" xmlns:p14="http://schemas.microsoft.com/office/powerpoint/2010/main">
+    <mc:Choice Requires="p14">
+      <p:transition spd="slow" p14:dur="2000"/>
+    </mc:Choice>
+    <mc:Fallback xmlns="">
+      <p:transition spd="slow"/>
+    </mc:Fallback>
+  </mc:AlternateContent>
   <p:timing>
     <p:tnLst>
       <p:par>
@@ -13038,14 +12726,12 @@
         </p:nvSpPr>
         <p:spPr/>
         <p:txBody>
-          <a:bodyPr>
-            <a:normAutofit fontScale="90000"/>
-          </a:bodyPr>
+          <a:bodyPr/>
           <a:lstStyle/>
           <a:p>
             <a:r>
               <a:rPr lang="en-US" dirty="0" smtClean="0"/>
-              <a:t>Key re-use in block ciphers: When does this work?</a:t>
+              <a:t>Key re-use in block ciphers</a:t>
             </a:r>
             <a:endParaRPr lang="en-US" dirty="0"/>
           </a:p>
@@ -13070,6 +12756,150 @@
           <a:p>
             <a:r>
               <a:rPr lang="en-US" dirty="0" smtClean="0"/>
+              <a:t>Using the same key/IV to encrypt two messages = fail</a:t>
+            </a:r>
+            <a:endParaRPr lang="en-US" dirty="0" smtClean="0"/>
+          </a:p>
+          <a:p>
+            <a:r>
+              <a:rPr lang="en-US" dirty="0" smtClean="0"/>
+              <a:t>This affects:</a:t>
+            </a:r>
+          </a:p>
+          <a:p>
+            <a:pPr lvl="1"/>
+            <a:r>
+              <a:rPr lang="en-US" dirty="0" smtClean="0"/>
+              <a:t>DES (all modes)</a:t>
+            </a:r>
+          </a:p>
+          <a:p>
+            <a:pPr lvl="1"/>
+            <a:r>
+              <a:rPr lang="en-US" dirty="0" smtClean="0"/>
+              <a:t>3DES (all modes)</a:t>
+            </a:r>
+          </a:p>
+          <a:p>
+            <a:pPr lvl="1"/>
+            <a:r>
+              <a:rPr lang="en-US" dirty="0" smtClean="0"/>
+              <a:t>AES (all modes)</a:t>
+            </a:r>
+          </a:p>
+          <a:p>
+            <a:pPr lvl="1"/>
+            <a:r>
+              <a:rPr lang="en-US" dirty="0" smtClean="0"/>
+              <a:t>RC2</a:t>
+            </a:r>
+          </a:p>
+          <a:p>
+            <a:pPr lvl="1"/>
+            <a:r>
+              <a:rPr lang="en-US" dirty="0" smtClean="0"/>
+              <a:t>RC4</a:t>
+            </a:r>
+            <a:endParaRPr lang="en-US" dirty="0" smtClean="0"/>
+          </a:p>
+          <a:p>
+            <a:pPr lvl="1"/>
+            <a:r>
+              <a:rPr lang="en-US" dirty="0" smtClean="0"/>
+              <a:t>RC5</a:t>
+            </a:r>
+          </a:p>
+          <a:p>
+            <a:pPr lvl="1"/>
+            <a:r>
+              <a:rPr lang="en-US" dirty="0" smtClean="0"/>
+              <a:t>And… well, everything else I’ve tested</a:t>
+            </a:r>
+            <a:endParaRPr lang="en-US" dirty="0"/>
+          </a:p>
+        </p:txBody>
+      </p:sp>
+    </p:spTree>
+    <p:extLst>
+      <p:ext uri="{BB962C8B-B14F-4D97-AF65-F5344CB8AC3E}">
+        <p14:creationId xmlns:p14="http://schemas.microsoft.com/office/powerpoint/2010/main" val="2529587816"/>
+      </p:ext>
+    </p:extLst>
+  </p:cSld>
+  <p:clrMapOvr>
+    <a:masterClrMapping/>
+  </p:clrMapOvr>
+  <p:timing>
+    <p:tnLst>
+      <p:par>
+        <p:cTn id="1" dur="indefinite" restart="never" nodeType="tmRoot"/>
+      </p:par>
+    </p:tnLst>
+  </p:timing>
+</p:sld>
+</file>
+
+<file path=ppt/slides/slide38.xml><?xml version="1.0" encoding="utf-8"?>
+<p:sld xmlns:a="http://schemas.openxmlformats.org/drawingml/2006/main" xmlns:r="http://schemas.openxmlformats.org/officeDocument/2006/relationships" xmlns:p="http://schemas.openxmlformats.org/presentationml/2006/main">
+  <p:cSld>
+    <p:spTree>
+      <p:nvGrpSpPr>
+        <p:cNvPr id="1" name=""/>
+        <p:cNvGrpSpPr/>
+        <p:nvPr/>
+      </p:nvGrpSpPr>
+      <p:grpSpPr>
+        <a:xfrm>
+          <a:off x="0" y="0"/>
+          <a:ext cx="0" cy="0"/>
+          <a:chOff x="0" y="0"/>
+          <a:chExt cx="0" cy="0"/>
+        </a:xfrm>
+      </p:grpSpPr>
+      <p:sp>
+        <p:nvSpPr>
+          <p:cNvPr id="2" name="Title 1"/>
+          <p:cNvSpPr>
+            <a:spLocks noGrp="1"/>
+          </p:cNvSpPr>
+          <p:nvPr>
+            <p:ph type="title"/>
+          </p:nvPr>
+        </p:nvSpPr>
+        <p:spPr/>
+        <p:txBody>
+          <a:bodyPr>
+            <a:normAutofit fontScale="90000"/>
+          </a:bodyPr>
+          <a:lstStyle/>
+          <a:p>
+            <a:r>
+              <a:rPr lang="en-US" dirty="0" smtClean="0"/>
+              <a:t>Key re-use in block ciphers: When does this work?</a:t>
+            </a:r>
+            <a:endParaRPr lang="en-US" dirty="0"/>
+          </a:p>
+        </p:txBody>
+      </p:sp>
+      <p:sp>
+        <p:nvSpPr>
+          <p:cNvPr id="3" name="Content Placeholder 2"/>
+          <p:cNvSpPr>
+            <a:spLocks noGrp="1"/>
+          </p:cNvSpPr>
+          <p:nvPr>
+            <p:ph idx="1"/>
+          </p:nvPr>
+        </p:nvSpPr>
+        <p:spPr/>
+        <p:txBody>
+          <a:bodyPr>
+            <a:normAutofit fontScale="92500" lnSpcReduction="10000"/>
+          </a:bodyPr>
+          <a:lstStyle/>
+          <a:p>
+            <a:r>
+              <a:rPr lang="en-US" dirty="0" smtClean="0"/>
               <a:t>This attack works if:</a:t>
             </a:r>
           </a:p>
@@ -13091,7 +12921,15 @@
             <a:pPr lvl="1"/>
             <a:r>
               <a:rPr lang="en-US" dirty="0" smtClean="0"/>
-              <a:t>The attacker controls [</a:t>
+              <a:t>The attacker </a:t>
+            </a:r>
+            <a:r>
+              <a:rPr lang="en-US" dirty="0" smtClean="0"/>
+              <a:t>controls at least </a:t>
+            </a:r>
+            <a:r>
+              <a:rPr lang="en-US" dirty="0" smtClean="0"/>
+              <a:t>[</a:t>
             </a:r>
             <a:r>
               <a:rPr lang="en-US" dirty="0" err="1" smtClean="0"/>
@@ -13146,7 +12984,7 @@
 </p:sld>
 </file>
 
-<file path=ppt/slides/slide38.xml><?xml version="1.0" encoding="utf-8"?>
+<file path=ppt/slides/slide39.xml><?xml version="1.0" encoding="utf-8"?>
 <p:sld xmlns:a="http://schemas.openxmlformats.org/drawingml/2006/main" xmlns:r="http://schemas.openxmlformats.org/officeDocument/2006/relationships" xmlns:p="http://schemas.openxmlformats.org/presentationml/2006/main">
   <p:cSld>
     <p:spTree>
@@ -13306,7 +13144,110 @@
 </p:sld>
 </file>
 
-<file path=ppt/slides/slide39.xml><?xml version="1.0" encoding="utf-8"?>
+<file path=ppt/slides/slide4.xml><?xml version="1.0" encoding="utf-8"?>
+<p:sld xmlns:a="http://schemas.openxmlformats.org/drawingml/2006/main" xmlns:r="http://schemas.openxmlformats.org/officeDocument/2006/relationships" xmlns:p="http://schemas.openxmlformats.org/presentationml/2006/main">
+  <p:cSld>
+    <p:spTree>
+      <p:nvGrpSpPr>
+        <p:cNvPr id="1" name=""/>
+        <p:cNvGrpSpPr/>
+        <p:nvPr/>
+      </p:nvGrpSpPr>
+      <p:grpSpPr>
+        <a:xfrm>
+          <a:off x="0" y="0"/>
+          <a:ext cx="0" cy="0"/>
+          <a:chOff x="0" y="0"/>
+          <a:chExt cx="0" cy="0"/>
+        </a:xfrm>
+      </p:grpSpPr>
+      <p:sp>
+        <p:nvSpPr>
+          <p:cNvPr id="2" name="Title 1"/>
+          <p:cNvSpPr>
+            <a:spLocks noGrp="1"/>
+          </p:cNvSpPr>
+          <p:nvPr>
+            <p:ph type="title"/>
+          </p:nvPr>
+        </p:nvSpPr>
+        <p:spPr/>
+        <p:txBody>
+          <a:bodyPr/>
+          <a:lstStyle/>
+          <a:p>
+            <a:r>
+              <a:rPr lang="en-US" dirty="0" smtClean="0"/>
+              <a:t>Why am I doing this?</a:t>
+            </a:r>
+            <a:endParaRPr lang="en-US" dirty="0"/>
+          </a:p>
+        </p:txBody>
+      </p:sp>
+      <p:sp>
+        <p:nvSpPr>
+          <p:cNvPr id="3" name="Content Placeholder 2"/>
+          <p:cNvSpPr>
+            <a:spLocks noGrp="1"/>
+          </p:cNvSpPr>
+          <p:nvPr>
+            <p:ph idx="1"/>
+          </p:nvPr>
+        </p:nvSpPr>
+        <p:spPr/>
+        <p:txBody>
+          <a:bodyPr>
+            <a:normAutofit/>
+          </a:bodyPr>
+          <a:lstStyle/>
+          <a:p>
+            <a:r>
+              <a:rPr lang="en-US" dirty="0" smtClean="0"/>
+              <a:t>In my opinion, crypto is one of the most important technologies in the modern world, if implemented correctly</a:t>
+            </a:r>
+          </a:p>
+          <a:p>
+            <a:r>
+              <a:rPr lang="en-US" dirty="0" smtClean="0"/>
+              <a:t>Crypto implementation is hard</a:t>
+            </a:r>
+          </a:p>
+          <a:p>
+            <a:r>
+              <a:rPr lang="en-US" dirty="0" smtClean="0"/>
+              <a:t>I decided to teach myself attacks by writing tools</a:t>
+            </a:r>
+          </a:p>
+          <a:p>
+            <a:pPr lvl="1"/>
+            <a:r>
+              <a:rPr lang="en-US" dirty="0" smtClean="0"/>
+              <a:t>Before I knew it, I had enough to make an interesting talk!</a:t>
+            </a:r>
+          </a:p>
+        </p:txBody>
+      </p:sp>
+    </p:spTree>
+    <p:extLst>
+      <p:ext uri="{BB962C8B-B14F-4D97-AF65-F5344CB8AC3E}">
+        <p14:creationId xmlns:p14="http://schemas.microsoft.com/office/powerpoint/2010/main" val="1079383365"/>
+      </p:ext>
+    </p:extLst>
+  </p:cSld>
+  <p:clrMapOvr>
+    <a:masterClrMapping/>
+  </p:clrMapOvr>
+  <p:timing>
+    <p:tnLst>
+      <p:par>
+        <p:cTn id="1" dur="indefinite" restart="never" nodeType="tmRoot"/>
+      </p:par>
+    </p:tnLst>
+  </p:timing>
+</p:sld>
+</file>
+
+<file path=ppt/slides/slide40.xml><?xml version="1.0" encoding="utf-8"?>
 <p:sld xmlns:a="http://schemas.openxmlformats.org/drawingml/2006/main" xmlns:r="http://schemas.openxmlformats.org/officeDocument/2006/relationships" xmlns:p="http://schemas.openxmlformats.org/presentationml/2006/main">
   <p:cSld>
     <p:spTree>
@@ -16606,110 +16547,7 @@
 </p:sld>
 </file>
 
-<file path=ppt/slides/slide4.xml><?xml version="1.0" encoding="utf-8"?>
-<p:sld xmlns:a="http://schemas.openxmlformats.org/drawingml/2006/main" xmlns:r="http://schemas.openxmlformats.org/officeDocument/2006/relationships" xmlns:p="http://schemas.openxmlformats.org/presentationml/2006/main">
-  <p:cSld>
-    <p:spTree>
-      <p:nvGrpSpPr>
-        <p:cNvPr id="1" name=""/>
-        <p:cNvGrpSpPr/>
-        <p:nvPr/>
-      </p:nvGrpSpPr>
-      <p:grpSpPr>
-        <a:xfrm>
-          <a:off x="0" y="0"/>
-          <a:ext cx="0" cy="0"/>
-          <a:chOff x="0" y="0"/>
-          <a:chExt cx="0" cy="0"/>
-        </a:xfrm>
-      </p:grpSpPr>
-      <p:sp>
-        <p:nvSpPr>
-          <p:cNvPr id="2" name="Title 1"/>
-          <p:cNvSpPr>
-            <a:spLocks noGrp="1"/>
-          </p:cNvSpPr>
-          <p:nvPr>
-            <p:ph type="title"/>
-          </p:nvPr>
-        </p:nvSpPr>
-        <p:spPr/>
-        <p:txBody>
-          <a:bodyPr/>
-          <a:lstStyle/>
-          <a:p>
-            <a:r>
-              <a:rPr lang="en-US" dirty="0" smtClean="0"/>
-              <a:t>Why am I doing this?</a:t>
-            </a:r>
-            <a:endParaRPr lang="en-US" dirty="0"/>
-          </a:p>
-        </p:txBody>
-      </p:sp>
-      <p:sp>
-        <p:nvSpPr>
-          <p:cNvPr id="3" name="Content Placeholder 2"/>
-          <p:cNvSpPr>
-            <a:spLocks noGrp="1"/>
-          </p:cNvSpPr>
-          <p:nvPr>
-            <p:ph idx="1"/>
-          </p:nvPr>
-        </p:nvSpPr>
-        <p:spPr/>
-        <p:txBody>
-          <a:bodyPr>
-            <a:normAutofit/>
-          </a:bodyPr>
-          <a:lstStyle/>
-          <a:p>
-            <a:r>
-              <a:rPr lang="en-US" dirty="0" smtClean="0"/>
-              <a:t>In my opinion, crypto is one of the most important technologies in the modern world, if implemented correctly</a:t>
-            </a:r>
-          </a:p>
-          <a:p>
-            <a:r>
-              <a:rPr lang="en-US" dirty="0" smtClean="0"/>
-              <a:t>Crypto implementation is hard</a:t>
-            </a:r>
-          </a:p>
-          <a:p>
-            <a:r>
-              <a:rPr lang="en-US" dirty="0" smtClean="0"/>
-              <a:t>I decided to teach myself attacks by writing tools</a:t>
-            </a:r>
-          </a:p>
-          <a:p>
-            <a:pPr lvl="1"/>
-            <a:r>
-              <a:rPr lang="en-US" dirty="0" smtClean="0"/>
-              <a:t>Before I knew it, I had enough to make an interesting talk!</a:t>
-            </a:r>
-          </a:p>
-        </p:txBody>
-      </p:sp>
-    </p:spTree>
-    <p:extLst>
-      <p:ext uri="{BB962C8B-B14F-4D97-AF65-F5344CB8AC3E}">
-        <p14:creationId xmlns:p14="http://schemas.microsoft.com/office/powerpoint/2010/main" val="1079383365"/>
-      </p:ext>
-    </p:extLst>
-  </p:cSld>
-  <p:clrMapOvr>
-    <a:masterClrMapping/>
-  </p:clrMapOvr>
-  <p:timing>
-    <p:tnLst>
-      <p:par>
-        <p:cTn id="1" dur="indefinite" restart="never" nodeType="tmRoot"/>
-      </p:par>
-    </p:tnLst>
-  </p:timing>
-</p:sld>
-</file>
-
-<file path=ppt/slides/slide40.xml><?xml version="1.0" encoding="utf-8"?>
+<file path=ppt/slides/slide41.xml><?xml version="1.0" encoding="utf-8"?>
 <p:sld xmlns:a="http://schemas.openxmlformats.org/drawingml/2006/main" xmlns:r="http://schemas.openxmlformats.org/officeDocument/2006/relationships" xmlns:p="http://schemas.openxmlformats.org/presentationml/2006/main">
   <p:cSld>
     <p:spTree>
@@ -20667,7 +20505,7 @@
 </p:sld>
 </file>
 
-<file path=ppt/slides/slide41.xml><?xml version="1.0" encoding="utf-8"?>
+<file path=ppt/slides/slide42.xml><?xml version="1.0" encoding="utf-8"?>
 <p:sld xmlns:a="http://schemas.openxmlformats.org/drawingml/2006/main" xmlns:r="http://schemas.openxmlformats.org/officeDocument/2006/relationships" xmlns:p="http://schemas.openxmlformats.org/presentationml/2006/main">
   <p:cSld>
     <p:spTree>
@@ -24597,7 +24435,7 @@
 </p:sld>
 </file>
 
-<file path=ppt/slides/slide42.xml><?xml version="1.0" encoding="utf-8"?>
+<file path=ppt/slides/slide43.xml><?xml version="1.0" encoding="utf-8"?>
 <p:sld xmlns:a="http://schemas.openxmlformats.org/drawingml/2006/main" xmlns:r="http://schemas.openxmlformats.org/officeDocument/2006/relationships" xmlns:p="http://schemas.openxmlformats.org/presentationml/2006/main">
   <p:cSld>
     <p:spTree>
@@ -28588,7 +28426,7 @@
 </p:sld>
 </file>
 
-<file path=ppt/slides/slide43.xml><?xml version="1.0" encoding="utf-8"?>
+<file path=ppt/slides/slide44.xml><?xml version="1.0" encoding="utf-8"?>
 <p:sld xmlns:a="http://schemas.openxmlformats.org/drawingml/2006/main" xmlns:r="http://schemas.openxmlformats.org/officeDocument/2006/relationships" xmlns:p="http://schemas.openxmlformats.org/presentationml/2006/main">
   <p:cSld>
     <p:spTree>
@@ -32648,7 +32486,7 @@
 </p:sld>
 </file>
 
-<file path=ppt/slides/slide44.xml><?xml version="1.0" encoding="utf-8"?>
+<file path=ppt/slides/slide45.xml><?xml version="1.0" encoding="utf-8"?>
 <p:sld xmlns:a="http://schemas.openxmlformats.org/drawingml/2006/main" xmlns:r="http://schemas.openxmlformats.org/officeDocument/2006/relationships" xmlns:p="http://schemas.openxmlformats.org/presentationml/2006/main">
   <p:cSld>
     <p:spTree>
@@ -32727,7 +32565,7 @@
             <a:pPr lvl="1"/>
             <a:r>
               <a:rPr lang="en-US" dirty="0" smtClean="0"/>
-              <a:t>We can guess any character in 255 bytes, as long as we know all the characters before it</a:t>
+              <a:t>We can guess any character in 256 guesses, as long as we know all the characters before it</a:t>
             </a:r>
           </a:p>
         </p:txBody>
@@ -32736,112 +32574,6 @@
     <p:extLst>
       <p:ext uri="{BB962C8B-B14F-4D97-AF65-F5344CB8AC3E}">
         <p14:creationId xmlns:p14="http://schemas.microsoft.com/office/powerpoint/2010/main" val="1178365849"/>
-      </p:ext>
-    </p:extLst>
-  </p:cSld>
-  <p:clrMapOvr>
-    <a:masterClrMapping/>
-  </p:clrMapOvr>
-  <p:timing>
-    <p:tnLst>
-      <p:par>
-        <p:cTn id="1" dur="indefinite" restart="never" nodeType="tmRoot"/>
-      </p:par>
-    </p:tnLst>
-  </p:timing>
-</p:sld>
-</file>
-
-<file path=ppt/slides/slide45.xml><?xml version="1.0" encoding="utf-8"?>
-<p:sld xmlns:a="http://schemas.openxmlformats.org/drawingml/2006/main" xmlns:r="http://schemas.openxmlformats.org/officeDocument/2006/relationships" xmlns:p="http://schemas.openxmlformats.org/presentationml/2006/main">
-  <p:cSld>
-    <p:spTree>
-      <p:nvGrpSpPr>
-        <p:cNvPr id="1" name=""/>
-        <p:cNvGrpSpPr/>
-        <p:nvPr/>
-      </p:nvGrpSpPr>
-      <p:grpSpPr>
-        <a:xfrm>
-          <a:off x="0" y="0"/>
-          <a:ext cx="0" cy="0"/>
-          <a:chOff x="0" y="0"/>
-          <a:chExt cx="0" cy="0"/>
-        </a:xfrm>
-      </p:grpSpPr>
-      <p:sp>
-        <p:nvSpPr>
-          <p:cNvPr id="2" name="Title 1"/>
-          <p:cNvSpPr>
-            <a:spLocks noGrp="1"/>
-          </p:cNvSpPr>
-          <p:nvPr>
-            <p:ph type="title"/>
-          </p:nvPr>
-        </p:nvSpPr>
-        <p:spPr/>
-        <p:txBody>
-          <a:bodyPr>
-            <a:normAutofit/>
-          </a:bodyPr>
-          <a:lstStyle/>
-          <a:p>
-            <a:r>
-              <a:rPr lang="en-US" dirty="0" smtClean="0"/>
-              <a:t>Key re-use in block ciphers: A tool!</a:t>
-            </a:r>
-            <a:endParaRPr lang="en-US" dirty="0"/>
-          </a:p>
-        </p:txBody>
-      </p:sp>
-      <p:sp>
-        <p:nvSpPr>
-          <p:cNvPr id="3" name="Content Placeholder 2"/>
-          <p:cNvSpPr>
-            <a:spLocks noGrp="1"/>
-          </p:cNvSpPr>
-          <p:nvPr>
-            <p:ph idx="1"/>
-          </p:nvPr>
-        </p:nvSpPr>
-        <p:spPr/>
-        <p:txBody>
-          <a:bodyPr/>
-          <a:lstStyle/>
-          <a:p>
-            <a:r>
-              <a:rPr lang="en-US" dirty="0" smtClean="0"/>
-              <a:t>I wrote a tool called “</a:t>
-            </a:r>
-            <a:r>
-              <a:rPr lang="en-US" dirty="0" err="1" smtClean="0"/>
-              <a:t>Prephixer</a:t>
-            </a:r>
-            <a:r>
-              <a:rPr lang="en-US" dirty="0" smtClean="0"/>
-              <a:t>” to implement this attack</a:t>
-            </a:r>
-          </a:p>
-          <a:p>
-            <a:pPr lvl="1"/>
-            <a:r>
-              <a:rPr lang="en-US" dirty="0" smtClean="0">
-                <a:hlinkClick r:id="rId2"/>
-              </a:rPr>
-              <a:t>https://www.github.com/iagox86/prephixer</a:t>
-            </a:r>
-            <a:r>
-              <a:rPr lang="en-US" dirty="0" smtClean="0"/>
-              <a:t> </a:t>
-            </a:r>
-            <a:endParaRPr lang="en-US" dirty="0"/>
-          </a:p>
-        </p:txBody>
-      </p:sp>
-    </p:spTree>
-    <p:extLst>
-      <p:ext uri="{BB962C8B-B14F-4D97-AF65-F5344CB8AC3E}">
-        <p14:creationId xmlns:p14="http://schemas.microsoft.com/office/powerpoint/2010/main" val="85771328"/>
       </p:ext>
     </p:extLst>
   </p:cSld>
@@ -32887,12 +32619,14 @@
         </p:nvSpPr>
         <p:spPr/>
         <p:txBody>
-          <a:bodyPr/>
+          <a:bodyPr>
+            <a:normAutofit/>
+          </a:bodyPr>
           <a:lstStyle/>
           <a:p>
             <a:r>
               <a:rPr lang="en-US" dirty="0" smtClean="0"/>
-              <a:t>Phew, we made it!</a:t>
+              <a:t>Key re-use in block ciphers: A tool!</a:t>
             </a:r>
             <a:endParaRPr lang="en-US" dirty="0"/>
           </a:p>
@@ -32915,7 +32649,7 @@
           <a:p>
             <a:r>
               <a:rPr lang="en-US" dirty="0" smtClean="0"/>
-              <a:t>Let’s do a demo of </a:t>
+              <a:t>I wrote a tool called “</a:t>
             </a:r>
             <a:r>
               <a:rPr lang="en-US" dirty="0" err="1" smtClean="0"/>
@@ -32923,7 +32657,27 @@
             </a:r>
             <a:r>
               <a:rPr lang="en-US" dirty="0" smtClean="0"/>
-              <a:t>!</a:t>
+              <a:t>” to implement this attack</a:t>
+            </a:r>
+          </a:p>
+          <a:p>
+            <a:pPr lvl="1"/>
+            <a:r>
+              <a:rPr lang="en-US" dirty="0" smtClean="0">
+                <a:hlinkClick r:id="rId2"/>
+              </a:rPr>
+              <a:t>https://www.github.com/iagox86/prephixer</a:t>
+            </a:r>
+            <a:r>
+              <a:rPr lang="en-US" dirty="0" smtClean="0"/>
+              <a:t> </a:t>
+            </a:r>
+            <a:endParaRPr lang="en-US" dirty="0" smtClean="0"/>
+          </a:p>
+          <a:p>
+            <a:r>
+              <a:rPr lang="en-US" dirty="0" smtClean="0"/>
+              <a:t>Let’s do a demo!</a:t>
             </a:r>
             <a:endParaRPr lang="en-US" dirty="0"/>
           </a:p>
@@ -32931,14 +32685,14 @@
       </p:sp>
       <p:pic>
         <p:nvPicPr>
-          <p:cNvPr id="3074" name="Picture 2" descr="https://encrypted-tbn0.gstatic.com/images?q=tbn:ANd9GcQ6bdYBItr0MdRYd_iSgEvHN2bnnCkDEJJZ1dACv-XA7r8_2XfKsQ"/>
+          <p:cNvPr id="4" name="Picture 2" descr="https://encrypted-tbn0.gstatic.com/images?q=tbn:ANd9GcQ6bdYBItr0MdRYd_iSgEvHN2bnnCkDEJJZ1dACv-XA7r8_2XfKsQ"/>
           <p:cNvPicPr>
             <a:picLocks noChangeAspect="1" noChangeArrowheads="1"/>
           </p:cNvPicPr>
           <p:nvPr/>
         </p:nvPicPr>
         <p:blipFill>
-          <a:blip r:embed="rId2">
+          <a:blip r:embed="rId3">
             <a:extLst>
               <a:ext uri="{28A0092B-C50C-407E-A947-70E740481C1C}">
                 <a14:useLocalDpi xmlns:a14="http://schemas.microsoft.com/office/drawing/2010/main" val="0"/>
@@ -32952,8 +32706,8 @@
         </p:blipFill>
         <p:spPr bwMode="auto">
           <a:xfrm>
-            <a:off x="5629275" y="2667000"/>
-            <a:ext cx="3514725" cy="4105275"/>
+            <a:off x="6085945" y="3200400"/>
+            <a:ext cx="3058055" cy="3571875"/>
           </a:xfrm>
           <a:prstGeom prst="rect">
             <a:avLst/>
@@ -32973,7 +32727,7 @@
     </p:spTree>
     <p:extLst>
       <p:ext uri="{BB962C8B-B14F-4D97-AF65-F5344CB8AC3E}">
-        <p14:creationId xmlns:p14="http://schemas.microsoft.com/office/powerpoint/2010/main" val="2913889897"/>
+        <p14:creationId xmlns:p14="http://schemas.microsoft.com/office/powerpoint/2010/main" val="85771328"/>
       </p:ext>
     </p:extLst>
   </p:cSld>
@@ -33808,7 +33562,7 @@
 </file>
 
 <file path=ppt/slides/slide5.xml><?xml version="1.0" encoding="utf-8"?>
-<p:sld xmlns:a="http://schemas.openxmlformats.org/drawingml/2006/main" xmlns:r="http://schemas.openxmlformats.org/officeDocument/2006/relationships" xmlns:p="http://schemas.openxmlformats.org/presentationml/2006/main">
+<p:sld xmlns:a="http://schemas.openxmlformats.org/drawingml/2006/main" xmlns:r="http://schemas.openxmlformats.org/officeDocument/2006/relationships" xmlns:p="http://schemas.openxmlformats.org/presentationml/2006/main" show="0">
   <p:cSld>
     <p:spTree>
       <p:nvGrpSpPr>
@@ -33909,7 +33663,7 @@
             <p:ph sz="half" idx="2"/>
             <p:extLst>
               <p:ext uri="{D42A27DB-BD31-4B8C-83A1-F6EECF244321}">
-                <p14:modId xmlns:p14="http://schemas.microsoft.com/office/powerpoint/2010/main" val="1957158072"/>
+                <p14:modId xmlns:p14="http://schemas.microsoft.com/office/powerpoint/2010/main" val="3216986899"/>
               </p:ext>
             </p:extLst>
           </p:nvPr>
@@ -34682,12 +34436,18 @@
                     <a:p>
                       <a:pPr algn="l" fontAlgn="b"/>
                       <a:r>
-                        <a:rPr lang="en-US" sz="1100" u="none" strike="noStrike">
+                        <a:rPr lang="en-US" sz="1100" u="none" strike="noStrike" dirty="0" smtClean="0">
                           <a:effectLst/>
                         </a:rPr>
-                        <a:t>SHSA2 (2001)</a:t>
-                      </a:r>
-                      <a:endParaRPr lang="en-US" sz="1100" b="1" i="0" u="none" strike="noStrike">
+                        <a:t>SHA2 </a:t>
+                      </a:r>
+                      <a:r>
+                        <a:rPr lang="en-US" sz="1100" u="none" strike="noStrike" dirty="0">
+                          <a:effectLst/>
+                        </a:rPr>
+                        <a:t>(2001)</a:t>
+                      </a:r>
+                      <a:endParaRPr lang="en-US" sz="1100" b="1" i="0" u="none" strike="noStrike" dirty="0">
                         <a:solidFill>
                           <a:srgbClr val="000000"/>
                         </a:solidFill>
@@ -35828,6 +35588,14 @@
   <p:clrMapOvr>
     <a:masterClrMapping/>
   </p:clrMapOvr>
+  <mc:AlternateContent xmlns:mc="http://schemas.openxmlformats.org/markup-compatibility/2006">
+    <mc:Choice xmlns:p14="http://schemas.microsoft.com/office/powerpoint/2010/main" Requires="p14">
+      <p:transition spd="slow" p14:dur="2000"/>
+    </mc:Choice>
+    <mc:Fallback>
+      <p:transition spd="slow"/>
+    </mc:Fallback>
+  </mc:AlternateContent>
   <p:timing>
     <p:tnLst>
       <p:par>
@@ -38685,21 +38453,11 @@
             <a:pPr lvl="1"/>
             <a:r>
               <a:rPr lang="en-US" dirty="0" smtClean="0"/>
-              <a:t>The padding:</a:t>
-            </a:r>
-          </a:p>
-          <a:p>
-            <a:pPr lvl="2"/>
+              <a:t>And </a:t>
+            </a:r>
             <a:r>
               <a:rPr lang="en-US" dirty="0" smtClean="0"/>
-              <a:t>\x80 + \x00\x00\x00… + [length]</a:t>
-            </a:r>
-          </a:p>
-          <a:p>
-            <a:pPr lvl="1"/>
-            <a:r>
-              <a:rPr lang="en-US" dirty="0" smtClean="0"/>
-              <a:t>And the text we wanted to add!</a:t>
+              <a:t>the text we wanted to add!</a:t>
             </a:r>
             <a:endParaRPr lang="en-US" dirty="0"/>
           </a:p>
@@ -40332,7 +40090,7 @@
 </file>
 
 <file path=ppt/slides/slide6.xml><?xml version="1.0" encoding="utf-8"?>
-<p:sld xmlns:a="http://schemas.openxmlformats.org/drawingml/2006/main" xmlns:r="http://schemas.openxmlformats.org/officeDocument/2006/relationships" xmlns:p="http://schemas.openxmlformats.org/presentationml/2006/main">
+<p:sld xmlns:a="http://schemas.openxmlformats.org/drawingml/2006/main" xmlns:r="http://schemas.openxmlformats.org/officeDocument/2006/relationships" xmlns:p="http://schemas.openxmlformats.org/presentationml/2006/main" show="0">
   <p:cSld>
     <p:spTree>
       <p:nvGrpSpPr>
@@ -40469,6 +40227,14 @@
   <p:clrMapOvr>
     <a:masterClrMapping/>
   </p:clrMapOvr>
+  <mc:AlternateContent xmlns:mc="http://schemas.openxmlformats.org/markup-compatibility/2006" xmlns:p14="http://schemas.microsoft.com/office/powerpoint/2010/main">
+    <mc:Choice Requires="p14">
+      <p:transition spd="slow" p14:dur="2000"/>
+    </mc:Choice>
+    <mc:Fallback xmlns="">
+      <p:transition spd="slow"/>
+    </mc:Fallback>
+  </mc:AlternateContent>
   <p:timing>
     <p:tnLst>
       <p:par>
@@ -45770,13 +45536,13 @@
         </p:spPr>
         <p:style>
           <a:lnRef idx="2">
-            <a:schemeClr val="dk1"/>
+            <a:schemeClr val="accent2"/>
           </a:lnRef>
           <a:fillRef idx="1">
             <a:schemeClr val="lt1"/>
           </a:fillRef>
           <a:effectRef idx="0">
-            <a:schemeClr val="dk1"/>
+            <a:schemeClr val="accent2"/>
           </a:effectRef>
           <a:fontRef idx="minor">
             <a:schemeClr val="dk1"/>
@@ -46375,11 +46141,15 @@
             </a:r>
             <a:r>
               <a:rPr lang="en-US" baseline="-25000" dirty="0" smtClean="0"/>
-              <a:t>0</a:t>
+              <a:t>1</a:t>
             </a:r>
             <a:r>
               <a:rPr lang="en-US" dirty="0" smtClean="0"/>
-              <a:t> = “Hello </a:t>
+              <a:t> </a:t>
+            </a:r>
+            <a:r>
+              <a:rPr lang="en-US" dirty="0" smtClean="0"/>
+              <a:t>= “Hello </a:t>
             </a:r>
             <a:r>
               <a:rPr lang="en-US" dirty="0" err="1" smtClean="0"/>
@@ -46435,11 +46205,15 @@
             </a:r>
             <a:r>
               <a:rPr lang="en-US" baseline="-25000" dirty="0" smtClean="0"/>
-              <a:t>1</a:t>
+              <a:t>2</a:t>
             </a:r>
             <a:r>
               <a:rPr lang="en-US" dirty="0" smtClean="0"/>
-              <a:t> = “</a:t>
+              <a:t> </a:t>
+            </a:r>
+            <a:r>
+              <a:rPr lang="en-US" dirty="0" smtClean="0"/>
+              <a:t>= “</a:t>
             </a:r>
             <a:r>
               <a:rPr lang="en-US" dirty="0" err="1" smtClean="0"/>
@@ -46495,11 +46269,15 @@
             </a:r>
             <a:r>
               <a:rPr lang="en-US" baseline="-25000" dirty="0" smtClean="0"/>
-              <a:t>0</a:t>
+              <a:t>1</a:t>
             </a:r>
             <a:r>
               <a:rPr lang="en-US" dirty="0" smtClean="0"/>
-              <a:t> = “Hello </a:t>
+              <a:t> </a:t>
+            </a:r>
+            <a:r>
+              <a:rPr lang="en-US" dirty="0" smtClean="0"/>
+              <a:t>= “Hello </a:t>
             </a:r>
             <a:r>
               <a:rPr lang="en-US" dirty="0" err="1" smtClean="0"/>
@@ -46555,11 +46333,15 @@
             </a:r>
             <a:r>
               <a:rPr lang="en-US" baseline="-25000" dirty="0" smtClean="0"/>
-              <a:t>1</a:t>
+              <a:t>2</a:t>
             </a:r>
             <a:r>
               <a:rPr lang="en-US" dirty="0" smtClean="0"/>
-              <a:t> = “</a:t>
+              <a:t> </a:t>
+            </a:r>
+            <a:r>
+              <a:rPr lang="en-US" dirty="0" smtClean="0"/>
+              <a:t>= “</a:t>
             </a:r>
             <a:r>
               <a:rPr lang="en-US" dirty="0" err="1" smtClean="0"/>
@@ -46615,11 +46397,15 @@
             </a:r>
             <a:r>
               <a:rPr lang="en-US" baseline="-25000" dirty="0" smtClean="0"/>
-              <a:t>0</a:t>
+              <a:t>1</a:t>
             </a:r>
             <a:r>
               <a:rPr lang="en-US" dirty="0" smtClean="0"/>
-              <a:t> = “8aec483e43027f22”</a:t>
+              <a:t> </a:t>
+            </a:r>
+            <a:r>
+              <a:rPr lang="en-US" dirty="0" smtClean="0"/>
+              <a:t>= “8aec483e43027f22”</a:t>
             </a:r>
             <a:endParaRPr lang="en-US" dirty="0"/>
           </a:p>
@@ -46667,11 +46453,15 @@
             </a:r>
             <a:r>
               <a:rPr lang="en-US" baseline="-25000" dirty="0" smtClean="0"/>
-              <a:t>1</a:t>
+              <a:t>2</a:t>
             </a:r>
             <a:r>
               <a:rPr lang="en-US" dirty="0" smtClean="0"/>
-              <a:t> = “</a:t>
+              <a:t> </a:t>
+            </a:r>
+            <a:r>
+              <a:rPr lang="en-US" dirty="0" smtClean="0"/>
+              <a:t>= “</a:t>
             </a:r>
             <a:r>
               <a:rPr lang="en-US" dirty="0"/>
@@ -47303,11 +47093,15 @@
             </a:r>
             <a:r>
               <a:rPr lang="en-US" baseline="-25000" dirty="0" smtClean="0"/>
-              <a:t>0</a:t>
+              <a:t>1</a:t>
             </a:r>
             <a:r>
               <a:rPr lang="en-US" dirty="0" smtClean="0"/>
-              <a:t> = “8aec483e43027f22”</a:t>
+              <a:t> </a:t>
+            </a:r>
+            <a:r>
+              <a:rPr lang="en-US" dirty="0" smtClean="0"/>
+              <a:t>= “8aec483e43027f22”</a:t>
             </a:r>
             <a:endParaRPr lang="en-US" dirty="0"/>
           </a:p>
@@ -47355,11 +47149,15 @@
             </a:r>
             <a:r>
               <a:rPr lang="en-US" baseline="-25000" dirty="0" smtClean="0"/>
-              <a:t>1</a:t>
+              <a:t>2</a:t>
             </a:r>
             <a:r>
               <a:rPr lang="en-US" dirty="0" smtClean="0"/>
-              <a:t> = “</a:t>
+              <a:t> </a:t>
+            </a:r>
+            <a:r>
+              <a:rPr lang="en-US" dirty="0" smtClean="0"/>
+              <a:t>= “</a:t>
             </a:r>
             <a:r>
               <a:rPr lang="en-US" dirty="0"/>
@@ -47886,16 +47684,21 @@
           <a:p>
             <a:r>
               <a:rPr lang="en-US" dirty="0" smtClean="0"/>
-              <a:t>As an attacker, we take each block individually. Let’s start with C</a:t>
+              <a:t>As an attacker, we take each block individually. Let’s start with </a:t>
+            </a:r>
+            <a:r>
+              <a:rPr lang="en-US" dirty="0" smtClean="0"/>
+              <a:t>C</a:t>
             </a:r>
             <a:r>
               <a:rPr lang="en-US" baseline="-25000" dirty="0" smtClean="0"/>
-              <a:t>1</a:t>
+              <a:t>2</a:t>
             </a:r>
             <a:r>
               <a:rPr lang="en-US" dirty="0" smtClean="0"/>
               <a:t>:</a:t>
             </a:r>
+            <a:endParaRPr lang="en-US" dirty="0" smtClean="0"/>
           </a:p>
           <a:p>
             <a:endParaRPr lang="en-US" dirty="0"/>
@@ -47951,16 +47754,20 @@
           <a:p>
             <a:pPr algn="ctr"/>
             <a:r>
+              <a:rPr lang="en-US" sz="2400" dirty="0" smtClean="0"/>
+              <a:t>C</a:t>
+            </a:r>
+            <a:r>
+              <a:rPr lang="en-US" sz="2400" baseline="-25000" dirty="0" smtClean="0"/>
+              <a:t>2</a:t>
+            </a:r>
+            <a:r>
+              <a:rPr lang="en-US" sz="2400" dirty="0" smtClean="0"/>
+              <a:t> </a:t>
+            </a:r>
+            <a:r>
               <a:rPr lang="en-US" sz="2400" dirty="0"/>
-              <a:t>C</a:t>
-            </a:r>
-            <a:r>
-              <a:rPr lang="en-US" sz="2400" baseline="-25000" dirty="0"/>
-              <a:t>1</a:t>
-            </a:r>
-            <a:r>
-              <a:rPr lang="en-US" sz="2400" dirty="0"/>
-              <a:t> = “287ca837fb65e219”</a:t>
+              <a:t>= “287ca837fb65e219”</a:t>
             </a:r>
           </a:p>
         </p:txBody>
@@ -48046,16 +47853,20 @@
           <a:p>
             <a:pPr algn="ctr"/>
             <a:r>
+              <a:rPr lang="en-US" sz="2400" dirty="0" smtClean="0"/>
+              <a:t>C</a:t>
+            </a:r>
+            <a:r>
+              <a:rPr lang="en-US" sz="2400" baseline="-25000" dirty="0" smtClean="0"/>
+              <a:t>2</a:t>
+            </a:r>
+            <a:r>
+              <a:rPr lang="en-US" sz="2400" dirty="0" smtClean="0"/>
+              <a:t> </a:t>
+            </a:r>
+            <a:r>
               <a:rPr lang="en-US" sz="2400" dirty="0"/>
-              <a:t>C</a:t>
-            </a:r>
-            <a:r>
-              <a:rPr lang="en-US" sz="2400" baseline="-25000" dirty="0"/>
-              <a:t>1</a:t>
-            </a:r>
-            <a:r>
-              <a:rPr lang="en-US" sz="2400" dirty="0"/>
-              <a:t> = “287ca837fb65e219”</a:t>
+              <a:t>= “287ca837fb65e219”</a:t>
             </a:r>
           </a:p>
         </p:txBody>
@@ -48184,15 +47995,23 @@
           <a:p>
             <a:r>
               <a:rPr lang="en-US" dirty="0" smtClean="0"/>
-              <a:t>The host will decrypt C</a:t>
+              <a:t>The host will decrypt </a:t>
+            </a:r>
+            <a:r>
+              <a:rPr lang="en-US" dirty="0" smtClean="0"/>
+              <a:t>C</a:t>
             </a:r>
             <a:r>
               <a:rPr lang="en-US" baseline="-25000" dirty="0" smtClean="0"/>
-              <a:t>1</a:t>
+              <a:t>2</a:t>
             </a:r>
             <a:r>
               <a:rPr lang="en-US" dirty="0" smtClean="0"/>
-              <a:t> first:</a:t>
+              <a:t> </a:t>
+            </a:r>
+            <a:r>
+              <a:rPr lang="en-US" dirty="0" smtClean="0"/>
+              <a:t>first:</a:t>
             </a:r>
           </a:p>
           <a:p>
@@ -48270,16 +48089,20 @@
           <a:p>
             <a:pPr algn="ctr"/>
             <a:r>
+              <a:rPr lang="en-US" sz="2400" dirty="0" smtClean="0"/>
+              <a:t>C</a:t>
+            </a:r>
+            <a:r>
+              <a:rPr lang="en-US" sz="2400" baseline="-25000" dirty="0" smtClean="0"/>
+              <a:t>2</a:t>
+            </a:r>
+            <a:r>
+              <a:rPr lang="en-US" sz="2400" dirty="0" smtClean="0"/>
+              <a:t> </a:t>
+            </a:r>
+            <a:r>
               <a:rPr lang="en-US" sz="2400" dirty="0"/>
-              <a:t>C</a:t>
-            </a:r>
-            <a:r>
-              <a:rPr lang="en-US" sz="2400" baseline="-25000" dirty="0"/>
-              <a:t>1</a:t>
-            </a:r>
-            <a:r>
-              <a:rPr lang="en-US" sz="2400" dirty="0"/>
-              <a:t> = “287ca837fb65e219”</a:t>
+              <a:t>= “287ca837fb65e219”</a:t>
             </a:r>
           </a:p>
         </p:txBody>
@@ -48326,7 +48149,7 @@
             </a:r>
             <a:r>
               <a:rPr lang="en-US" sz="2400" baseline="-25000" dirty="0" smtClean="0"/>
-              <a:t>1</a:t>
+              <a:t>2</a:t>
             </a:r>
             <a:r>
               <a:rPr lang="en-US" sz="2400" dirty="0" smtClean="0"/>
@@ -48349,16 +48172,20 @@
               <a:t>C</a:t>
             </a:r>
             <a:r>
-              <a:rPr lang="en-US" sz="2400" b="1" baseline="-25000" dirty="0">
+              <a:rPr lang="en-US" sz="2400" b="1" baseline="-25000" dirty="0" smtClean="0">
                 <a:solidFill>
                   <a:srgbClr val="FF0000"/>
                 </a:solidFill>
               </a:rPr>
-              <a:t>1</a:t>
+              <a:t>2</a:t>
             </a:r>
             <a:r>
               <a:rPr lang="en-US" sz="2400" dirty="0" smtClean="0"/>
-              <a:t>) ⊕ </a:t>
+              <a:t>) </a:t>
+            </a:r>
+            <a:r>
+              <a:rPr lang="en-US" sz="2400" dirty="0" smtClean="0"/>
+              <a:t>⊕ </a:t>
             </a:r>
             <a:r>
               <a:rPr lang="en-US" sz="2400" b="1" dirty="0" smtClean="0">
@@ -48694,7 +48521,7 @@
             </a:r>
             <a:r>
               <a:rPr lang="en-US" sz="2400" baseline="-25000" dirty="0" smtClean="0"/>
-              <a:t>1</a:t>
+              <a:t>2</a:t>
             </a:r>
             <a:r>
               <a:rPr lang="en-US" sz="2400" dirty="0" smtClean="0"/>
@@ -48717,16 +48544,20 @@
               <a:t>C</a:t>
             </a:r>
             <a:r>
-              <a:rPr lang="en-US" sz="2400" b="1" baseline="-25000" dirty="0">
+              <a:rPr lang="en-US" sz="2400" b="1" baseline="-25000" dirty="0" smtClean="0">
                 <a:solidFill>
                   <a:srgbClr val="FF0000"/>
                 </a:solidFill>
               </a:rPr>
-              <a:t>1</a:t>
+              <a:t>2</a:t>
             </a:r>
             <a:r>
               <a:rPr lang="en-US" sz="2400" dirty="0" smtClean="0"/>
-              <a:t>) ⊕ </a:t>
+              <a:t>) </a:t>
+            </a:r>
+            <a:r>
+              <a:rPr lang="en-US" sz="2400" dirty="0" smtClean="0"/>
+              <a:t>⊕ </a:t>
             </a:r>
             <a:r>
               <a:rPr lang="en-US" sz="2400" b="1" dirty="0" smtClean="0">
@@ -49077,7 +48908,7 @@
                   <a:srgbClr val="FF0000"/>
                 </a:solidFill>
               </a:rPr>
-              <a:t>1</a:t>
+              <a:t>2</a:t>
             </a:r>
             <a:r>
               <a:rPr lang="en-US" sz="2400" dirty="0" smtClean="0">
@@ -49109,7 +48940,7 @@
                   <a:schemeClr val="tx1"/>
                 </a:solidFill>
               </a:rPr>
-              <a:t>1</a:t>
+              <a:t>2</a:t>
             </a:r>
             <a:r>
               <a:rPr lang="en-US" sz="2400" dirty="0" smtClean="0">
@@ -49141,7 +48972,7 @@
                   <a:schemeClr val="tx1"/>
                 </a:solidFill>
               </a:rPr>
-              <a:t>0</a:t>
+              <a:t>1</a:t>
             </a:r>
             <a:r>
               <a:rPr lang="en-US" sz="2400" dirty="0" smtClean="0">
@@ -49234,11 +49065,43 @@
             </a:r>
             <a:r>
               <a:rPr lang="en-US" sz="2400" baseline="-25000" dirty="0" smtClean="0"/>
-              <a:t>1</a:t>
+              <a:t>2</a:t>
             </a:r>
             <a:r>
               <a:rPr lang="en-US" sz="2400" dirty="0" smtClean="0"/>
-              <a:t> = D(</a:t>
+              <a:t> </a:t>
+            </a:r>
+            <a:r>
+              <a:rPr lang="en-US" sz="2400" dirty="0" smtClean="0"/>
+              <a:t>= </a:t>
+            </a:r>
+            <a:r>
+              <a:rPr lang="en-US" sz="2400" dirty="0" smtClean="0"/>
+              <a:t>D(</a:t>
+            </a:r>
+            <a:r>
+              <a:rPr lang="en-US" sz="2400" dirty="0" smtClean="0">
+                <a:solidFill>
+                  <a:schemeClr val="tx1"/>
+                </a:solidFill>
+              </a:rPr>
+              <a:t>E(P</a:t>
+            </a:r>
+            <a:r>
+              <a:rPr lang="en-US" sz="2400" baseline="-25000" dirty="0" smtClean="0">
+                <a:solidFill>
+                  <a:schemeClr val="tx1"/>
+                </a:solidFill>
+              </a:rPr>
+              <a:t>2</a:t>
+            </a:r>
+            <a:r>
+              <a:rPr lang="en-US" sz="2400" dirty="0" smtClean="0">
+                <a:solidFill>
+                  <a:schemeClr val="tx1"/>
+                </a:solidFill>
+              </a:rPr>
+              <a:t> </a:t>
             </a:r>
             <a:r>
               <a:rPr lang="en-US" sz="2400" dirty="0">
@@ -49246,34 +49109,26 @@
                   <a:schemeClr val="tx1"/>
                 </a:solidFill>
               </a:rPr>
-              <a:t>E(P</a:t>
-            </a:r>
-            <a:r>
-              <a:rPr lang="en-US" sz="2400" baseline="-25000" dirty="0">
+              <a:t>⊕ </a:t>
+            </a:r>
+            <a:r>
+              <a:rPr lang="en-US" sz="2400" dirty="0" smtClean="0">
                 <a:solidFill>
                   <a:schemeClr val="tx1"/>
                 </a:solidFill>
               </a:rPr>
-              <a:t>1</a:t>
-            </a:r>
-            <a:r>
-              <a:rPr lang="en-US" sz="2400" dirty="0">
+              <a:t>C</a:t>
+            </a:r>
+            <a:r>
+              <a:rPr lang="en-US" sz="2400" b="1" baseline="-25000" dirty="0" smtClean="0">
                 <a:solidFill>
                   <a:schemeClr val="tx1"/>
                 </a:solidFill>
               </a:rPr>
-              <a:t> ⊕ C</a:t>
-            </a:r>
-            <a:r>
-              <a:rPr lang="en-US" sz="2400" b="1" baseline="-25000" dirty="0">
-                <a:solidFill>
-                  <a:schemeClr val="tx1"/>
-                </a:solidFill>
-              </a:rPr>
-              <a:t>0</a:t>
-            </a:r>
-            <a:r>
-              <a:rPr lang="en-US" sz="2400" dirty="0">
+              <a:t>1</a:t>
+            </a:r>
+            <a:r>
+              <a:rPr lang="en-US" sz="2400" dirty="0" smtClean="0">
                 <a:solidFill>
                   <a:schemeClr val="tx1"/>
                 </a:solidFill>
@@ -49357,7 +49212,7 @@
                   <a:srgbClr val="FF0000"/>
                 </a:solidFill>
               </a:rPr>
-              <a:t>1 </a:t>
+              <a:t>2 </a:t>
             </a:r>
             <a:r>
               <a:rPr lang="en-US" dirty="0" smtClean="0"/>
@@ -49425,11 +49280,15 @@
             </a:r>
             <a:r>
               <a:rPr lang="en-US" b="1" baseline="-25000" dirty="0" smtClean="0"/>
-              <a:t>1</a:t>
+              <a:t>2</a:t>
             </a:r>
             <a:r>
               <a:rPr lang="en-US" dirty="0" smtClean="0"/>
-              <a:t>, in particular, was encrypted after being </a:t>
+              <a:t>, </a:t>
+            </a:r>
+            <a:r>
+              <a:rPr lang="en-US" dirty="0" smtClean="0"/>
+              <a:t>in particular, was encrypted after being </a:t>
             </a:r>
             <a:r>
               <a:rPr lang="en-US" dirty="0" err="1" smtClean="0"/>
@@ -49440,12 +49299,12 @@
               <a:t> with </a:t>
             </a:r>
             <a:r>
-              <a:rPr lang="en-US" dirty="0"/>
+              <a:rPr lang="en-US" dirty="0" smtClean="0"/>
               <a:t>C</a:t>
             </a:r>
             <a:r>
-              <a:rPr lang="en-US" b="1" baseline="-25000" dirty="0"/>
-              <a:t>0</a:t>
+              <a:rPr lang="en-US" b="1" baseline="-25000" dirty="0" smtClean="0"/>
+              <a:t>1</a:t>
             </a:r>
             <a:endParaRPr lang="en-US" dirty="0"/>
           </a:p>
@@ -49478,19 +49337,23 @@
               <a:t>In the formula for </a:t>
             </a:r>
             <a:r>
-              <a:rPr lang="en-US" dirty="0"/>
+              <a:rPr lang="en-US" dirty="0" smtClean="0"/>
               <a:t>P’</a:t>
             </a:r>
             <a:r>
-              <a:rPr lang="en-US" baseline="-25000" dirty="0"/>
-              <a:t>1</a:t>
+              <a:rPr lang="en-US" baseline="-25000" dirty="0" smtClean="0"/>
+              <a:t>2</a:t>
             </a:r>
             <a:r>
               <a:rPr lang="en-US" dirty="0" smtClean="0"/>
-              <a:t> (above), expand </a:t>
-            </a:r>
-            <a:r>
-              <a:rPr lang="en-US" b="1" dirty="0">
+              <a:t> </a:t>
+            </a:r>
+            <a:r>
+              <a:rPr lang="en-US" dirty="0" smtClean="0"/>
+              <a:t>(above), expand </a:t>
+            </a:r>
+            <a:r>
+              <a:rPr lang="en-US" b="1" dirty="0" smtClean="0">
                 <a:solidFill>
                   <a:srgbClr val="FF0000"/>
                 </a:solidFill>
@@ -49498,16 +49361,20 @@
               <a:t>C</a:t>
             </a:r>
             <a:r>
-              <a:rPr lang="en-US" b="1" baseline="-25000" dirty="0">
+              <a:rPr lang="en-US" b="1" baseline="-25000" dirty="0" smtClean="0">
                 <a:solidFill>
                   <a:srgbClr val="FF0000"/>
                 </a:solidFill>
               </a:rPr>
-              <a:t>1</a:t>
+              <a:t>2</a:t>
             </a:r>
             <a:r>
               <a:rPr lang="en-US" dirty="0" smtClean="0"/>
-              <a:t> to its original value</a:t>
+              <a:t> </a:t>
+            </a:r>
+            <a:r>
+              <a:rPr lang="en-US" dirty="0" smtClean="0"/>
+              <a:t>to its original value</a:t>
             </a:r>
             <a:endParaRPr lang="en-US" dirty="0"/>
           </a:p>
@@ -49555,11 +49422,15 @@
             </a:r>
             <a:r>
               <a:rPr lang="en-US" sz="2400" baseline="-25000" dirty="0" smtClean="0"/>
-              <a:t>1</a:t>
+              <a:t>2</a:t>
             </a:r>
             <a:r>
               <a:rPr lang="en-US" sz="2400" dirty="0" smtClean="0"/>
-              <a:t> = </a:t>
+              <a:t> </a:t>
+            </a:r>
+            <a:r>
+              <a:rPr lang="en-US" sz="2400" dirty="0" smtClean="0"/>
+              <a:t>= </a:t>
             </a:r>
             <a:r>
               <a:rPr lang="en-US" sz="2400" dirty="0" smtClean="0">
@@ -49575,7 +49446,7 @@
                   <a:schemeClr val="tx1"/>
                 </a:solidFill>
               </a:rPr>
-              <a:t>1</a:t>
+              <a:t>2</a:t>
             </a:r>
             <a:r>
               <a:rPr lang="en-US" sz="2400" dirty="0" smtClean="0">
@@ -49607,7 +49478,7 @@
                   <a:schemeClr val="tx1"/>
                 </a:solidFill>
               </a:rPr>
-              <a:t>0</a:t>
+              <a:t>2</a:t>
             </a:r>
             <a:r>
               <a:rPr lang="en-US" sz="2400" dirty="0" smtClean="0"/>
@@ -49802,11 +49673,15 @@
             </a:r>
             <a:r>
               <a:rPr lang="en-US" sz="2400" baseline="-25000" dirty="0" smtClean="0"/>
-              <a:t>1</a:t>
+              <a:t>2</a:t>
             </a:r>
             <a:r>
               <a:rPr lang="en-US" sz="2400" dirty="0" smtClean="0"/>
-              <a:t> = </a:t>
+              <a:t> </a:t>
+            </a:r>
+            <a:r>
+              <a:rPr lang="en-US" sz="2400" dirty="0" smtClean="0"/>
+              <a:t>= </a:t>
             </a:r>
             <a:r>
               <a:rPr lang="en-US" sz="2400" dirty="0" smtClean="0">
@@ -49822,7 +49697,7 @@
                   <a:schemeClr val="tx1"/>
                 </a:solidFill>
               </a:rPr>
-              <a:t>1</a:t>
+              <a:t>2</a:t>
             </a:r>
             <a:r>
               <a:rPr lang="en-US" sz="2400" dirty="0" smtClean="0">
@@ -49854,7 +49729,7 @@
                   <a:schemeClr val="tx1"/>
                 </a:solidFill>
               </a:rPr>
-              <a:t>0</a:t>
+              <a:t>1</a:t>
             </a:r>
             <a:r>
               <a:rPr lang="en-US" sz="2400" dirty="0" smtClean="0"/>
@@ -49913,16 +49788,20 @@
           </a:p>
           <a:p>
             <a:r>
+              <a:rPr lang="en-US" dirty="0" smtClean="0"/>
+              <a:t>P’</a:t>
+            </a:r>
+            <a:r>
+              <a:rPr lang="en-US" baseline="-25000" dirty="0" smtClean="0"/>
+              <a:t>2</a:t>
+            </a:r>
+            <a:r>
+              <a:rPr lang="en-US" dirty="0" smtClean="0"/>
+              <a:t> </a:t>
+            </a:r>
+            <a:r>
               <a:rPr lang="en-US" dirty="0"/>
-              <a:t>P’</a:t>
-            </a:r>
-            <a:r>
-              <a:rPr lang="en-US" baseline="-25000" dirty="0"/>
-              <a:t>1</a:t>
-            </a:r>
-            <a:r>
-              <a:rPr lang="en-US" dirty="0"/>
-              <a:t> = </a:t>
+              <a:t>= </a:t>
             </a:r>
             <a:r>
               <a:rPr lang="en-US" dirty="0" smtClean="0"/>
@@ -49936,11 +49815,15 @@
             </a:r>
             <a:r>
               <a:rPr lang="en-US" baseline="-25000" dirty="0" smtClean="0"/>
-              <a:t>1</a:t>
+              <a:t>2</a:t>
             </a:r>
             <a:r>
               <a:rPr lang="en-US" dirty="0" smtClean="0"/>
-              <a:t> = The original plaintext value (our goal)</a:t>
+              <a:t> </a:t>
+            </a:r>
+            <a:r>
+              <a:rPr lang="en-US" dirty="0" smtClean="0"/>
+              <a:t>= The original plaintext value (our goal)</a:t>
             </a:r>
           </a:p>
           <a:p>
@@ -49950,11 +49833,15 @@
             </a:r>
             <a:r>
               <a:rPr lang="en-US" b="1" baseline="-25000" dirty="0" smtClean="0"/>
-              <a:t>0</a:t>
+              <a:t>1</a:t>
             </a:r>
             <a:r>
               <a:rPr lang="en-US" dirty="0" smtClean="0"/>
-              <a:t> = The previous </a:t>
+              <a:t> </a:t>
+            </a:r>
+            <a:r>
+              <a:rPr lang="en-US" dirty="0" smtClean="0"/>
+              <a:t>= The previous </a:t>
             </a:r>
             <a:r>
               <a:rPr lang="en-US" dirty="0" err="1" smtClean="0"/>
@@ -50020,28 +49907,33 @@
           <a:p>
             <a:r>
               <a:rPr lang="en-US" dirty="0" smtClean="0"/>
-              <a:t>So now we have an equation with two unknowns - </a:t>
-            </a:r>
-            <a:r>
-              <a:rPr lang="en-US" dirty="0"/>
-              <a:t>P</a:t>
-            </a:r>
-            <a:r>
-              <a:rPr lang="en-US" baseline="-25000" dirty="0"/>
-              <a:t>1 </a:t>
+              <a:t>So now we have an equation with two unknowns </a:t>
             </a:r>
             <a:r>
               <a:rPr lang="en-US" dirty="0" smtClean="0"/>
-              <a:t>and P’</a:t>
+              <a:t>– P</a:t>
             </a:r>
             <a:r>
               <a:rPr lang="en-US" baseline="-25000" dirty="0" smtClean="0"/>
-              <a:t>1</a:t>
+              <a:t>2 </a:t>
+            </a:r>
+            <a:r>
+              <a:rPr lang="en-US" dirty="0" smtClean="0"/>
+              <a:t>and </a:t>
+            </a:r>
+            <a:r>
+              <a:rPr lang="en-US" dirty="0" smtClean="0"/>
+              <a:t>P’</a:t>
+            </a:r>
+            <a:r>
+              <a:rPr lang="en-US" baseline="-25000" dirty="0" smtClean="0"/>
+              <a:t>2</a:t>
             </a:r>
             <a:r>
               <a:rPr lang="en-US" dirty="0" smtClean="0"/>
               <a:t>…</a:t>
             </a:r>
+            <a:endParaRPr lang="en-US" dirty="0" smtClean="0"/>
           </a:p>
           <a:p>
             <a:pPr lvl="1"/>
@@ -50141,17 +50033,18 @@
               <a:t>We actually do know something about </a:t>
             </a:r>
             <a:r>
-              <a:rPr lang="en-US" dirty="0"/>
+              <a:rPr lang="en-US" dirty="0" smtClean="0"/>
               <a:t>P’</a:t>
             </a:r>
             <a:r>
-              <a:rPr lang="en-US" baseline="-25000" dirty="0"/>
-              <a:t>1</a:t>
+              <a:rPr lang="en-US" baseline="-25000" dirty="0" smtClean="0"/>
+              <a:t>2</a:t>
             </a:r>
             <a:r>
               <a:rPr lang="en-US" dirty="0" smtClean="0"/>
               <a:t>!</a:t>
             </a:r>
+            <a:endParaRPr lang="en-US" dirty="0" smtClean="0"/>
           </a:p>
           <a:p>
             <a:r>
@@ -50218,11 +50111,15 @@
             </a:r>
             <a:r>
               <a:rPr lang="en-US" sz="2400" baseline="-25000" dirty="0" smtClean="0"/>
-              <a:t>1</a:t>
+              <a:t>2</a:t>
             </a:r>
             <a:r>
               <a:rPr lang="en-US" sz="2400" dirty="0" smtClean="0"/>
-              <a:t> = </a:t>
+              <a:t> </a:t>
+            </a:r>
+            <a:r>
+              <a:rPr lang="en-US" sz="2400" dirty="0" smtClean="0"/>
+              <a:t>= </a:t>
             </a:r>
             <a:r>
               <a:rPr lang="en-US" sz="2400" dirty="0" smtClean="0">
@@ -50238,7 +50135,7 @@
                   <a:schemeClr val="tx1"/>
                 </a:solidFill>
               </a:rPr>
-              <a:t>1</a:t>
+              <a:t>2</a:t>
             </a:r>
             <a:r>
               <a:rPr lang="en-US" sz="2400" dirty="0" smtClean="0">
@@ -50258,7 +50155,15 @@
                   <a:schemeClr val="tx1"/>
                 </a:solidFill>
               </a:rPr>
-              <a:t> C</a:t>
+              <a:t> </a:t>
+            </a:r>
+            <a:r>
+              <a:rPr lang="en-US" sz="2400" dirty="0" smtClean="0">
+                <a:solidFill>
+                  <a:schemeClr val="tx1"/>
+                </a:solidFill>
+              </a:rPr>
+              <a:t>C</a:t>
             </a:r>
             <a:r>
               <a:rPr lang="en-US" sz="2400" b="1" baseline="-25000" dirty="0" smtClean="0">
@@ -50266,7 +50171,7 @@
                   <a:schemeClr val="tx1"/>
                 </a:solidFill>
               </a:rPr>
-              <a:t>0</a:t>
+              <a:t>1</a:t>
             </a:r>
             <a:r>
               <a:rPr lang="en-US" sz="2400" dirty="0" smtClean="0"/>
@@ -50463,16 +50368,20 @@
               <a:t>When the padding is right, we know something about </a:t>
             </a:r>
             <a:r>
-              <a:rPr lang="en-US" dirty="0"/>
+              <a:rPr lang="en-US" dirty="0" smtClean="0"/>
               <a:t>P’</a:t>
             </a:r>
             <a:r>
-              <a:rPr lang="en-US" baseline="-25000" dirty="0"/>
-              <a:t>1</a:t>
+              <a:rPr lang="en-US" baseline="-25000" dirty="0" smtClean="0"/>
+              <a:t>2</a:t>
             </a:r>
             <a:r>
               <a:rPr lang="en-US" dirty="0" smtClean="0"/>
-              <a:t>, namely, it ends with:</a:t>
+              <a:t>, </a:t>
+            </a:r>
+            <a:r>
+              <a:rPr lang="en-US" dirty="0" smtClean="0"/>
+              <a:t>namely, it ends with:</a:t>
             </a:r>
           </a:p>
           <a:p>
@@ -50516,16 +50425,20 @@
               <a:t>Remember, </a:t>
             </a:r>
             <a:r>
-              <a:rPr lang="en-US" dirty="0"/>
+              <a:rPr lang="en-US" dirty="0" smtClean="0"/>
               <a:t>P’</a:t>
             </a:r>
             <a:r>
-              <a:rPr lang="en-US" baseline="-25000" dirty="0"/>
-              <a:t>1</a:t>
+              <a:rPr lang="en-US" baseline="-25000" dirty="0" smtClean="0"/>
+              <a:t>2</a:t>
             </a:r>
             <a:r>
               <a:rPr lang="en-US" dirty="0" smtClean="0"/>
-              <a:t> is mostly a garbage string, still, the result of decrypting a good block and </a:t>
+              <a:t> </a:t>
+            </a:r>
+            <a:r>
+              <a:rPr lang="en-US" dirty="0" smtClean="0"/>
+              <a:t>is mostly a garbage string, still, the result of decrypting a good block and </a:t>
             </a:r>
             <a:r>
               <a:rPr lang="en-US" dirty="0" err="1" smtClean="0"/>
@@ -50584,11 +50497,15 @@
             </a:r>
             <a:r>
               <a:rPr lang="en-US" sz="2400" baseline="-25000" dirty="0" smtClean="0"/>
-              <a:t>1</a:t>
+              <a:t>2</a:t>
             </a:r>
             <a:r>
               <a:rPr lang="en-US" sz="2400" dirty="0" smtClean="0"/>
-              <a:t> = </a:t>
+              <a:t> </a:t>
+            </a:r>
+            <a:r>
+              <a:rPr lang="en-US" sz="2400" dirty="0" smtClean="0"/>
+              <a:t>= </a:t>
             </a:r>
             <a:r>
               <a:rPr lang="en-US" sz="2400" dirty="0" smtClean="0">
@@ -50604,7 +50521,7 @@
                   <a:schemeClr val="tx1"/>
                 </a:solidFill>
               </a:rPr>
-              <a:t>1</a:t>
+              <a:t>2</a:t>
             </a:r>
             <a:r>
               <a:rPr lang="en-US" sz="2400" dirty="0" smtClean="0">
@@ -50632,11 +50549,15 @@
                   <a:schemeClr val="tx1"/>
                 </a:solidFill>
               </a:rPr>
-              <a:t>0</a:t>
+              <a:t>1</a:t>
+            </a:r>
+            <a:r>
+              <a:rPr lang="en-US" sz="2400" dirty="0" smtClean="0"/>
+              <a:t> </a:t>
             </a:r>
             <a:r>
               <a:rPr lang="en-US" sz="2400" dirty="0"/>
-              <a:t> ⊕ </a:t>
+              <a:t>⊕ </a:t>
             </a:r>
             <a:r>
               <a:rPr lang="en-US" sz="2400" b="1" dirty="0" smtClean="0">
@@ -50757,11 +50678,15 @@
             </a:r>
             <a:r>
               <a:rPr lang="en-US" sz="2400" baseline="-25000" dirty="0" smtClean="0"/>
-              <a:t>1</a:t>
+              <a:t>2</a:t>
+            </a:r>
+            <a:r>
+              <a:rPr lang="en-US" sz="2400" dirty="0" smtClean="0"/>
+              <a:t>[N</a:t>
             </a:r>
             <a:r>
               <a:rPr lang="en-US" sz="2400" dirty="0"/>
-              <a:t>[N]</a:t>
+              <a:t>]</a:t>
             </a:r>
             <a:r>
               <a:rPr lang="en-US" sz="2400" dirty="0" smtClean="0"/>
@@ -50776,7 +50701,7 @@
             </a:r>
             <a:r>
               <a:rPr lang="en-US" sz="2400" b="1" baseline="-25000" dirty="0" smtClean="0"/>
-              <a:t>0 </a:t>
+              <a:t>1 </a:t>
             </a:r>
             <a:r>
               <a:rPr lang="en-US" sz="2400" dirty="0" smtClean="0"/>
@@ -50842,8 +50767,8 @@
               <a:t>P</a:t>
             </a:r>
             <a:r>
-              <a:rPr lang="en-US" sz="2800" baseline="-25000" dirty="0"/>
-              <a:t>1</a:t>
+              <a:rPr lang="en-US" sz="2800" baseline="-25000" dirty="0" smtClean="0"/>
+              <a:t>2</a:t>
             </a:r>
             <a:r>
               <a:rPr lang="en-US" sz="2800" dirty="0" smtClean="0"/>
@@ -50899,11 +50824,15 @@
             </a:r>
             <a:r>
               <a:rPr lang="en-US" sz="2400" baseline="-25000" dirty="0" smtClean="0"/>
-              <a:t>1</a:t>
+              <a:t>2</a:t>
+            </a:r>
+            <a:r>
+              <a:rPr lang="en-US" sz="2400" dirty="0" smtClean="0"/>
+              <a:t>[N</a:t>
             </a:r>
             <a:r>
               <a:rPr lang="en-US" sz="2400" dirty="0"/>
-              <a:t>[N] </a:t>
+              <a:t>] </a:t>
             </a:r>
             <a:r>
               <a:rPr lang="en-US" sz="2400" dirty="0" smtClean="0"/>
@@ -50923,11 +50852,15 @@
                   <a:schemeClr val="tx1"/>
                 </a:solidFill>
               </a:rPr>
-              <a:t>1</a:t>
+              <a:t>2</a:t>
+            </a:r>
+            <a:r>
+              <a:rPr lang="en-US" sz="2400" dirty="0" smtClean="0"/>
+              <a:t>[N</a:t>
             </a:r>
             <a:r>
               <a:rPr lang="en-US" sz="2400" dirty="0"/>
-              <a:t>[N]</a:t>
+              <a:t>]</a:t>
             </a:r>
             <a:r>
               <a:rPr lang="en-US" sz="2400" dirty="0" smtClean="0">
@@ -50955,7 +50888,7 @@
                   <a:schemeClr val="tx1"/>
                 </a:solidFill>
               </a:rPr>
-              <a:t>0</a:t>
+              <a:t>1</a:t>
             </a:r>
             <a:r>
               <a:rPr lang="en-US" sz="2400" dirty="0" smtClean="0"/>
@@ -51043,11 +50976,15 @@
             </a:r>
             <a:r>
               <a:rPr lang="en-US" sz="2400" baseline="-25000" dirty="0" smtClean="0"/>
-              <a:t>1</a:t>
+              <a:t>2</a:t>
+            </a:r>
+            <a:r>
+              <a:rPr lang="en-US" sz="2400" dirty="0" smtClean="0"/>
+              <a:t>[N</a:t>
             </a:r>
             <a:r>
               <a:rPr lang="en-US" sz="2400" dirty="0"/>
-              <a:t>[N] </a:t>
+              <a:t>] </a:t>
             </a:r>
             <a:r>
               <a:rPr lang="en-US" sz="2400" dirty="0" smtClean="0"/>
@@ -51067,11 +51004,15 @@
                   <a:schemeClr val="tx1"/>
                 </a:solidFill>
               </a:rPr>
-              <a:t>1</a:t>
+              <a:t>2</a:t>
+            </a:r>
+            <a:r>
+              <a:rPr lang="en-US" sz="2400" dirty="0" smtClean="0"/>
+              <a:t>[N</a:t>
             </a:r>
             <a:r>
               <a:rPr lang="en-US" sz="2400" dirty="0"/>
-              <a:t>[N]</a:t>
+              <a:t>]</a:t>
             </a:r>
             <a:r>
               <a:rPr lang="en-US" sz="2400" dirty="0" smtClean="0">
@@ -51099,7 +51040,7 @@
                   <a:schemeClr val="tx1"/>
                 </a:solidFill>
               </a:rPr>
-              <a:t>0</a:t>
+              <a:t>1</a:t>
             </a:r>
             <a:r>
               <a:rPr lang="en-US" sz="2400" dirty="0" smtClean="0"/>
@@ -51379,16 +51320,20 @@
           <a:p>
             <a:pPr algn="ctr"/>
             <a:r>
+              <a:rPr lang="en-US" sz="2400" dirty="0" smtClean="0"/>
+              <a:t>C</a:t>
+            </a:r>
+            <a:r>
+              <a:rPr lang="en-US" sz="2400" baseline="-25000" dirty="0" smtClean="0"/>
+              <a:t>2</a:t>
+            </a:r>
+            <a:r>
+              <a:rPr lang="en-US" sz="2400" dirty="0" smtClean="0"/>
+              <a:t> </a:t>
+            </a:r>
+            <a:r>
               <a:rPr lang="en-US" sz="2400" dirty="0"/>
-              <a:t>C</a:t>
-            </a:r>
-            <a:r>
-              <a:rPr lang="en-US" sz="2400" baseline="-25000" dirty="0"/>
-              <a:t>1</a:t>
-            </a:r>
-            <a:r>
-              <a:rPr lang="en-US" sz="2400" dirty="0"/>
-              <a:t> = “287ca837fb65e219”</a:t>
+              <a:t>= “287ca837fb65e219”</a:t>
             </a:r>
           </a:p>
         </p:txBody>
@@ -51474,16 +51419,20 @@
           <a:p>
             <a:pPr algn="ctr"/>
             <a:r>
+              <a:rPr lang="en-US" sz="2400" dirty="0" smtClean="0"/>
+              <a:t>C</a:t>
+            </a:r>
+            <a:r>
+              <a:rPr lang="en-US" sz="2400" baseline="-25000" dirty="0" smtClean="0"/>
+              <a:t>2</a:t>
+            </a:r>
+            <a:r>
+              <a:rPr lang="en-US" sz="2400" dirty="0" smtClean="0"/>
+              <a:t> </a:t>
+            </a:r>
+            <a:r>
               <a:rPr lang="en-US" sz="2400" dirty="0"/>
-              <a:t>C</a:t>
-            </a:r>
-            <a:r>
-              <a:rPr lang="en-US" sz="2400" baseline="-25000" dirty="0"/>
-              <a:t>1</a:t>
-            </a:r>
-            <a:r>
-              <a:rPr lang="en-US" sz="2400" dirty="0"/>
-              <a:t> = “287ca837fb65e219”</a:t>
+              <a:t>= “287ca837fb65e219”</a:t>
             </a:r>
           </a:p>
         </p:txBody>
@@ -51530,11 +51479,15 @@
             </a:r>
             <a:r>
               <a:rPr lang="en-US" sz="2400" baseline="-25000" dirty="0" smtClean="0"/>
-              <a:t>1</a:t>
+              <a:t>2</a:t>
             </a:r>
             <a:r>
               <a:rPr lang="en-US" sz="2400" dirty="0" smtClean="0"/>
-              <a:t>[N] = </a:t>
+              <a:t>[N</a:t>
+            </a:r>
+            <a:r>
+              <a:rPr lang="en-US" sz="2400" dirty="0" smtClean="0"/>
+              <a:t>] = </a:t>
             </a:r>
             <a:r>
               <a:rPr lang="en-US" sz="2400" dirty="0" smtClean="0">
@@ -51550,11 +51503,15 @@
                   <a:schemeClr val="tx1"/>
                 </a:solidFill>
               </a:rPr>
-              <a:t>1</a:t>
+              <a:t>2</a:t>
+            </a:r>
+            <a:r>
+              <a:rPr lang="en-US" sz="2400" dirty="0" smtClean="0"/>
+              <a:t>[N</a:t>
             </a:r>
             <a:r>
               <a:rPr lang="en-US" sz="2400" dirty="0"/>
-              <a:t>[N]</a:t>
+              <a:t>]</a:t>
             </a:r>
             <a:r>
               <a:rPr lang="en-US" sz="2400" dirty="0" smtClean="0">
@@ -51582,7 +51539,7 @@
                   <a:schemeClr val="tx1"/>
                 </a:solidFill>
               </a:rPr>
-              <a:t>0</a:t>
+              <a:t>1</a:t>
             </a:r>
             <a:r>
               <a:rPr lang="en-US" sz="2400" dirty="0" smtClean="0"/>
@@ -51666,11 +51623,15 @@
             </a:r>
             <a:r>
               <a:rPr lang="en-US" sz="2400" baseline="-25000" dirty="0" smtClean="0"/>
-              <a:t>1</a:t>
+              <a:t>2</a:t>
+            </a:r>
+            <a:r>
+              <a:rPr lang="en-US" sz="2400" dirty="0" smtClean="0"/>
+              <a:t>[N</a:t>
             </a:r>
             <a:r>
               <a:rPr lang="en-US" sz="2400" dirty="0"/>
-              <a:t>[N] </a:t>
+              <a:t>] </a:t>
             </a:r>
             <a:r>
               <a:rPr lang="en-US" sz="2400" dirty="0" smtClean="0"/>
@@ -51762,11 +51723,19 @@
             </a:r>
             <a:r>
               <a:rPr lang="en-US" sz="2400" baseline="-25000" dirty="0" smtClean="0"/>
-              <a:t>1</a:t>
+              <a:t>2</a:t>
+            </a:r>
+            <a:r>
+              <a:rPr lang="en-US" sz="2400" dirty="0"/>
+              <a:t>[N</a:t>
             </a:r>
             <a:r>
               <a:rPr lang="en-US" sz="2400" dirty="0" smtClean="0"/>
-              <a:t> = </a:t>
+              <a:t>] </a:t>
+            </a:r>
+            <a:r>
+              <a:rPr lang="en-US" sz="2400" dirty="0" smtClean="0"/>
+              <a:t>= </a:t>
             </a:r>
             <a:r>
               <a:rPr lang="en-US" sz="2400" dirty="0" smtClean="0">
@@ -51835,11 +51804,15 @@
             </a:r>
             <a:r>
               <a:rPr lang="en-US" i="1" baseline="-25000" dirty="0" smtClean="0"/>
-              <a:t>1</a:t>
+              <a:t>2</a:t>
             </a:r>
             <a:r>
               <a:rPr lang="en-US" i="1" dirty="0" smtClean="0"/>
-              <a:t> = “</a:t>
+              <a:t> </a:t>
+            </a:r>
+            <a:r>
+              <a:rPr lang="en-US" i="1" dirty="0" smtClean="0"/>
+              <a:t>= “</a:t>
             </a:r>
             <a:r>
               <a:rPr lang="en-US" i="1" dirty="0" err="1" smtClean="0"/>
@@ -52053,10 +52026,50 @@
               <a:rPr lang="en-US" dirty="0" smtClean="0"/>
               <a:t>”</a:t>
             </a:r>
-            <a:endParaRPr lang="en-US" dirty="0" smtClean="0"/>
           </a:p>
         </p:txBody>
       </p:sp>
+      <p:pic>
+        <p:nvPicPr>
+          <p:cNvPr id="4" name="Picture 2" descr="https://gs1.wac.edgecastcdn.net/8019B6/data.tumblr.com/tumblr_mcxhnl6tAx1rksg3yo1_500.jpg"/>
+          <p:cNvPicPr>
+            <a:picLocks noChangeAspect="1" noChangeArrowheads="1"/>
+          </p:cNvPicPr>
+          <p:nvPr/>
+        </p:nvPicPr>
+        <p:blipFill>
+          <a:blip r:embed="rId2">
+            <a:extLst>
+              <a:ext uri="{28A0092B-C50C-407E-A947-70E740481C1C}">
+                <a14:useLocalDpi xmlns:a14="http://schemas.microsoft.com/office/drawing/2010/main" val="0"/>
+              </a:ext>
+            </a:extLst>
+          </a:blip>
+          <a:srcRect/>
+          <a:stretch>
+            <a:fillRect/>
+          </a:stretch>
+        </p:blipFill>
+        <p:spPr bwMode="auto">
+          <a:xfrm>
+            <a:off x="1300843" y="2895600"/>
+            <a:ext cx="6847114" cy="3834384"/>
+          </a:xfrm>
+          <a:prstGeom prst="rect">
+            <a:avLst/>
+          </a:prstGeom>
+          <a:noFill/>
+          <a:extLst>
+            <a:ext uri="{909E8E84-426E-40DD-AFC4-6F175D3DCCD1}">
+              <a14:hiddenFill xmlns:a14="http://schemas.microsoft.com/office/drawing/2010/main">
+                <a:solidFill>
+                  <a:srgbClr val="FFFFFF"/>
+                </a:solidFill>
+              </a14:hiddenFill>
+            </a:ext>
+          </a:extLst>
+        </p:spPr>
+      </p:pic>
     </p:spTree>
     <p:extLst>
       <p:ext uri="{BB962C8B-B14F-4D97-AF65-F5344CB8AC3E}">
@@ -52228,132 +52241,6 @@
         </p:nvSpPr>
         <p:spPr/>
         <p:txBody>
-          <a:bodyPr>
-            <a:normAutofit fontScale="90000"/>
-          </a:bodyPr>
-          <a:lstStyle/>
-          <a:p>
-            <a:r>
-              <a:rPr lang="en-US" dirty="0" smtClean="0"/>
-              <a:t>We made it through padding oracles!</a:t>
-            </a:r>
-            <a:endParaRPr lang="en-US" dirty="0"/>
-          </a:p>
-        </p:txBody>
-      </p:sp>
-      <p:sp>
-        <p:nvSpPr>
-          <p:cNvPr id="3" name="Content Placeholder 2"/>
-          <p:cNvSpPr>
-            <a:spLocks noGrp="1"/>
-          </p:cNvSpPr>
-          <p:nvPr>
-            <p:ph idx="1"/>
-          </p:nvPr>
-        </p:nvSpPr>
-        <p:spPr/>
-        <p:txBody>
-          <a:bodyPr/>
-          <a:lstStyle/>
-          <a:p>
-            <a:r>
-              <a:rPr lang="en-US" dirty="0" smtClean="0"/>
-              <a:t>Give each other a high five, and sit back and watch the demo</a:t>
-            </a:r>
-            <a:endParaRPr lang="en-US" dirty="0"/>
-          </a:p>
-        </p:txBody>
-      </p:sp>
-      <p:pic>
-        <p:nvPicPr>
-          <p:cNvPr id="4" name="Picture 2" descr="https://gs1.wac.edgecastcdn.net/8019B6/data.tumblr.com/tumblr_mcxhnl6tAx1rksg3yo1_500.jpg"/>
-          <p:cNvPicPr>
-            <a:picLocks noChangeAspect="1" noChangeArrowheads="1"/>
-          </p:cNvPicPr>
-          <p:nvPr/>
-        </p:nvPicPr>
-        <p:blipFill>
-          <a:blip r:embed="rId2">
-            <a:extLst>
-              <a:ext uri="{28A0092B-C50C-407E-A947-70E740481C1C}">
-                <a14:useLocalDpi xmlns:a14="http://schemas.microsoft.com/office/drawing/2010/main" val="0"/>
-              </a:ext>
-            </a:extLst>
-          </a:blip>
-          <a:srcRect/>
-          <a:stretch>
-            <a:fillRect/>
-          </a:stretch>
-        </p:blipFill>
-        <p:spPr bwMode="auto">
-          <a:xfrm>
-            <a:off x="1300843" y="2895600"/>
-            <a:ext cx="6847114" cy="3834384"/>
-          </a:xfrm>
-          <a:prstGeom prst="rect">
-            <a:avLst/>
-          </a:prstGeom>
-          <a:noFill/>
-          <a:extLst>
-            <a:ext uri="{909E8E84-426E-40DD-AFC4-6F175D3DCCD1}">
-              <a14:hiddenFill xmlns:a14="http://schemas.microsoft.com/office/drawing/2010/main">
-                <a:solidFill>
-                  <a:srgbClr val="FFFFFF"/>
-                </a:solidFill>
-              </a14:hiddenFill>
-            </a:ext>
-          </a:extLst>
-        </p:spPr>
-      </p:pic>
-    </p:spTree>
-    <p:extLst>
-      <p:ext uri="{BB962C8B-B14F-4D97-AF65-F5344CB8AC3E}">
-        <p14:creationId xmlns:p14="http://schemas.microsoft.com/office/powerpoint/2010/main" val="2736760537"/>
-      </p:ext>
-    </p:extLst>
-  </p:cSld>
-  <p:clrMapOvr>
-    <a:masterClrMapping/>
-  </p:clrMapOvr>
-  <p:timing>
-    <p:tnLst>
-      <p:par>
-        <p:cTn id="1" dur="indefinite" restart="never" nodeType="tmRoot"/>
-      </p:par>
-    </p:tnLst>
-  </p:timing>
-</p:sld>
-</file>
-
-<file path=ppt/slides/slide91.xml><?xml version="1.0" encoding="utf-8"?>
-<p:sld xmlns:a="http://schemas.openxmlformats.org/drawingml/2006/main" xmlns:r="http://schemas.openxmlformats.org/officeDocument/2006/relationships" xmlns:p="http://schemas.openxmlformats.org/presentationml/2006/main">
-  <p:cSld>
-    <p:spTree>
-      <p:nvGrpSpPr>
-        <p:cNvPr id="1" name=""/>
-        <p:cNvGrpSpPr/>
-        <p:nvPr/>
-      </p:nvGrpSpPr>
-      <p:grpSpPr>
-        <a:xfrm>
-          <a:off x="0" y="0"/>
-          <a:ext cx="0" cy="0"/>
-          <a:chOff x="0" y="0"/>
-          <a:chExt cx="0" cy="0"/>
-        </a:xfrm>
-      </p:grpSpPr>
-      <p:sp>
-        <p:nvSpPr>
-          <p:cNvPr id="2" name="Title 1"/>
-          <p:cNvSpPr>
-            <a:spLocks noGrp="1"/>
-          </p:cNvSpPr>
-          <p:nvPr>
-            <p:ph type="title"/>
-          </p:nvPr>
-        </p:nvSpPr>
-        <p:spPr/>
-        <p:txBody>
           <a:bodyPr/>
           <a:lstStyle/>
           <a:p>
@@ -52445,7 +52332,7 @@
 </p:sld>
 </file>
 
-<file path=ppt/slides/slide92.xml><?xml version="1.0" encoding="utf-8"?>
+<file path=ppt/slides/slide91.xml><?xml version="1.0" encoding="utf-8"?>
 <p:sld xmlns:a="http://schemas.openxmlformats.org/drawingml/2006/main" xmlns:r="http://schemas.openxmlformats.org/officeDocument/2006/relationships" xmlns:p="http://schemas.openxmlformats.org/presentationml/2006/main">
   <p:cSld>
     <p:spTree>
@@ -52565,7 +52452,7 @@
 </p:sld>
 </file>
 
-<file path=ppt/slides/slide93.xml><?xml version="1.0" encoding="utf-8"?>
+<file path=ppt/slides/slide92.xml><?xml version="1.0" encoding="utf-8"?>
 <p:sld xmlns:a="http://schemas.openxmlformats.org/drawingml/2006/main" xmlns:r="http://schemas.openxmlformats.org/officeDocument/2006/relationships" xmlns:p="http://schemas.openxmlformats.org/presentationml/2006/main">
   <p:cSld>
     <p:spTree>
@@ -52746,7 +52633,7 @@
 </p:sld>
 </file>
 
-<file path=ppt/slides/slide94.xml><?xml version="1.0" encoding="utf-8"?>
+<file path=ppt/slides/slide93.xml><?xml version="1.0" encoding="utf-8"?>
 <p:sld xmlns:a="http://schemas.openxmlformats.org/drawingml/2006/main" xmlns:r="http://schemas.openxmlformats.org/officeDocument/2006/relationships" xmlns:p="http://schemas.openxmlformats.org/presentationml/2006/main">
   <p:cSld>
     <p:spTree>
@@ -52803,6 +52690,18 @@
           <a:bodyPr/>
           <a:lstStyle/>
           <a:p>
+            <a:r>
+              <a:rPr lang="en-US" dirty="0" smtClean="0"/>
+              <a:t>This isn’t always possible</a:t>
+            </a:r>
+          </a:p>
+          <a:p>
+            <a:r>
+              <a:rPr lang="en-US" dirty="0" smtClean="0"/>
+              <a:t>When you can, give an index, a session, or something like that, rather than letting an attacker store state</a:t>
+            </a:r>
+          </a:p>
+          <a:p>
             <a:endParaRPr lang="en-US" dirty="0"/>
           </a:p>
         </p:txBody>
@@ -52827,7 +52726,7 @@
 </p:sld>
 </file>
 
-<file path=ppt/slides/slide95.xml><?xml version="1.0" encoding="utf-8"?>
+<file path=ppt/slides/slide94.xml><?xml version="1.0" encoding="utf-8"?>
 <p:sld xmlns:a="http://schemas.openxmlformats.org/drawingml/2006/main" xmlns:r="http://schemas.openxmlformats.org/officeDocument/2006/relationships" xmlns:p="http://schemas.openxmlformats.org/presentationml/2006/main">
   <p:cSld>
     <p:spTree>
@@ -52859,7 +52758,11 @@
           <a:bodyPr/>
           <a:lstStyle/>
           <a:p>
-            <a:endParaRPr lang="en-US"/>
+            <a:r>
+              <a:rPr lang="en-US" dirty="0" smtClean="0"/>
+              <a:t>Or, to put it another way…</a:t>
+            </a:r>
+            <a:endParaRPr lang="en-US" dirty="0"/>
           </a:p>
         </p:txBody>
       </p:sp>
@@ -52943,6 +52846,129 @@
 </p:sld>
 </file>
 
+<file path=ppt/slides/slide95.xml><?xml version="1.0" encoding="utf-8"?>
+<p:sld xmlns:a="http://schemas.openxmlformats.org/drawingml/2006/main" xmlns:r="http://schemas.openxmlformats.org/officeDocument/2006/relationships" xmlns:p="http://schemas.openxmlformats.org/presentationml/2006/main">
+  <p:cSld>
+    <p:spTree>
+      <p:nvGrpSpPr>
+        <p:cNvPr id="1" name=""/>
+        <p:cNvGrpSpPr/>
+        <p:nvPr/>
+      </p:nvGrpSpPr>
+      <p:grpSpPr>
+        <a:xfrm>
+          <a:off x="0" y="0"/>
+          <a:ext cx="0" cy="0"/>
+          <a:chOff x="0" y="0"/>
+          <a:chExt cx="0" cy="0"/>
+        </a:xfrm>
+      </p:grpSpPr>
+      <p:sp>
+        <p:nvSpPr>
+          <p:cNvPr id="2" name="Title 1"/>
+          <p:cNvSpPr>
+            <a:spLocks noGrp="1"/>
+          </p:cNvSpPr>
+          <p:nvPr>
+            <p:ph type="title"/>
+          </p:nvPr>
+        </p:nvSpPr>
+        <p:spPr/>
+        <p:txBody>
+          <a:bodyPr>
+            <a:normAutofit fontScale="90000"/>
+          </a:bodyPr>
+          <a:lstStyle/>
+          <a:p>
+            <a:r>
+              <a:rPr lang="en-US" dirty="0" smtClean="0"/>
+              <a:t>Solution #2: When you give them encrypted data, validate it</a:t>
+            </a:r>
+            <a:endParaRPr lang="en-US" dirty="0"/>
+          </a:p>
+        </p:txBody>
+      </p:sp>
+      <p:sp>
+        <p:nvSpPr>
+          <p:cNvPr id="3" name="Content Placeholder 2"/>
+          <p:cNvSpPr>
+            <a:spLocks noGrp="1"/>
+          </p:cNvSpPr>
+          <p:nvPr>
+            <p:ph idx="1"/>
+          </p:nvPr>
+        </p:nvSpPr>
+        <p:spPr/>
+        <p:txBody>
+          <a:bodyPr>
+            <a:normAutofit fontScale="92500"/>
+          </a:bodyPr>
+          <a:lstStyle/>
+          <a:p>
+            <a:r>
+              <a:rPr lang="en-US" dirty="0" smtClean="0"/>
+              <a:t>“The cryptographic doom principle”</a:t>
+            </a:r>
+          </a:p>
+          <a:p>
+            <a:r>
+              <a:rPr lang="en-US" dirty="0" smtClean="0"/>
+              <a:t>Calculate a HMAC and send it with the encrypted data</a:t>
+            </a:r>
+          </a:p>
+          <a:p>
+            <a:pPr lvl="1"/>
+            <a:r>
+              <a:rPr lang="en-US" dirty="0" smtClean="0"/>
+              <a:t>Validate the HMAC before attempting to decrypt</a:t>
+            </a:r>
+          </a:p>
+          <a:p>
+            <a:r>
+              <a:rPr lang="en-US" dirty="0" smtClean="0"/>
+              <a:t>Alternatively, use encryption in “EAX mode” – a NIST standard for authenticated encryption</a:t>
+            </a:r>
+          </a:p>
+          <a:p>
+            <a:r>
+              <a:rPr lang="en-US" dirty="0" smtClean="0"/>
+              <a:t>Coming soon: CAESAR</a:t>
+            </a:r>
+          </a:p>
+          <a:p>
+            <a:pPr lvl="1"/>
+            <a:r>
+              <a:rPr lang="en-US" b="1" dirty="0"/>
+              <a:t>CAESAR: Competition for Authenticated Encryption: Security, Applicability, and </a:t>
+            </a:r>
+            <a:r>
+              <a:rPr lang="en-US" b="1" dirty="0" smtClean="0"/>
+              <a:t>Robustness</a:t>
+            </a:r>
+            <a:endParaRPr lang="en-US" b="1" dirty="0"/>
+          </a:p>
+        </p:txBody>
+      </p:sp>
+    </p:spTree>
+    <p:extLst>
+      <p:ext uri="{BB962C8B-B14F-4D97-AF65-F5344CB8AC3E}">
+        <p14:creationId xmlns:p14="http://schemas.microsoft.com/office/powerpoint/2010/main" val="1771997933"/>
+      </p:ext>
+    </p:extLst>
+  </p:cSld>
+  <p:clrMapOvr>
+    <a:masterClrMapping/>
+  </p:clrMapOvr>
+  <p:timing>
+    <p:tnLst>
+      <p:par>
+        <p:cTn id="1" dur="indefinite" restart="never" nodeType="tmRoot"/>
+      </p:par>
+    </p:tnLst>
+  </p:timing>
+</p:sld>
+</file>
+
 <file path=ppt/slides/slide96.xml><?xml version="1.0" encoding="utf-8"?>
 <p:sld xmlns:a="http://schemas.openxmlformats.org/drawingml/2006/main" xmlns:r="http://schemas.openxmlformats.org/officeDocument/2006/relationships" xmlns:p="http://schemas.openxmlformats.org/presentationml/2006/main">
   <p:cSld>
@@ -52979,122 +53005,7 @@
           <a:p>
             <a:r>
               <a:rPr lang="en-US" dirty="0" smtClean="0"/>
-              <a:t>Solution #2: When you give them encrypted data, validate it</a:t>
-            </a:r>
-            <a:endParaRPr lang="en-US" dirty="0"/>
-          </a:p>
-        </p:txBody>
-      </p:sp>
-      <p:sp>
-        <p:nvSpPr>
-          <p:cNvPr id="3" name="Content Placeholder 2"/>
-          <p:cNvSpPr>
-            <a:spLocks noGrp="1"/>
-          </p:cNvSpPr>
-          <p:nvPr>
-            <p:ph idx="1"/>
-          </p:nvPr>
-        </p:nvSpPr>
-        <p:spPr/>
-        <p:txBody>
-          <a:bodyPr>
-            <a:normAutofit lnSpcReduction="10000"/>
-          </a:bodyPr>
-          <a:lstStyle/>
-          <a:p>
-            <a:r>
-              <a:rPr lang="en-US" dirty="0" smtClean="0"/>
-              <a:t>Calculate a HMAC and send it with the encrypted data</a:t>
-            </a:r>
-          </a:p>
-          <a:p>
-            <a:pPr lvl="1"/>
-            <a:r>
-              <a:rPr lang="en-US" dirty="0" smtClean="0"/>
-              <a:t>Validate the HMAC before attempting to decrypt</a:t>
-            </a:r>
-          </a:p>
-          <a:p>
-            <a:r>
-              <a:rPr lang="en-US" dirty="0" smtClean="0"/>
-              <a:t>Alternatively, use encryption in “EAX mode” – a NIST standard for authenticated encryption</a:t>
-            </a:r>
-          </a:p>
-          <a:p>
-            <a:r>
-              <a:rPr lang="en-US" dirty="0" smtClean="0"/>
-              <a:t>Coming soon: CAESAR</a:t>
-            </a:r>
-          </a:p>
-          <a:p>
-            <a:pPr lvl="1"/>
-            <a:r>
-              <a:rPr lang="en-US" b="1" dirty="0"/>
-              <a:t>CAESAR: Competition for Authenticated Encryption: Security, Applicability, and </a:t>
-            </a:r>
-            <a:r>
-              <a:rPr lang="en-US" b="1" dirty="0" smtClean="0"/>
-              <a:t>Robustness</a:t>
-            </a:r>
-            <a:endParaRPr lang="en-US" b="1" dirty="0"/>
-          </a:p>
-        </p:txBody>
-      </p:sp>
-    </p:spTree>
-    <p:extLst>
-      <p:ext uri="{BB962C8B-B14F-4D97-AF65-F5344CB8AC3E}">
-        <p14:creationId xmlns:p14="http://schemas.microsoft.com/office/powerpoint/2010/main" val="1771997933"/>
-      </p:ext>
-    </p:extLst>
-  </p:cSld>
-  <p:clrMapOvr>
-    <a:masterClrMapping/>
-  </p:clrMapOvr>
-  <p:timing>
-    <p:tnLst>
-      <p:par>
-        <p:cTn id="1" dur="indefinite" restart="never" nodeType="tmRoot"/>
-      </p:par>
-    </p:tnLst>
-  </p:timing>
-</p:sld>
-</file>
-
-<file path=ppt/slides/slide97.xml><?xml version="1.0" encoding="utf-8"?>
-<p:sld xmlns:a="http://schemas.openxmlformats.org/drawingml/2006/main" xmlns:r="http://schemas.openxmlformats.org/officeDocument/2006/relationships" xmlns:p="http://schemas.openxmlformats.org/presentationml/2006/main">
-  <p:cSld>
-    <p:spTree>
-      <p:nvGrpSpPr>
-        <p:cNvPr id="1" name=""/>
-        <p:cNvGrpSpPr/>
-        <p:nvPr/>
-      </p:nvGrpSpPr>
-      <p:grpSpPr>
-        <a:xfrm>
-          <a:off x="0" y="0"/>
-          <a:ext cx="0" cy="0"/>
-          <a:chOff x="0" y="0"/>
-          <a:chExt cx="0" cy="0"/>
-        </a:xfrm>
-      </p:grpSpPr>
-      <p:sp>
-        <p:nvSpPr>
-          <p:cNvPr id="2" name="Title 1"/>
-          <p:cNvSpPr>
-            <a:spLocks noGrp="1"/>
-          </p:cNvSpPr>
-          <p:nvPr>
-            <p:ph type="title"/>
-          </p:nvPr>
-        </p:nvSpPr>
-        <p:spPr/>
-        <p:txBody>
-          <a:bodyPr/>
-          <a:lstStyle/>
-          <a:p>
-            <a:r>
-              <a:rPr lang="en-US" dirty="0" smtClean="0"/>
-              <a:t>It bears repeating…</a:t>
+              <a:t>“The cryptographic doom principle”</a:t>
             </a:r>
             <a:endParaRPr lang="en-US" dirty="0"/>
           </a:p>
@@ -53198,7 +53109,7 @@
 </p:sld>
 </file>
 
-<file path=ppt/slides/slide98.xml><?xml version="1.0" encoding="utf-8"?>
+<file path=ppt/slides/slide97.xml><?xml version="1.0" encoding="utf-8"?>
 <p:sld xmlns:a="http://schemas.openxmlformats.org/drawingml/2006/main" xmlns:r="http://schemas.openxmlformats.org/officeDocument/2006/relationships" xmlns:p="http://schemas.openxmlformats.org/presentationml/2006/main">
   <p:cSld>
     <p:spTree>
@@ -53234,15 +53145,7 @@
           <a:p>
             <a:r>
               <a:rPr lang="en-US" dirty="0" smtClean="0"/>
-              <a:t>Solution #3: Never encrypt </a:t>
-            </a:r>
-            <a:r>
-              <a:rPr lang="en-US" dirty="0" smtClean="0"/>
-              <a:t>data </a:t>
-            </a:r>
-            <a:r>
-              <a:rPr lang="en-US" dirty="0" smtClean="0"/>
-              <a:t>with the same key and IV</a:t>
+              <a:t>Solution #3: Never encrypt data with the same key and IV</a:t>
             </a:r>
             <a:endParaRPr lang="en-US" dirty="0"/>
           </a:p>
@@ -53281,6 +53184,36 @@
           </a:p>
         </p:txBody>
       </p:sp>
+      <p:pic>
+        <p:nvPicPr>
+          <p:cNvPr id="4" name="Picture 3"/>
+          <p:cNvPicPr>
+            <a:picLocks noChangeAspect="1"/>
+          </p:cNvPicPr>
+          <p:nvPr/>
+        </p:nvPicPr>
+        <p:blipFill>
+          <a:blip r:embed="rId2">
+            <a:extLst>
+              <a:ext uri="{28A0092B-C50C-407E-A947-70E740481C1C}">
+                <a14:useLocalDpi xmlns:a14="http://schemas.microsoft.com/office/drawing/2010/main" val="0"/>
+              </a:ext>
+            </a:extLst>
+          </a:blip>
+          <a:stretch>
+            <a:fillRect/>
+          </a:stretch>
+        </p:blipFill>
+        <p:spPr>
+          <a:xfrm>
+            <a:off x="2133599" y="4267200"/>
+            <a:ext cx="4599491" cy="2514600"/>
+          </a:xfrm>
+          <a:prstGeom prst="rect">
+            <a:avLst/>
+          </a:prstGeom>
+        </p:spPr>
+      </p:pic>
     </p:spTree>
     <p:extLst>
       <p:ext uri="{BB962C8B-B14F-4D97-AF65-F5344CB8AC3E}">
@@ -53301,7 +53234,7 @@
 </p:sld>
 </file>
 
-<file path=ppt/slides/slide99.xml><?xml version="1.0" encoding="utf-8"?>
+<file path=ppt/slides/slide98.xml><?xml version="1.0" encoding="utf-8"?>
 <p:sld xmlns:a="http://schemas.openxmlformats.org/drawingml/2006/main" xmlns:r="http://schemas.openxmlformats.org/officeDocument/2006/relationships" xmlns:p="http://schemas.openxmlformats.org/presentationml/2006/main">
   <p:cSld>
     <p:spTree>
@@ -53388,6 +53321,355 @@
     <p:extLst>
       <p:ext uri="{BB962C8B-B14F-4D97-AF65-F5344CB8AC3E}">
         <p14:creationId xmlns:p14="http://schemas.microsoft.com/office/powerpoint/2010/main" val="2719671012"/>
+      </p:ext>
+    </p:extLst>
+  </p:cSld>
+  <p:clrMapOvr>
+    <a:masterClrMapping/>
+  </p:clrMapOvr>
+  <p:timing>
+    <p:tnLst>
+      <p:par>
+        <p:cTn id="1" dur="indefinite" restart="never" nodeType="tmRoot"/>
+      </p:par>
+    </p:tnLst>
+  </p:timing>
+</p:sld>
+</file>
+
+<file path=ppt/slides/slide99.xml><?xml version="1.0" encoding="utf-8"?>
+<p:sld xmlns:a="http://schemas.openxmlformats.org/drawingml/2006/main" xmlns:r="http://schemas.openxmlformats.org/officeDocument/2006/relationships" xmlns:p="http://schemas.openxmlformats.org/presentationml/2006/main">
+  <p:cSld>
+    <p:spTree>
+      <p:nvGrpSpPr>
+        <p:cNvPr id="1" name=""/>
+        <p:cNvGrpSpPr/>
+        <p:nvPr/>
+      </p:nvGrpSpPr>
+      <p:grpSpPr>
+        <a:xfrm>
+          <a:off x="0" y="0"/>
+          <a:ext cx="0" cy="0"/>
+          <a:chOff x="0" y="0"/>
+          <a:chExt cx="0" cy="0"/>
+        </a:xfrm>
+      </p:grpSpPr>
+      <p:sp>
+        <p:nvSpPr>
+          <p:cNvPr id="2" name="Title 1"/>
+          <p:cNvSpPr>
+            <a:spLocks noGrp="1"/>
+          </p:cNvSpPr>
+          <p:nvPr>
+            <p:ph type="title"/>
+          </p:nvPr>
+        </p:nvSpPr>
+        <p:spPr/>
+        <p:txBody>
+          <a:bodyPr/>
+          <a:lstStyle/>
+          <a:p>
+            <a:r>
+              <a:rPr lang="en-US" dirty="0" smtClean="0"/>
+              <a:t>That’s all!</a:t>
+            </a:r>
+            <a:endParaRPr lang="en-US" dirty="0"/>
+          </a:p>
+        </p:txBody>
+      </p:sp>
+      <p:pic>
+        <p:nvPicPr>
+          <p:cNvPr id="9218" name="Picture 2" descr="http://fun-gallery.com/wp-content/uploads/2011/09/Fast-And-Funny-640x469.jpg"/>
+          <p:cNvPicPr>
+            <a:picLocks noChangeAspect="1" noChangeArrowheads="1"/>
+          </p:cNvPicPr>
+          <p:nvPr/>
+        </p:nvPicPr>
+        <p:blipFill>
+          <a:blip r:embed="rId2">
+            <a:extLst>
+              <a:ext uri="{28A0092B-C50C-407E-A947-70E740481C1C}">
+                <a14:useLocalDpi xmlns:a14="http://schemas.microsoft.com/office/drawing/2010/main" val="0"/>
+              </a:ext>
+            </a:extLst>
+          </a:blip>
+          <a:srcRect/>
+          <a:stretch>
+            <a:fillRect/>
+          </a:stretch>
+        </p:blipFill>
+        <p:spPr bwMode="auto">
+          <a:xfrm>
+            <a:off x="1912434" y="152400"/>
+            <a:ext cx="5631366" cy="4126736"/>
+          </a:xfrm>
+          <a:prstGeom prst="rect">
+            <a:avLst/>
+          </a:prstGeom>
+          <a:noFill/>
+          <a:extLst>
+            <a:ext uri="{909E8E84-426E-40DD-AFC4-6F175D3DCCD1}">
+              <a14:hiddenFill xmlns:a14="http://schemas.microsoft.com/office/drawing/2010/main">
+                <a:solidFill>
+                  <a:srgbClr val="FFFFFF"/>
+                </a:solidFill>
+              </a14:hiddenFill>
+            </a:ext>
+          </a:extLst>
+        </p:spPr>
+      </p:pic>
+      <p:sp>
+        <p:nvSpPr>
+          <p:cNvPr id="4" name="Rectangle 3"/>
+          <p:cNvSpPr/>
+          <p:nvPr/>
+        </p:nvSpPr>
+        <p:spPr>
+          <a:xfrm>
+            <a:off x="3124200" y="152400"/>
+            <a:ext cx="1752600" cy="1219200"/>
+          </a:xfrm>
+          <a:prstGeom prst="rect">
+            <a:avLst/>
+          </a:prstGeom>
+          <a:noFill/>
+          <a:ln>
+            <a:solidFill>
+              <a:srgbClr val="FF0000"/>
+            </a:solidFill>
+          </a:ln>
+        </p:spPr>
+        <p:style>
+          <a:lnRef idx="2">
+            <a:schemeClr val="accent1">
+              <a:shade val="50000"/>
+            </a:schemeClr>
+          </a:lnRef>
+          <a:fillRef idx="1">
+            <a:schemeClr val="accent1"/>
+          </a:fillRef>
+          <a:effectRef idx="0">
+            <a:schemeClr val="accent1"/>
+          </a:effectRef>
+          <a:fontRef idx="minor">
+            <a:schemeClr val="lt1"/>
+          </a:fontRef>
+        </p:style>
+        <p:txBody>
+          <a:bodyPr rtlCol="0" anchor="ctr"/>
+          <a:lstStyle/>
+          <a:p>
+            <a:pPr algn="ctr"/>
+            <a:endParaRPr lang="en-US"/>
+          </a:p>
+        </p:txBody>
+      </p:sp>
+      <p:cxnSp>
+        <p:nvCxnSpPr>
+          <p:cNvPr id="6" name="Straight Connector 5"/>
+          <p:cNvCxnSpPr/>
+          <p:nvPr/>
+        </p:nvCxnSpPr>
+        <p:spPr>
+          <a:xfrm>
+            <a:off x="4876800" y="152400"/>
+            <a:ext cx="4285785" cy="2895600"/>
+          </a:xfrm>
+          <a:prstGeom prst="line">
+            <a:avLst/>
+          </a:prstGeom>
+          <a:ln w="28575">
+            <a:solidFill>
+              <a:srgbClr val="FF0000"/>
+            </a:solidFill>
+          </a:ln>
+        </p:spPr>
+        <p:style>
+          <a:lnRef idx="1">
+            <a:schemeClr val="accent1"/>
+          </a:lnRef>
+          <a:fillRef idx="0">
+            <a:schemeClr val="accent1"/>
+          </a:fillRef>
+          <a:effectRef idx="0">
+            <a:schemeClr val="accent1"/>
+          </a:effectRef>
+          <a:fontRef idx="minor">
+            <a:schemeClr val="tx1"/>
+          </a:fontRef>
+        </p:style>
+      </p:cxnSp>
+      <p:cxnSp>
+        <p:nvCxnSpPr>
+          <p:cNvPr id="10" name="Straight Connector 9"/>
+          <p:cNvCxnSpPr/>
+          <p:nvPr/>
+        </p:nvCxnSpPr>
+        <p:spPr>
+          <a:xfrm>
+            <a:off x="3124200" y="1371600"/>
+            <a:ext cx="1466385" cy="4724400"/>
+          </a:xfrm>
+          <a:prstGeom prst="line">
+            <a:avLst/>
+          </a:prstGeom>
+          <a:ln w="28575">
+            <a:solidFill>
+              <a:srgbClr val="FF0000"/>
+            </a:solidFill>
+          </a:ln>
+        </p:spPr>
+        <p:style>
+          <a:lnRef idx="1">
+            <a:schemeClr val="accent1"/>
+          </a:lnRef>
+          <a:fillRef idx="0">
+            <a:schemeClr val="accent1"/>
+          </a:fillRef>
+          <a:effectRef idx="0">
+            <a:schemeClr val="accent1"/>
+          </a:effectRef>
+          <a:fontRef idx="minor">
+            <a:schemeClr val="tx1"/>
+          </a:fontRef>
+        </p:style>
+      </p:cxnSp>
+      <p:cxnSp>
+        <p:nvCxnSpPr>
+          <p:cNvPr id="15" name="Straight Connector 14"/>
+          <p:cNvCxnSpPr/>
+          <p:nvPr/>
+        </p:nvCxnSpPr>
+        <p:spPr>
+          <a:xfrm>
+            <a:off x="3124200" y="152400"/>
+            <a:ext cx="1466385" cy="2895600"/>
+          </a:xfrm>
+          <a:prstGeom prst="line">
+            <a:avLst/>
+          </a:prstGeom>
+          <a:ln w="28575">
+            <a:solidFill>
+              <a:srgbClr val="FF0000"/>
+            </a:solidFill>
+          </a:ln>
+        </p:spPr>
+        <p:style>
+          <a:lnRef idx="1">
+            <a:schemeClr val="accent1"/>
+          </a:lnRef>
+          <a:fillRef idx="0">
+            <a:schemeClr val="accent1"/>
+          </a:fillRef>
+          <a:effectRef idx="0">
+            <a:schemeClr val="accent1"/>
+          </a:effectRef>
+          <a:fontRef idx="minor">
+            <a:schemeClr val="tx1"/>
+          </a:fontRef>
+        </p:style>
+      </p:cxnSp>
+      <p:cxnSp>
+        <p:nvCxnSpPr>
+          <p:cNvPr id="18" name="Straight Connector 17"/>
+          <p:cNvCxnSpPr/>
+          <p:nvPr/>
+        </p:nvCxnSpPr>
+        <p:spPr>
+          <a:xfrm>
+            <a:off x="4876801" y="1371600"/>
+            <a:ext cx="4285784" cy="4724400"/>
+          </a:xfrm>
+          <a:prstGeom prst="line">
+            <a:avLst/>
+          </a:prstGeom>
+          <a:ln w="28575">
+            <a:solidFill>
+              <a:srgbClr val="FF0000"/>
+            </a:solidFill>
+          </a:ln>
+        </p:spPr>
+        <p:style>
+          <a:lnRef idx="1">
+            <a:schemeClr val="accent1"/>
+          </a:lnRef>
+          <a:fillRef idx="0">
+            <a:schemeClr val="accent1"/>
+          </a:fillRef>
+          <a:effectRef idx="0">
+            <a:schemeClr val="accent1"/>
+          </a:effectRef>
+          <a:fontRef idx="minor">
+            <a:schemeClr val="tx1"/>
+          </a:fontRef>
+        </p:style>
+      </p:cxnSp>
+      <p:pic>
+        <p:nvPicPr>
+          <p:cNvPr id="9220" name="Picture 4" descr="http://fun-gallery.com/wp-content/uploads/2011/09/Running-Race-Finish-Line-Funny-Picture.jpg"/>
+          <p:cNvPicPr>
+            <a:picLocks noChangeAspect="1" noChangeArrowheads="1"/>
+          </p:cNvPicPr>
+          <p:nvPr/>
+        </p:nvPicPr>
+        <p:blipFill>
+          <a:blip r:embed="rId3">
+            <a:extLst>
+              <a:ext uri="{28A0092B-C50C-407E-A947-70E740481C1C}">
+                <a14:useLocalDpi xmlns:a14="http://schemas.microsoft.com/office/drawing/2010/main" val="0"/>
+              </a:ext>
+            </a:extLst>
+          </a:blip>
+          <a:srcRect/>
+          <a:stretch>
+            <a:fillRect/>
+          </a:stretch>
+        </p:blipFill>
+        <p:spPr bwMode="auto">
+          <a:xfrm>
+            <a:off x="4590585" y="3048000"/>
+            <a:ext cx="4572000" cy="3048000"/>
+          </a:xfrm>
+          <a:prstGeom prst="rect">
+            <a:avLst/>
+          </a:prstGeom>
+          <a:solidFill>
+            <a:srgbClr val="FFFFFF">
+              <a:shade val="85000"/>
+            </a:srgbClr>
+          </a:solidFill>
+          <a:ln w="19050" cap="sq">
+            <a:solidFill>
+              <a:srgbClr val="FF0000"/>
+            </a:solidFill>
+            <a:miter lim="800000"/>
+          </a:ln>
+          <a:effectLst>
+            <a:outerShdw blurRad="55000" dist="18000" dir="5400000" algn="tl" rotWithShape="0">
+              <a:srgbClr val="000000">
+                <a:alpha val="40000"/>
+              </a:srgbClr>
+            </a:outerShdw>
+          </a:effectLst>
+          <a:scene3d>
+            <a:camera prst="orthographicFront"/>
+            <a:lightRig rig="twoPt" dir="t">
+              <a:rot lat="0" lon="0" rev="7200000"/>
+            </a:lightRig>
+          </a:scene3d>
+          <a:sp3d>
+            <a:bevelT w="25400" h="19050"/>
+            <a:contourClr>
+              <a:srgbClr val="FFFFFF"/>
+            </a:contourClr>
+          </a:sp3d>
+          <a:extLst/>
+        </p:spPr>
+      </p:pic>
+    </p:spTree>
+    <p:extLst>
+      <p:ext uri="{BB962C8B-B14F-4D97-AF65-F5344CB8AC3E}">
+        <p14:creationId xmlns:p14="http://schemas.microsoft.com/office/powerpoint/2010/main" val="2565735704"/>
       </p:ext>
     </p:extLst>
   </p:cSld>

</xml_diff>